<commit_message>
architecture diagram source [with alternatives]
</commit_message>
<xml_diff>
--- a/paper/architecture_source.pptx
+++ b/paper/architecture_source.pptx
@@ -2824,7 +2824,7 @@
 <dgm:dataModel xmlns:dgm="http://schemas.openxmlformats.org/drawingml/2006/diagram" xmlns:a="http://schemas.openxmlformats.org/drawingml/2006/main">
   <dgm:ptLst>
     <dgm:pt modelId="{B00105FA-F9F7-41B3-858D-FD4789609498}" type="doc">
-      <dgm:prSet loTypeId="urn:microsoft.com/office/officeart/2005/8/layout/hProcess4" loCatId="process" qsTypeId="urn:microsoft.com/office/officeart/2005/8/quickstyle/simple1" qsCatId="simple" csTypeId="urn:microsoft.com/office/officeart/2005/8/colors/accent1_1" csCatId="accent1" phldr="1"/>
+      <dgm:prSet loTypeId="urn:microsoft.com/office/officeart/2005/8/layout/hProcess4" loCatId="process" qsTypeId="urn:microsoft.com/office/officeart/2005/8/quickstyle/simple2" qsCatId="simple" csTypeId="urn:microsoft.com/office/officeart/2005/8/colors/accent1_1" csCatId="accent1" phldr="1"/>
       <dgm:spPr/>
     </dgm:pt>
     <dgm:pt modelId="{C0CF4AE4-FAAC-4C18-B33E-9D0C8C2C9EFB}">
@@ -2871,7 +2871,9 @@
         <a:lstStyle/>
         <a:p>
           <a:r>
-            <a:rPr lang="en-US"/>
+            <a:rPr lang="en-US" b="1" i="1" dirty="0">
+              <a:latin typeface="Arial Narrow" panose="020B0606020202030204" pitchFamily="34" charset="0"/>
+            </a:rPr>
             <a:t>Candidate Selection</a:t>
           </a:r>
         </a:p>
@@ -2943,7 +2945,9 @@
         <a:lstStyle/>
         <a:p>
           <a:r>
-            <a:rPr lang="en-US"/>
+            <a:rPr lang="en-US" b="1" i="1" dirty="0">
+              <a:latin typeface="Arial Narrow" panose="020B0606020202030204" pitchFamily="34" charset="0"/>
+            </a:rPr>
             <a:t>Disambiguation</a:t>
           </a:r>
         </a:p>
@@ -3038,7 +3042,7 @@
       <dgm:spPr/>
     </dgm:pt>
     <dgm:pt modelId="{75B6F837-0875-448B-8CE9-EC98B19DCBCA}" type="pres">
-      <dgm:prSet presAssocID="{0D67B211-D698-4A63-89A2-86266ECD3AA9}" presName="Name9" presStyleLbl="sibTrans2D1" presStyleIdx="0" presStyleCnt="3" custAng="10800000" custLinFactNeighborX="14833" custLinFactNeighborY="-53719"/>
+      <dgm:prSet presAssocID="{0D67B211-D698-4A63-89A2-86266ECD3AA9}" presName="Name9" presStyleLbl="sibTrans2D1" presStyleIdx="0" presStyleCnt="3" custAng="10800000" custLinFactNeighborX="-7598" custLinFactNeighborY="-39308"/>
       <dgm:spPr/>
       <dgm:t>
         <a:bodyPr/>
@@ -3063,6 +3067,13 @@
         </dgm:presLayoutVars>
       </dgm:prSet>
       <dgm:spPr/>
+      <dgm:t>
+        <a:bodyPr/>
+        <a:lstStyle/>
+        <a:p>
+          <a:endParaRPr lang="en-US"/>
+        </a:p>
+      </dgm:t>
     </dgm:pt>
     <dgm:pt modelId="{B960820B-D9A8-4429-ACCE-863F63500FE5}" type="pres">
       <dgm:prSet presAssocID="{4DE3E437-3C16-43E9-B57D-2C86BE149872}" presName="childNode2tx" presStyleLbl="bgAcc1" presStyleIdx="1" presStyleCnt="4">
@@ -3093,7 +3104,7 @@
       <dgm:spPr/>
     </dgm:pt>
     <dgm:pt modelId="{F609C448-A888-4A79-9D00-3272843C2135}" type="pres">
-      <dgm:prSet presAssocID="{9A2C753B-CB4D-4B10-8163-895C2B0EE650}" presName="Name18" presStyleLbl="sibTrans2D1" presStyleIdx="1" presStyleCnt="3" custAng="10800000" custLinFactNeighborX="19565" custLinFactNeighborY="41673"/>
+      <dgm:prSet presAssocID="{9A2C753B-CB4D-4B10-8163-895C2B0EE650}" presName="Name18" presStyleLbl="sibTrans2D1" presStyleIdx="1" presStyleCnt="3" custAng="10800000" custLinFactNeighborX="-10990" custLinFactNeighborY="30168"/>
       <dgm:spPr/>
       <dgm:t>
         <a:bodyPr/>
@@ -3148,7 +3159,7 @@
       <dgm:spPr/>
     </dgm:pt>
     <dgm:pt modelId="{7F9B34CC-08E9-484F-B724-01BC2EF00B9B}" type="pres">
-      <dgm:prSet presAssocID="{0B4F4DB1-5CB4-4659-8D3D-72C8582A7F6B}" presName="Name9" presStyleLbl="sibTrans2D1" presStyleIdx="2" presStyleCnt="3" custAng="10800000" custLinFactNeighborX="25829" custLinFactNeighborY="-53719"/>
+      <dgm:prSet presAssocID="{0B4F4DB1-5CB4-4659-8D3D-72C8582A7F6B}" presName="Name9" presStyleLbl="sibTrans2D1" presStyleIdx="2" presStyleCnt="3" custAng="10800000" custLinFactNeighborX="-10463" custLinFactNeighborY="-44970"/>
       <dgm:spPr/>
       <dgm:t>
         <a:bodyPr/>
@@ -3167,12 +3178,19 @@
       <dgm:spPr/>
     </dgm:pt>
     <dgm:pt modelId="{D4792750-E4AA-4BE4-BE77-32EE50DD88A0}" type="pres">
-      <dgm:prSet presAssocID="{68C490C7-877A-4226-8E6D-0DC01F25AB70}" presName="childNode2" presStyleLbl="bgAcc1" presStyleIdx="3" presStyleCnt="4">
+      <dgm:prSet presAssocID="{68C490C7-877A-4226-8E6D-0DC01F25AB70}" presName="childNode2" presStyleLbl="bgAcc1" presStyleIdx="3" presStyleCnt="4" custLinFactNeighborX="-5564" custLinFactNeighborY="0">
         <dgm:presLayoutVars>
           <dgm:bulletEnabled val="1"/>
         </dgm:presLayoutVars>
       </dgm:prSet>
       <dgm:spPr/>
+      <dgm:t>
+        <a:bodyPr/>
+        <a:lstStyle/>
+        <a:p>
+          <a:endParaRPr lang="en-US"/>
+        </a:p>
+      </dgm:t>
     </dgm:pt>
     <dgm:pt modelId="{FE717BF4-F76E-4C1E-8676-E8ABCBF888DF}" type="pres">
       <dgm:prSet presAssocID="{68C490C7-877A-4226-8E6D-0DC01F25AB70}" presName="childNode2tx" presStyleLbl="bgAcc1" presStyleIdx="3" presStyleCnt="4">
@@ -3183,7 +3201,7 @@
       <dgm:spPr/>
     </dgm:pt>
     <dgm:pt modelId="{9C6E6AD4-CF42-49E7-A23B-60B116EEB3B5}" type="pres">
-      <dgm:prSet presAssocID="{68C490C7-877A-4226-8E6D-0DC01F25AB70}" presName="parentNode2" presStyleLbl="node1" presStyleIdx="3" presStyleCnt="4">
+      <dgm:prSet presAssocID="{68C490C7-877A-4226-8E6D-0DC01F25AB70}" presName="parentNode2" presStyleLbl="node1" presStyleIdx="3" presStyleCnt="4" custLinFactNeighborX="-4866" custLinFactNeighborY="1849">
         <dgm:presLayoutVars>
           <dgm:chMax val="0"/>
           <dgm:bulletEnabled val="1"/>
@@ -4117,7 +4135,7 @@
       </dsp:nvSpPr>
       <dsp:spPr>
         <a:xfrm rot="10800000">
-          <a:off x="831441" y="30890"/>
+          <a:off x="521866" y="229780"/>
           <a:ext cx="1380121" cy="1380121"/>
         </a:xfrm>
         <a:prstGeom prst="leftCircularArrow">
@@ -4141,7 +4159,13 @@
         <a:ln>
           <a:noFill/>
         </a:ln>
-        <a:effectLst/>
+        <a:effectLst>
+          <a:outerShdw blurRad="40000" dist="20000" dir="5400000" rotWithShape="0">
+            <a:srgbClr val="000000">
+              <a:alpha val="38000"/>
+            </a:srgbClr>
+          </a:outerShdw>
+        </a:effectLst>
       </dsp:spPr>
       <dsp:style>
         <a:lnRef idx="0">
@@ -4150,7 +4174,7 @@
         <a:fillRef idx="1">
           <a:scrgbClr r="0" g="0" b="0"/>
         </a:fillRef>
-        <a:effectRef idx="0">
+        <a:effectRef idx="1">
           <a:scrgbClr r="0" g="0" b="0"/>
         </a:effectRef>
         <a:fontRef idx="minor">
@@ -4181,7 +4205,7 @@
             <a:alphaOff val="0"/>
           </a:schemeClr>
         </a:solidFill>
-        <a:ln w="25400" cap="flat" cmpd="sng" algn="ctr">
+        <a:ln w="38100" cap="flat" cmpd="sng" algn="ctr">
           <a:solidFill>
             <a:schemeClr val="accent1">
               <a:shade val="80000"/>
@@ -4193,16 +4217,22 @@
           </a:solidFill>
           <a:prstDash val="solid"/>
         </a:ln>
-        <a:effectLst/>
+        <a:effectLst>
+          <a:outerShdw blurRad="40000" dist="20000" dir="5400000" rotWithShape="0">
+            <a:srgbClr val="000000">
+              <a:alpha val="38000"/>
+            </a:srgbClr>
+          </a:outerShdw>
+        </a:effectLst>
       </dsp:spPr>
       <dsp:style>
-        <a:lnRef idx="2">
+        <a:lnRef idx="3">
           <a:scrgbClr r="0" g="0" b="0"/>
         </a:lnRef>
         <a:fillRef idx="1">
           <a:scrgbClr r="0" g="0" b="0"/>
         </a:fillRef>
-        <a:effectRef idx="0">
+        <a:effectRef idx="1">
           <a:scrgbClr r="0" g="0" b="0"/>
         </a:effectRef>
         <a:fontRef idx="minor">
@@ -4210,12 +4240,12 @@
         </a:fontRef>
       </dsp:style>
       <dsp:txBody>
-        <a:bodyPr spcFirstLastPara="0" vert="horz" wrap="square" lIns="20955" tIns="13970" rIns="20955" bIns="13970" numCol="1" spcCol="1270" anchor="ctr" anchorCtr="0">
+        <a:bodyPr spcFirstLastPara="0" vert="horz" wrap="square" lIns="22860" tIns="15240" rIns="22860" bIns="15240" numCol="1" spcCol="1270" anchor="ctr" anchorCtr="0">
           <a:noAutofit/>
         </a:bodyPr>
         <a:lstStyle/>
         <a:p>
-          <a:pPr lvl="0" algn="ctr" defTabSz="488950">
+          <a:pPr lvl="0" algn="ctr" defTabSz="533400">
             <a:lnSpc>
               <a:spcPct val="90000"/>
             </a:lnSpc>
@@ -4227,7 +4257,7 @@
             </a:spcAft>
           </a:pPr>
           <a:r>
-            <a:rPr lang="en-US" sz="1100" kern="1200"/>
+            <a:rPr lang="en-US" sz="1200" kern="1200"/>
             <a:t>Post-Processing</a:t>
           </a:r>
         </a:p>
@@ -4295,7 +4325,7 @@
       </dsp:nvSpPr>
       <dsp:spPr>
         <a:xfrm rot="10800000">
-          <a:off x="2453910" y="639498"/>
+          <a:off x="1987314" y="463809"/>
           <a:ext cx="1527068" cy="1527068"/>
         </a:xfrm>
         <a:prstGeom prst="circularArrow">
@@ -4319,7 +4349,13 @@
         <a:ln>
           <a:noFill/>
         </a:ln>
-        <a:effectLst/>
+        <a:effectLst>
+          <a:outerShdw blurRad="40000" dist="20000" dir="5400000" rotWithShape="0">
+            <a:srgbClr val="000000">
+              <a:alpha val="38000"/>
+            </a:srgbClr>
+          </a:outerShdw>
+        </a:effectLst>
       </dsp:spPr>
       <dsp:style>
         <a:lnRef idx="0">
@@ -4328,7 +4364,7 @@
         <a:fillRef idx="1">
           <a:scrgbClr r="0" g="0" b="0"/>
         </a:fillRef>
-        <a:effectRef idx="0">
+        <a:effectRef idx="1">
           <a:scrgbClr r="0" g="0" b="0"/>
         </a:effectRef>
         <a:fontRef idx="minor">
@@ -4359,7 +4395,7 @@
             <a:alphaOff val="0"/>
           </a:schemeClr>
         </a:solidFill>
-        <a:ln w="25400" cap="flat" cmpd="sng" algn="ctr">
+        <a:ln w="38100" cap="flat" cmpd="sng" algn="ctr">
           <a:solidFill>
             <a:schemeClr val="accent1">
               <a:shade val="80000"/>
@@ -4371,16 +4407,22 @@
           </a:solidFill>
           <a:prstDash val="solid"/>
         </a:ln>
-        <a:effectLst/>
+        <a:effectLst>
+          <a:outerShdw blurRad="40000" dist="20000" dir="5400000" rotWithShape="0">
+            <a:srgbClr val="000000">
+              <a:alpha val="38000"/>
+            </a:srgbClr>
+          </a:outerShdw>
+        </a:effectLst>
       </dsp:spPr>
       <dsp:style>
-        <a:lnRef idx="2">
+        <a:lnRef idx="3">
           <a:scrgbClr r="0" g="0" b="0"/>
         </a:lnRef>
         <a:fillRef idx="1">
           <a:scrgbClr r="0" g="0" b="0"/>
         </a:fillRef>
-        <a:effectRef idx="0">
+        <a:effectRef idx="1">
           <a:scrgbClr r="0" g="0" b="0"/>
         </a:effectRef>
         <a:fontRef idx="minor">
@@ -4388,12 +4430,12 @@
         </a:fontRef>
       </dsp:style>
       <dsp:txBody>
-        <a:bodyPr spcFirstLastPara="0" vert="horz" wrap="square" lIns="20955" tIns="13970" rIns="20955" bIns="13970" numCol="1" spcCol="1270" anchor="ctr" anchorCtr="0">
+        <a:bodyPr spcFirstLastPara="0" vert="horz" wrap="square" lIns="22860" tIns="15240" rIns="22860" bIns="15240" numCol="1" spcCol="1270" anchor="ctr" anchorCtr="0">
           <a:noAutofit/>
         </a:bodyPr>
         <a:lstStyle/>
         <a:p>
-          <a:pPr lvl="0" algn="ctr" defTabSz="488950">
+          <a:pPr lvl="0" algn="ctr" defTabSz="533400">
             <a:lnSpc>
               <a:spcPct val="90000"/>
             </a:lnSpc>
@@ -4405,7 +4447,9 @@
             </a:spcAft>
           </a:pPr>
           <a:r>
-            <a:rPr lang="en-US" sz="1100" kern="1200"/>
+            <a:rPr lang="en-US" sz="1200" b="1" i="1" kern="1200" dirty="0">
+              <a:latin typeface="Arial Narrow" panose="020B0606020202030204" pitchFamily="34" charset="0"/>
+            </a:rPr>
             <a:t>Disambiguation</a:t>
           </a:r>
         </a:p>
@@ -4473,16 +4517,16 @@
       </dsp:nvSpPr>
       <dsp:spPr>
         <a:xfrm rot="10800000">
-          <a:off x="4059189" y="30890"/>
-          <a:ext cx="1380121" cy="1380121"/>
+          <a:off x="3570814" y="239689"/>
+          <a:ext cx="1306537" cy="1306537"/>
         </a:xfrm>
         <a:prstGeom prst="leftCircularArrow">
           <a:avLst>
-            <a:gd name="adj1" fmla="val 3959"/>
-            <a:gd name="adj2" fmla="val 496700"/>
-            <a:gd name="adj3" fmla="val 2272211"/>
+            <a:gd name="adj1" fmla="val 4182"/>
+            <a:gd name="adj2" fmla="val 527521"/>
+            <a:gd name="adj3" fmla="val 2303032"/>
             <a:gd name="adj4" fmla="val 9024489"/>
-            <a:gd name="adj5" fmla="val 4619"/>
+            <a:gd name="adj5" fmla="val 4879"/>
           </a:avLst>
         </a:prstGeom>
         <a:solidFill>
@@ -4497,7 +4541,13 @@
         <a:ln>
           <a:noFill/>
         </a:ln>
-        <a:effectLst/>
+        <a:effectLst>
+          <a:outerShdw blurRad="40000" dist="20000" dir="5400000" rotWithShape="0">
+            <a:srgbClr val="000000">
+              <a:alpha val="38000"/>
+            </a:srgbClr>
+          </a:outerShdw>
+        </a:effectLst>
       </dsp:spPr>
       <dsp:style>
         <a:lnRef idx="0">
@@ -4506,7 +4556,7 @@
         <a:fillRef idx="1">
           <a:scrgbClr r="0" g="0" b="0"/>
         </a:fillRef>
-        <a:effectRef idx="0">
+        <a:effectRef idx="1">
           <a:scrgbClr r="0" g="0" b="0"/>
         </a:effectRef>
         <a:fontRef idx="minor">
@@ -4537,7 +4587,7 @@
             <a:alphaOff val="0"/>
           </a:schemeClr>
         </a:solidFill>
-        <a:ln w="25400" cap="flat" cmpd="sng" algn="ctr">
+        <a:ln w="38100" cap="flat" cmpd="sng" algn="ctr">
           <a:solidFill>
             <a:schemeClr val="accent1">
               <a:shade val="80000"/>
@@ -4549,16 +4599,22 @@
           </a:solidFill>
           <a:prstDash val="solid"/>
         </a:ln>
-        <a:effectLst/>
+        <a:effectLst>
+          <a:outerShdw blurRad="40000" dist="20000" dir="5400000" rotWithShape="0">
+            <a:srgbClr val="000000">
+              <a:alpha val="38000"/>
+            </a:srgbClr>
+          </a:outerShdw>
+        </a:effectLst>
       </dsp:spPr>
       <dsp:style>
-        <a:lnRef idx="2">
+        <a:lnRef idx="3">
           <a:scrgbClr r="0" g="0" b="0"/>
         </a:lnRef>
         <a:fillRef idx="1">
           <a:scrgbClr r="0" g="0" b="0"/>
         </a:fillRef>
-        <a:effectRef idx="0">
+        <a:effectRef idx="1">
           <a:scrgbClr r="0" g="0" b="0"/>
         </a:effectRef>
         <a:fontRef idx="minor">
@@ -4566,12 +4622,12 @@
         </a:fontRef>
       </dsp:style>
       <dsp:txBody>
-        <a:bodyPr spcFirstLastPara="0" vert="horz" wrap="square" lIns="20955" tIns="13970" rIns="20955" bIns="13970" numCol="1" spcCol="1270" anchor="ctr" anchorCtr="0">
+        <a:bodyPr spcFirstLastPara="0" vert="horz" wrap="square" lIns="22860" tIns="15240" rIns="22860" bIns="15240" numCol="1" spcCol="1270" anchor="ctr" anchorCtr="0">
           <a:noAutofit/>
         </a:bodyPr>
         <a:lstStyle/>
         <a:p>
-          <a:pPr lvl="0" algn="ctr" defTabSz="488950">
+          <a:pPr lvl="0" algn="ctr" defTabSz="533400">
             <a:lnSpc>
               <a:spcPct val="90000"/>
             </a:lnSpc>
@@ -4583,7 +4639,9 @@
             </a:spcAft>
           </a:pPr>
           <a:r>
-            <a:rPr lang="en-US" sz="1100" kern="1200"/>
+            <a:rPr lang="en-US" sz="1200" b="1" i="1" kern="1200" dirty="0">
+              <a:latin typeface="Arial Narrow" panose="020B0606020202030204" pitchFamily="34" charset="0"/>
+            </a:rPr>
             <a:t>Candidate Selection</a:t>
           </a:r>
         </a:p>
@@ -4600,7 +4658,7 @@
       </dsp:nvSpPr>
       <dsp:spPr>
         <a:xfrm>
-          <a:off x="4615520" y="622097"/>
+          <a:off x="4551533" y="622097"/>
           <a:ext cx="1150013" cy="948520"/>
         </a:xfrm>
         <a:prstGeom prst="roundRect">
@@ -4651,7 +4709,7 @@
       </dsp:nvSpPr>
       <dsp:spPr>
         <a:xfrm>
-          <a:off x="4871078" y="418842"/>
+          <a:off x="4821336" y="426359"/>
           <a:ext cx="1022234" cy="406508"/>
         </a:xfrm>
         <a:prstGeom prst="roundRect">
@@ -4667,7 +4725,7 @@
             <a:alphaOff val="0"/>
           </a:schemeClr>
         </a:solidFill>
-        <a:ln w="25400" cap="flat" cmpd="sng" algn="ctr">
+        <a:ln w="38100" cap="flat" cmpd="sng" algn="ctr">
           <a:solidFill>
             <a:schemeClr val="accent1">
               <a:shade val="80000"/>
@@ -4679,16 +4737,22 @@
           </a:solidFill>
           <a:prstDash val="solid"/>
         </a:ln>
-        <a:effectLst/>
+        <a:effectLst>
+          <a:outerShdw blurRad="40000" dist="20000" dir="5400000" rotWithShape="0">
+            <a:srgbClr val="000000">
+              <a:alpha val="38000"/>
+            </a:srgbClr>
+          </a:outerShdw>
+        </a:effectLst>
       </dsp:spPr>
       <dsp:style>
-        <a:lnRef idx="2">
+        <a:lnRef idx="3">
           <a:scrgbClr r="0" g="0" b="0"/>
         </a:lnRef>
         <a:fillRef idx="1">
           <a:scrgbClr r="0" g="0" b="0"/>
         </a:fillRef>
-        <a:effectRef idx="0">
+        <a:effectRef idx="1">
           <a:scrgbClr r="0" g="0" b="0"/>
         </a:effectRef>
         <a:fontRef idx="minor">
@@ -4696,12 +4760,12 @@
         </a:fontRef>
       </dsp:style>
       <dsp:txBody>
-        <a:bodyPr spcFirstLastPara="0" vert="horz" wrap="square" lIns="20955" tIns="13970" rIns="20955" bIns="13970" numCol="1" spcCol="1270" anchor="ctr" anchorCtr="0">
+        <a:bodyPr spcFirstLastPara="0" vert="horz" wrap="square" lIns="22860" tIns="15240" rIns="22860" bIns="15240" numCol="1" spcCol="1270" anchor="ctr" anchorCtr="0">
           <a:noAutofit/>
         </a:bodyPr>
         <a:lstStyle/>
         <a:p>
-          <a:pPr lvl="0" algn="ctr" defTabSz="488950">
+          <a:pPr lvl="0" algn="ctr" defTabSz="533400">
             <a:lnSpc>
               <a:spcPct val="90000"/>
             </a:lnSpc>
@@ -4713,13 +4777,13 @@
             </a:spcAft>
           </a:pPr>
           <a:r>
-            <a:rPr lang="en-US" sz="1100" kern="1200" dirty="0"/>
+            <a:rPr lang="en-US" sz="1200" kern="1200" dirty="0"/>
             <a:t>Pre-Processing</a:t>
           </a:r>
         </a:p>
       </dsp:txBody>
       <dsp:txXfrm>
-        <a:off x="4882984" y="430748"/>
+        <a:off x="4833242" y="438265"/>
         <a:ext cx="998422" cy="382696"/>
       </dsp:txXfrm>
     </dsp:sp>
@@ -7680,11 +7744,11 @@
 </file>
 
 <file path=ppt/diagrams/quickStyle2.xml><?xml version="1.0" encoding="utf-8"?>
-<dgm:styleDef xmlns:dgm="http://schemas.openxmlformats.org/drawingml/2006/diagram" xmlns:a="http://schemas.openxmlformats.org/drawingml/2006/main" uniqueId="urn:microsoft.com/office/officeart/2005/8/quickstyle/simple1">
+<dgm:styleDef xmlns:dgm="http://schemas.openxmlformats.org/drawingml/2006/diagram" xmlns:a="http://schemas.openxmlformats.org/drawingml/2006/main" uniqueId="urn:microsoft.com/office/officeart/2005/8/quickstyle/simple2">
   <dgm:title val=""/>
   <dgm:desc val=""/>
   <dgm:catLst>
-    <dgm:cat type="simple" pri="10100"/>
+    <dgm:cat type="simple" pri="10200"/>
   </dgm:catLst>
   <dgm:scene3d>
     <a:camera prst="orthographicFront"/>
@@ -7698,13 +7762,13 @@
     <dgm:sp3d/>
     <dgm:txPr/>
     <dgm:style>
-      <a:lnRef idx="2">
+      <a:lnRef idx="3">
         <a:scrgbClr r="0" g="0" b="0"/>
       </a:lnRef>
       <a:fillRef idx="1">
         <a:scrgbClr r="0" g="0" b="0"/>
       </a:fillRef>
-      <a:effectRef idx="0">
+      <a:effectRef idx="1">
         <a:scrgbClr r="0" g="0" b="0"/>
       </a:effectRef>
       <a:fontRef idx="minor">
@@ -7720,13 +7784,13 @@
     <dgm:sp3d/>
     <dgm:txPr/>
     <dgm:style>
-      <a:lnRef idx="2">
+      <a:lnRef idx="3">
         <a:scrgbClr r="0" g="0" b="0"/>
       </a:lnRef>
       <a:fillRef idx="1">
         <a:scrgbClr r="0" g="0" b="0"/>
       </a:fillRef>
-      <a:effectRef idx="0">
+      <a:effectRef idx="1">
         <a:scrgbClr r="0" g="0" b="0"/>
       </a:effectRef>
       <a:fontRef idx="minor">
@@ -7742,7 +7806,7 @@
     <dgm:sp3d/>
     <dgm:txPr/>
     <dgm:style>
-      <a:lnRef idx="2">
+      <a:lnRef idx="3">
         <a:scrgbClr r="0" g="0" b="0"/>
       </a:lnRef>
       <a:fillRef idx="1">
@@ -7770,7 +7834,7 @@
       <a:fillRef idx="1">
         <a:scrgbClr r="0" g="0" b="0"/>
       </a:fillRef>
-      <a:effectRef idx="0">
+      <a:effectRef idx="1">
         <a:scrgbClr r="0" g="0" b="0"/>
       </a:effectRef>
       <a:fontRef idx="minor">
@@ -7786,13 +7850,13 @@
     <dgm:sp3d/>
     <dgm:txPr/>
     <dgm:style>
-      <a:lnRef idx="2">
+      <a:lnRef idx="3">
         <a:scrgbClr r="0" g="0" b="0"/>
       </a:lnRef>
       <a:fillRef idx="1">
         <a:scrgbClr r="0" g="0" b="0"/>
       </a:fillRef>
-      <a:effectRef idx="0">
+      <a:effectRef idx="1">
         <a:scrgbClr r="0" g="0" b="0"/>
       </a:effectRef>
       <a:fontRef idx="minor">
@@ -7808,13 +7872,13 @@
     <dgm:sp3d/>
     <dgm:txPr/>
     <dgm:style>
-      <a:lnRef idx="2">
+      <a:lnRef idx="3">
         <a:scrgbClr r="0" g="0" b="0"/>
       </a:lnRef>
       <a:fillRef idx="1">
         <a:scrgbClr r="0" g="0" b="0"/>
       </a:fillRef>
-      <a:effectRef idx="0">
+      <a:effectRef idx="1">
         <a:scrgbClr r="0" g="0" b="0"/>
       </a:effectRef>
       <a:fontRef idx="minor">
@@ -7830,13 +7894,13 @@
     <dgm:sp3d/>
     <dgm:txPr/>
     <dgm:style>
-      <a:lnRef idx="2">
+      <a:lnRef idx="3">
         <a:scrgbClr r="0" g="0" b="0"/>
       </a:lnRef>
       <a:fillRef idx="1">
         <a:scrgbClr r="0" g="0" b="0"/>
       </a:fillRef>
-      <a:effectRef idx="0">
+      <a:effectRef idx="1">
         <a:scrgbClr r="0" g="0" b="0"/>
       </a:effectRef>
       <a:fontRef idx="minor">
@@ -7852,13 +7916,13 @@
     <dgm:sp3d/>
     <dgm:txPr/>
     <dgm:style>
-      <a:lnRef idx="2">
+      <a:lnRef idx="3">
         <a:scrgbClr r="0" g="0" b="0"/>
       </a:lnRef>
       <a:fillRef idx="1">
         <a:scrgbClr r="0" g="0" b="0"/>
       </a:fillRef>
-      <a:effectRef idx="0">
+      <a:effectRef idx="1">
         <a:scrgbClr r="0" g="0" b="0"/>
       </a:effectRef>
       <a:fontRef idx="minor">
@@ -7874,13 +7938,13 @@
     <dgm:sp3d/>
     <dgm:txPr/>
     <dgm:style>
-      <a:lnRef idx="2">
+      <a:lnRef idx="3">
         <a:scrgbClr r="0" g="0" b="0"/>
       </a:lnRef>
       <a:fillRef idx="1">
         <a:scrgbClr r="0" g="0" b="0"/>
       </a:fillRef>
-      <a:effectRef idx="0">
+      <a:effectRef idx="1">
         <a:scrgbClr r="0" g="0" b="0"/>
       </a:effectRef>
       <a:fontRef idx="minor"/>
@@ -7894,13 +7958,13 @@
     <dgm:sp3d/>
     <dgm:txPr/>
     <dgm:style>
-      <a:lnRef idx="2">
+      <a:lnRef idx="3">
         <a:scrgbClr r="0" g="0" b="0"/>
       </a:lnRef>
       <a:fillRef idx="1">
         <a:scrgbClr r="0" g="0" b="0"/>
       </a:fillRef>
-      <a:effectRef idx="0">
+      <a:effectRef idx="1">
         <a:scrgbClr r="0" g="0" b="0"/>
       </a:effectRef>
       <a:fontRef idx="minor"/>
@@ -7914,13 +7978,13 @@
     <dgm:sp3d/>
     <dgm:txPr/>
     <dgm:style>
-      <a:lnRef idx="2">
+      <a:lnRef idx="3">
         <a:scrgbClr r="0" g="0" b="0"/>
       </a:lnRef>
       <a:fillRef idx="1">
         <a:scrgbClr r="0" g="0" b="0"/>
       </a:fillRef>
-      <a:effectRef idx="0">
+      <a:effectRef idx="1">
         <a:scrgbClr r="0" g="0" b="0"/>
       </a:effectRef>
       <a:fontRef idx="minor"/>
@@ -7940,7 +8004,7 @@
       <a:fillRef idx="1">
         <a:scrgbClr r="0" g="0" b="0"/>
       </a:fillRef>
-      <a:effectRef idx="0">
+      <a:effectRef idx="1">
         <a:scrgbClr r="0" g="0" b="0"/>
       </a:effectRef>
       <a:fontRef idx="minor">
@@ -7962,7 +8026,7 @@
       <a:fillRef idx="1">
         <a:scrgbClr r="0" g="0" b="0"/>
       </a:fillRef>
-      <a:effectRef idx="0">
+      <a:effectRef idx="1">
         <a:scrgbClr r="0" g="0" b="0"/>
       </a:effectRef>
       <a:fontRef idx="minor">
@@ -7984,7 +8048,7 @@
       <a:fillRef idx="1">
         <a:scrgbClr r="0" g="0" b="0"/>
       </a:fillRef>
-      <a:effectRef idx="0">
+      <a:effectRef idx="1">
         <a:scrgbClr r="0" g="0" b="0"/>
       </a:effectRef>
       <a:fontRef idx="minor">
@@ -8026,7 +8090,7 @@
       <a:fillRef idx="1">
         <a:scrgbClr r="0" g="0" b="0"/>
       </a:fillRef>
-      <a:effectRef idx="0">
+      <a:effectRef idx="1">
         <a:scrgbClr r="0" g="0" b="0"/>
       </a:effectRef>
       <a:fontRef idx="minor"/>
@@ -8040,13 +8104,13 @@
     <dgm:sp3d/>
     <dgm:txPr/>
     <dgm:style>
-      <a:lnRef idx="2">
+      <a:lnRef idx="3">
         <a:scrgbClr r="0" g="0" b="0"/>
       </a:lnRef>
       <a:fillRef idx="1">
         <a:scrgbClr r="0" g="0" b="0"/>
       </a:fillRef>
-      <a:effectRef idx="0">
+      <a:effectRef idx="1">
         <a:scrgbClr r="0" g="0" b="0"/>
       </a:effectRef>
       <a:fontRef idx="minor">
@@ -8062,13 +8126,13 @@
     <dgm:sp3d/>
     <dgm:txPr/>
     <dgm:style>
-      <a:lnRef idx="2">
+      <a:lnRef idx="3">
         <a:scrgbClr r="0" g="0" b="0"/>
       </a:lnRef>
       <a:fillRef idx="1">
         <a:scrgbClr r="0" g="0" b="0"/>
       </a:fillRef>
-      <a:effectRef idx="0">
+      <a:effectRef idx="1">
         <a:scrgbClr r="0" g="0" b="0"/>
       </a:effectRef>
       <a:fontRef idx="minor">
@@ -8084,13 +8148,13 @@
     <dgm:sp3d/>
     <dgm:txPr/>
     <dgm:style>
-      <a:lnRef idx="2">
+      <a:lnRef idx="3">
         <a:scrgbClr r="0" g="0" b="0"/>
       </a:lnRef>
       <a:fillRef idx="1">
         <a:scrgbClr r="0" g="0" b="0"/>
       </a:fillRef>
-      <a:effectRef idx="0">
+      <a:effectRef idx="1">
         <a:scrgbClr r="0" g="0" b="0"/>
       </a:effectRef>
       <a:fontRef idx="minor">
@@ -8106,13 +8170,13 @@
     <dgm:sp3d/>
     <dgm:txPr/>
     <dgm:style>
-      <a:lnRef idx="2">
+      <a:lnRef idx="3">
         <a:scrgbClr r="0" g="0" b="0"/>
       </a:lnRef>
       <a:fillRef idx="1">
         <a:scrgbClr r="0" g="0" b="0"/>
       </a:fillRef>
-      <a:effectRef idx="0">
+      <a:effectRef idx="1">
         <a:scrgbClr r="0" g="0" b="0"/>
       </a:effectRef>
       <a:fontRef idx="minor">
@@ -8128,13 +8192,13 @@
     <dgm:sp3d/>
     <dgm:txPr/>
     <dgm:style>
-      <a:lnRef idx="2">
+      <a:lnRef idx="3">
         <a:scrgbClr r="0" g="0" b="0"/>
       </a:lnRef>
       <a:fillRef idx="1">
         <a:scrgbClr r="0" g="0" b="0"/>
       </a:fillRef>
-      <a:effectRef idx="0">
+      <a:effectRef idx="1">
         <a:scrgbClr r="0" g="0" b="0"/>
       </a:effectRef>
       <a:fontRef idx="minor">
@@ -8150,13 +8214,13 @@
     <dgm:sp3d/>
     <dgm:txPr/>
     <dgm:style>
-      <a:lnRef idx="2">
+      <a:lnRef idx="3">
         <a:scrgbClr r="0" g="0" b="0"/>
       </a:lnRef>
       <a:fillRef idx="1">
         <a:scrgbClr r="0" g="0" b="0"/>
       </a:fillRef>
-      <a:effectRef idx="0">
+      <a:effectRef idx="1">
         <a:scrgbClr r="0" g="0" b="0"/>
       </a:effectRef>
       <a:fontRef idx="minor">
@@ -8172,13 +8236,13 @@
     <dgm:sp3d/>
     <dgm:txPr/>
     <dgm:style>
-      <a:lnRef idx="2">
+      <a:lnRef idx="3">
         <a:scrgbClr r="0" g="0" b="0"/>
       </a:lnRef>
       <a:fillRef idx="1">
         <a:scrgbClr r="0" g="0" b="0"/>
       </a:fillRef>
-      <a:effectRef idx="0">
+      <a:effectRef idx="1">
         <a:scrgbClr r="0" g="0" b="0"/>
       </a:effectRef>
       <a:fontRef idx="minor">
@@ -8194,13 +8258,13 @@
     <dgm:sp3d/>
     <dgm:txPr/>
     <dgm:style>
-      <a:lnRef idx="2">
+      <a:lnRef idx="3">
         <a:scrgbClr r="0" g="0" b="0"/>
       </a:lnRef>
       <a:fillRef idx="1">
         <a:scrgbClr r="0" g="0" b="0"/>
       </a:fillRef>
-      <a:effectRef idx="0">
+      <a:effectRef idx="1">
         <a:scrgbClr r="0" g="0" b="0"/>
       </a:effectRef>
       <a:fontRef idx="minor">
@@ -8216,13 +8280,13 @@
     <dgm:sp3d/>
     <dgm:txPr/>
     <dgm:style>
-      <a:lnRef idx="2">
+      <a:lnRef idx="3">
         <a:scrgbClr r="0" g="0" b="0"/>
       </a:lnRef>
       <a:fillRef idx="1">
         <a:scrgbClr r="0" g="0" b="0"/>
       </a:fillRef>
-      <a:effectRef idx="0">
+      <a:effectRef idx="1">
         <a:scrgbClr r="0" g="0" b="0"/>
       </a:effectRef>
       <a:fontRef idx="minor">
@@ -8678,13 +8742,13 @@
     <dgm:sp3d/>
     <dgm:txPr/>
     <dgm:style>
-      <a:lnRef idx="2">
+      <a:lnRef idx="3">
         <a:scrgbClr r="0" g="0" b="0"/>
       </a:lnRef>
       <a:fillRef idx="1">
         <a:scrgbClr r="0" g="0" b="0"/>
       </a:fillRef>
-      <a:effectRef idx="0">
+      <a:effectRef idx="1">
         <a:scrgbClr r="0" g="0" b="0"/>
       </a:effectRef>
       <a:fontRef idx="minor"/>
@@ -14239,7 +14303,7 @@
           <a:lstStyle/>
           <a:p>
             <a:r>
-              <a:rPr lang="en-US" sz="1400" b="1" dirty="0" err="1" smtClean="0">
+              <a:rPr lang="en-US" sz="1400" b="1" dirty="0" smtClean="0">
                 <a:latin typeface="Arial Narrow" panose="020B0606020202030204" pitchFamily="34" charset="0"/>
                 <a:cs typeface="Arial" panose="020B0604020202020204" pitchFamily="34" charset="0"/>
               </a:rPr>
@@ -14313,16 +14377,12 @@
           <a:p>
             <a:pPr algn="ctr"/>
             <a:r>
-              <a:rPr lang="en-US" sz="1200" dirty="0" err="1" smtClean="0">
+              <a:rPr lang="en-US" sz="1200" dirty="0" smtClean="0">
                 <a:latin typeface="Arial Narrow" panose="020B0606020202030204" pitchFamily="34" charset="0"/>
                 <a:cs typeface="Arial" panose="020B0604020202020204" pitchFamily="34" charset="0"/>
               </a:rPr>
               <a:t>eventID|eventTitle</a:t>
             </a:r>
-            <a:endParaRPr lang="en-US" sz="1200" dirty="0" smtClean="0">
-              <a:latin typeface="Arial Narrow" panose="020B0606020202030204" pitchFamily="34" charset="0"/>
-              <a:cs typeface="Arial" panose="020B0604020202020204" pitchFamily="34" charset="0"/>
-            </a:endParaRPr>
           </a:p>
           <a:p>
             <a:pPr algn="ctr"/>
@@ -14331,21 +14391,7 @@
                 <a:latin typeface="Arial Narrow" panose="020B0606020202030204" pitchFamily="34" charset="0"/>
                 <a:cs typeface="Arial" panose="020B0604020202020204" pitchFamily="34" charset="0"/>
               </a:rPr>
-              <a:t>|</a:t>
-            </a:r>
-            <a:r>
-              <a:rPr lang="en-US" sz="1200" dirty="0" err="1" smtClean="0">
-                <a:latin typeface="Arial Narrow" panose="020B0606020202030204" pitchFamily="34" charset="0"/>
-                <a:cs typeface="Arial" panose="020B0604020202020204" pitchFamily="34" charset="0"/>
-              </a:rPr>
-              <a:t>Agent|Location</a:t>
-            </a:r>
-            <a:r>
-              <a:rPr lang="en-US" sz="1200" dirty="0" smtClean="0">
-                <a:latin typeface="Arial Narrow" panose="020B0606020202030204" pitchFamily="34" charset="0"/>
-                <a:cs typeface="Arial" panose="020B0604020202020204" pitchFamily="34" charset="0"/>
-              </a:rPr>
-              <a:t>|</a:t>
+              <a:t>|Agent|Location|</a:t>
             </a:r>
           </a:p>
           <a:p>
@@ -15981,7 +16027,7 @@
           <a:lstStyle/>
           <a:p>
             <a:r>
-              <a:rPr lang="en-US" sz="1400" b="1" dirty="0" err="1" smtClean="0">
+              <a:rPr lang="en-US" sz="1400" b="1" dirty="0" smtClean="0">
                 <a:latin typeface="Arial Narrow" panose="020B0606020202030204" pitchFamily="34" charset="0"/>
                 <a:cs typeface="Arial" panose="020B0604020202020204" pitchFamily="34" charset="0"/>
               </a:rPr>
@@ -16055,16 +16101,12 @@
           <a:p>
             <a:pPr algn="ctr"/>
             <a:r>
-              <a:rPr lang="en-US" sz="1200" dirty="0" err="1" smtClean="0">
+              <a:rPr lang="en-US" sz="1200" dirty="0" smtClean="0">
                 <a:latin typeface="Arial Narrow" panose="020B0606020202030204" pitchFamily="34" charset="0"/>
                 <a:cs typeface="Arial" panose="020B0604020202020204" pitchFamily="34" charset="0"/>
               </a:rPr>
               <a:t>eventID|eventTitle</a:t>
             </a:r>
-            <a:endParaRPr lang="en-US" sz="1200" dirty="0" smtClean="0">
-              <a:latin typeface="Arial Narrow" panose="020B0606020202030204" pitchFamily="34" charset="0"/>
-              <a:cs typeface="Arial" panose="020B0604020202020204" pitchFamily="34" charset="0"/>
-            </a:endParaRPr>
           </a:p>
           <a:p>
             <a:pPr algn="ctr"/>
@@ -16073,21 +16115,7 @@
                 <a:latin typeface="Arial Narrow" panose="020B0606020202030204" pitchFamily="34" charset="0"/>
                 <a:cs typeface="Arial" panose="020B0604020202020204" pitchFamily="34" charset="0"/>
               </a:rPr>
-              <a:t>|</a:t>
-            </a:r>
-            <a:r>
-              <a:rPr lang="en-US" sz="1200" dirty="0" err="1" smtClean="0">
-                <a:latin typeface="Arial Narrow" panose="020B0606020202030204" pitchFamily="34" charset="0"/>
-                <a:cs typeface="Arial" panose="020B0604020202020204" pitchFamily="34" charset="0"/>
-              </a:rPr>
-              <a:t>Agent|Location</a:t>
-            </a:r>
-            <a:r>
-              <a:rPr lang="en-US" sz="1200" dirty="0" smtClean="0">
-                <a:latin typeface="Arial Narrow" panose="020B0606020202030204" pitchFamily="34" charset="0"/>
-                <a:cs typeface="Arial" panose="020B0604020202020204" pitchFamily="34" charset="0"/>
-              </a:rPr>
-              <a:t>|</a:t>
+              <a:t>|Agent|Location|</a:t>
             </a:r>
           </a:p>
           <a:p>
@@ -16964,186 +16992,740 @@
           <a:chExt cx="0" cy="0"/>
         </a:xfrm>
       </p:grpSpPr>
+      <p:sp>
+        <p:nvSpPr>
+          <p:cNvPr id="34" name="Rounded Rectangle 33"/>
+          <p:cNvSpPr/>
+          <p:nvPr/>
+        </p:nvSpPr>
+        <p:spPr>
+          <a:xfrm>
+            <a:off x="1522272" y="3313614"/>
+            <a:ext cx="6093340" cy="1803157"/>
+          </a:xfrm>
+          <a:prstGeom prst="roundRect">
+            <a:avLst/>
+          </a:prstGeom>
+          <a:solidFill>
+            <a:schemeClr val="accent1">
+              <a:lumMod val="20000"/>
+              <a:lumOff val="80000"/>
+            </a:schemeClr>
+          </a:solidFill>
+          <a:ln w="28575">
+            <a:solidFill>
+              <a:schemeClr val="tx2"/>
+            </a:solidFill>
+          </a:ln>
+          <a:scene3d>
+            <a:camera prst="orthographicFront"/>
+            <a:lightRig rig="threePt" dir="t"/>
+          </a:scene3d>
+          <a:sp3d>
+            <a:bevelT prst="angle"/>
+          </a:sp3d>
+        </p:spPr>
+        <p:style>
+          <a:lnRef idx="2">
+            <a:schemeClr val="accent1">
+              <a:shade val="50000"/>
+            </a:schemeClr>
+          </a:lnRef>
+          <a:fillRef idx="1">
+            <a:schemeClr val="accent1"/>
+          </a:fillRef>
+          <a:effectRef idx="0">
+            <a:schemeClr val="accent1"/>
+          </a:effectRef>
+          <a:fontRef idx="minor">
+            <a:schemeClr val="lt1"/>
+          </a:fontRef>
+        </p:style>
+        <p:txBody>
+          <a:bodyPr rtlCol="0" anchor="ctr"/>
+          <a:lstStyle/>
+          <a:p>
+            <a:pPr algn="ctr"/>
+            <a:endParaRPr lang="en-US"/>
+          </a:p>
+        </p:txBody>
+      </p:sp>
+      <p:sp>
+        <p:nvSpPr>
+          <p:cNvPr id="70" name="Snip Diagonal Corner Rectangle 69"/>
+          <p:cNvSpPr/>
+          <p:nvPr/>
+        </p:nvSpPr>
+        <p:spPr>
+          <a:xfrm>
+            <a:off x="7930760" y="3440582"/>
+            <a:ext cx="1124506" cy="1500838"/>
+          </a:xfrm>
+          <a:prstGeom prst="snip2DiagRect">
+            <a:avLst/>
+          </a:prstGeom>
+          <a:solidFill>
+            <a:schemeClr val="bg1"/>
+          </a:solidFill>
+          <a:ln w="28575">
+            <a:solidFill>
+              <a:schemeClr val="tx2"/>
+            </a:solidFill>
+          </a:ln>
+          <a:effectLst>
+            <a:innerShdw blurRad="63500" dist="50800" dir="18900000">
+              <a:prstClr val="black">
+                <a:alpha val="50000"/>
+              </a:prstClr>
+            </a:innerShdw>
+          </a:effectLst>
+        </p:spPr>
+        <p:style>
+          <a:lnRef idx="1">
+            <a:schemeClr val="accent1"/>
+          </a:lnRef>
+          <a:fillRef idx="2">
+            <a:schemeClr val="accent1"/>
+          </a:fillRef>
+          <a:effectRef idx="1">
+            <a:schemeClr val="accent1"/>
+          </a:effectRef>
+          <a:fontRef idx="minor">
+            <a:schemeClr val="dk1"/>
+          </a:fontRef>
+        </p:style>
+        <p:txBody>
+          <a:bodyPr rtlCol="0" anchor="ctr"/>
+          <a:lstStyle/>
+          <a:p>
+            <a:pPr algn="ctr"/>
+            <a:endParaRPr lang="en-US"/>
+          </a:p>
+        </p:txBody>
+      </p:sp>
+      <p:sp>
+        <p:nvSpPr>
+          <p:cNvPr id="69" name="Snip Diagonal Corner Rectangle 68"/>
+          <p:cNvSpPr/>
+          <p:nvPr/>
+        </p:nvSpPr>
+        <p:spPr>
+          <a:xfrm>
+            <a:off x="68463" y="3440582"/>
+            <a:ext cx="1166672" cy="1500838"/>
+          </a:xfrm>
+          <a:prstGeom prst="snip2DiagRect">
+            <a:avLst/>
+          </a:prstGeom>
+          <a:solidFill>
+            <a:schemeClr val="bg1"/>
+          </a:solidFill>
+          <a:ln w="28575">
+            <a:solidFill>
+              <a:schemeClr val="tx2"/>
+            </a:solidFill>
+          </a:ln>
+          <a:effectLst>
+            <a:innerShdw blurRad="63500" dist="50800" dir="18900000">
+              <a:prstClr val="black">
+                <a:alpha val="50000"/>
+              </a:prstClr>
+            </a:innerShdw>
+          </a:effectLst>
+        </p:spPr>
+        <p:style>
+          <a:lnRef idx="1">
+            <a:schemeClr val="accent1"/>
+          </a:lnRef>
+          <a:fillRef idx="2">
+            <a:schemeClr val="accent1"/>
+          </a:fillRef>
+          <a:effectRef idx="1">
+            <a:schemeClr val="accent1"/>
+          </a:effectRef>
+          <a:fontRef idx="minor">
+            <a:schemeClr val="dk1"/>
+          </a:fontRef>
+        </p:style>
+        <p:txBody>
+          <a:bodyPr rtlCol="0" anchor="ctr"/>
+          <a:lstStyle/>
+          <a:p>
+            <a:pPr algn="ctr"/>
+            <a:endParaRPr lang="en-US"/>
+          </a:p>
+        </p:txBody>
+      </p:sp>
+      <p:sp>
+        <p:nvSpPr>
+          <p:cNvPr id="4" name="Flowchart: Magnetic Disk 3"/>
+          <p:cNvSpPr/>
+          <p:nvPr/>
+        </p:nvSpPr>
+        <p:spPr>
+          <a:xfrm>
+            <a:off x="2168405" y="768948"/>
+            <a:ext cx="1296144" cy="1482951"/>
+          </a:xfrm>
+          <a:prstGeom prst="flowChartMagneticDisk">
+            <a:avLst/>
+          </a:prstGeom>
+          <a:solidFill>
+            <a:schemeClr val="bg1"/>
+          </a:solidFill>
+          <a:ln w="28575">
+            <a:solidFill>
+              <a:schemeClr val="tx2"/>
+            </a:solidFill>
+          </a:ln>
+        </p:spPr>
+        <p:style>
+          <a:lnRef idx="1">
+            <a:schemeClr val="accent1"/>
+          </a:lnRef>
+          <a:fillRef idx="2">
+            <a:schemeClr val="accent1"/>
+          </a:fillRef>
+          <a:effectRef idx="1">
+            <a:schemeClr val="accent1"/>
+          </a:effectRef>
+          <a:fontRef idx="minor">
+            <a:schemeClr val="dk1"/>
+          </a:fontRef>
+        </p:style>
+        <p:txBody>
+          <a:bodyPr rtlCol="0" anchor="ctr"/>
+          <a:lstStyle/>
+          <a:p>
+            <a:pPr algn="ctr"/>
+            <a:endParaRPr lang="en-US"/>
+          </a:p>
+        </p:txBody>
+      </p:sp>
+      <p:sp>
+        <p:nvSpPr>
+          <p:cNvPr id="6" name="Snip Single Corner Rectangle 5"/>
+          <p:cNvSpPr/>
+          <p:nvPr/>
+        </p:nvSpPr>
+        <p:spPr>
+          <a:xfrm rot="10800000">
+            <a:off x="6572228" y="771832"/>
+            <a:ext cx="1472711" cy="1482951"/>
+          </a:xfrm>
+          <a:prstGeom prst="snip1Rect">
+            <a:avLst/>
+          </a:prstGeom>
+          <a:solidFill>
+            <a:schemeClr val="bg1"/>
+          </a:solidFill>
+          <a:ln w="28575">
+            <a:solidFill>
+              <a:schemeClr val="tx2"/>
+            </a:solidFill>
+          </a:ln>
+        </p:spPr>
+        <p:style>
+          <a:lnRef idx="1">
+            <a:schemeClr val="accent1"/>
+          </a:lnRef>
+          <a:fillRef idx="2">
+            <a:schemeClr val="accent1"/>
+          </a:fillRef>
+          <a:effectRef idx="1">
+            <a:schemeClr val="accent1"/>
+          </a:effectRef>
+          <a:fontRef idx="minor">
+            <a:schemeClr val="dk1"/>
+          </a:fontRef>
+        </p:style>
+        <p:txBody>
+          <a:bodyPr rtlCol="0" anchor="ctr"/>
+          <a:lstStyle/>
+          <a:p>
+            <a:pPr algn="ctr"/>
+            <a:endParaRPr lang="en-US"/>
+          </a:p>
+        </p:txBody>
+      </p:sp>
+      <p:cxnSp>
+        <p:nvCxnSpPr>
+          <p:cNvPr id="17" name="Straight Arrow Connector 16"/>
+          <p:cNvCxnSpPr/>
+          <p:nvPr/>
+        </p:nvCxnSpPr>
+        <p:spPr>
+          <a:xfrm>
+            <a:off x="5596667" y="1497051"/>
+            <a:ext cx="975561" cy="0"/>
+          </a:xfrm>
+          <a:prstGeom prst="straightConnector1">
+            <a:avLst/>
+          </a:prstGeom>
+          <a:ln w="19050">
+            <a:tailEnd type="arrow"/>
+          </a:ln>
+        </p:spPr>
+        <p:style>
+          <a:lnRef idx="1">
+            <a:schemeClr val="dk1"/>
+          </a:lnRef>
+          <a:fillRef idx="0">
+            <a:schemeClr val="dk1"/>
+          </a:fillRef>
+          <a:effectRef idx="0">
+            <a:schemeClr val="dk1"/>
+          </a:effectRef>
+          <a:fontRef idx="minor">
+            <a:schemeClr val="tx1"/>
+          </a:fontRef>
+        </p:style>
+      </p:cxnSp>
+      <p:sp>
+        <p:nvSpPr>
+          <p:cNvPr id="40" name="TextBox 39"/>
+          <p:cNvSpPr txBox="1"/>
+          <p:nvPr/>
+        </p:nvSpPr>
+        <p:spPr>
+          <a:xfrm>
+            <a:off x="2273550" y="1327220"/>
+            <a:ext cx="1343489" cy="307777"/>
+          </a:xfrm>
+          <a:prstGeom prst="rect">
+            <a:avLst/>
+          </a:prstGeom>
+          <a:noFill/>
+        </p:spPr>
+        <p:txBody>
+          <a:bodyPr wrap="square" rtlCol="0">
+            <a:spAutoFit/>
+          </a:bodyPr>
+          <a:lstStyle/>
+          <a:p>
+            <a:r>
+              <a:rPr lang="en-US" sz="1400" dirty="0" smtClean="0">
+                <a:latin typeface="+mj-lt"/>
+                <a:cs typeface="Arial" panose="020B0604020202020204" pitchFamily="34" charset="0"/>
+              </a:rPr>
+              <a:t>EventMedia</a:t>
+            </a:r>
+            <a:endParaRPr lang="en-US" sz="1400" dirty="0">
+              <a:latin typeface="+mj-lt"/>
+              <a:cs typeface="Arial" panose="020B0604020202020204" pitchFamily="34" charset="0"/>
+            </a:endParaRPr>
+          </a:p>
+        </p:txBody>
+      </p:sp>
+      <p:sp>
+        <p:nvSpPr>
+          <p:cNvPr id="42" name="TextBox 41"/>
+          <p:cNvSpPr txBox="1"/>
+          <p:nvPr/>
+        </p:nvSpPr>
+        <p:spPr>
+          <a:xfrm>
+            <a:off x="6525866" y="1390894"/>
+            <a:ext cx="1565433" cy="646331"/>
+          </a:xfrm>
+          <a:prstGeom prst="rect">
+            <a:avLst/>
+          </a:prstGeom>
+          <a:noFill/>
+        </p:spPr>
+        <p:txBody>
+          <a:bodyPr wrap="square" rtlCol="0">
+            <a:spAutoFit/>
+          </a:bodyPr>
+          <a:lstStyle/>
+          <a:p>
+            <a:pPr algn="ctr"/>
+            <a:r>
+              <a:rPr lang="en-US" sz="1200" dirty="0" smtClean="0">
+                <a:cs typeface="Arial" panose="020B0604020202020204" pitchFamily="34" charset="0"/>
+              </a:rPr>
+              <a:t>eventID|eventTitle</a:t>
+            </a:r>
+          </a:p>
+          <a:p>
+            <a:pPr algn="ctr"/>
+            <a:r>
+              <a:rPr lang="en-US" sz="1200" dirty="0" smtClean="0">
+                <a:cs typeface="Arial" panose="020B0604020202020204" pitchFamily="34" charset="0"/>
+              </a:rPr>
+              <a:t>|Agent|Location|</a:t>
+            </a:r>
+          </a:p>
+          <a:p>
+            <a:pPr algn="ctr"/>
+            <a:r>
+              <a:rPr lang="en-US" sz="1200" dirty="0" smtClean="0">
+                <a:cs typeface="Arial" panose="020B0604020202020204" pitchFamily="34" charset="0"/>
+              </a:rPr>
+              <a:t>Category|URI</a:t>
+            </a:r>
+            <a:endParaRPr lang="en-US" sz="1200" dirty="0">
+              <a:cs typeface="Arial" panose="020B0604020202020204" pitchFamily="34" charset="0"/>
+            </a:endParaRPr>
+          </a:p>
+        </p:txBody>
+      </p:sp>
+      <p:sp>
+        <p:nvSpPr>
+          <p:cNvPr id="45" name="TextBox 44"/>
+          <p:cNvSpPr txBox="1"/>
+          <p:nvPr/>
+        </p:nvSpPr>
+        <p:spPr>
+          <a:xfrm>
+            <a:off x="6507123" y="883950"/>
+            <a:ext cx="1584176" cy="307777"/>
+          </a:xfrm>
+          <a:prstGeom prst="rect">
+            <a:avLst/>
+          </a:prstGeom>
+          <a:noFill/>
+        </p:spPr>
+        <p:txBody>
+          <a:bodyPr wrap="square" rtlCol="0">
+            <a:spAutoFit/>
+          </a:bodyPr>
+          <a:lstStyle/>
+          <a:p>
+            <a:pPr algn="ctr"/>
+            <a:r>
+              <a:rPr lang="en-US" sz="1400" b="1" i="1" dirty="0" smtClean="0">
+                <a:latin typeface="Arial Narrow" panose="020B0606020202030204" pitchFamily="34" charset="0"/>
+                <a:cs typeface="Arial" panose="020B0604020202020204" pitchFamily="34" charset="0"/>
+              </a:rPr>
+              <a:t>Indexer of Events</a:t>
+            </a:r>
+            <a:endParaRPr lang="en-US" sz="1400" b="1" i="1" dirty="0">
+              <a:latin typeface="Arial Narrow" panose="020B0606020202030204" pitchFamily="34" charset="0"/>
+              <a:cs typeface="Arial" panose="020B0604020202020204" pitchFamily="34" charset="0"/>
+            </a:endParaRPr>
+          </a:p>
+        </p:txBody>
+      </p:sp>
+      <p:sp>
+        <p:nvSpPr>
+          <p:cNvPr id="56" name="TextBox 55"/>
+          <p:cNvSpPr txBox="1"/>
+          <p:nvPr/>
+        </p:nvSpPr>
+        <p:spPr>
+          <a:xfrm>
+            <a:off x="39731" y="3684144"/>
+            <a:ext cx="1224136" cy="1107996"/>
+          </a:xfrm>
+          <a:prstGeom prst="rect">
+            <a:avLst/>
+          </a:prstGeom>
+          <a:noFill/>
+        </p:spPr>
+        <p:txBody>
+          <a:bodyPr wrap="square" rtlCol="0">
+            <a:spAutoFit/>
+          </a:bodyPr>
+          <a:lstStyle/>
+          <a:p>
+            <a:pPr algn="ctr"/>
+            <a:r>
+              <a:rPr lang="en-US" sz="1100" i="1" dirty="0" smtClean="0"/>
+              <a:t>“Insomniac presents &lt;EVENT&gt;Volume Sundays&lt;/EVENT&gt; featuring Zeds Dead…”</a:t>
+            </a:r>
+            <a:endParaRPr lang="en-US" sz="1100" i="1" dirty="0"/>
+          </a:p>
+        </p:txBody>
+      </p:sp>
+      <p:sp>
+        <p:nvSpPr>
+          <p:cNvPr id="57" name="TextBox 56"/>
+          <p:cNvSpPr txBox="1"/>
+          <p:nvPr/>
+        </p:nvSpPr>
+        <p:spPr>
+          <a:xfrm>
+            <a:off x="7863668" y="3830473"/>
+            <a:ext cx="1224136" cy="769441"/>
+          </a:xfrm>
+          <a:prstGeom prst="rect">
+            <a:avLst/>
+          </a:prstGeom>
+          <a:noFill/>
+        </p:spPr>
+        <p:txBody>
+          <a:bodyPr wrap="square" rtlCol="0">
+            <a:spAutoFit/>
+          </a:bodyPr>
+          <a:lstStyle/>
+          <a:p>
+            <a:pPr algn="ctr"/>
+            <a:r>
+              <a:rPr lang="en-US" sz="1100" i="1" dirty="0" smtClean="0"/>
+              <a:t>“Insomniac presents Volume Sundays featuring Zeds Dead…”</a:t>
+            </a:r>
+            <a:endParaRPr lang="en-US" sz="1100" i="1" dirty="0"/>
+          </a:p>
+        </p:txBody>
+      </p:sp>
+      <p:pic>
+        <p:nvPicPr>
+          <p:cNvPr id="100" name="Picture 99"/>
+          <p:cNvPicPr>
+            <a:picLocks noChangeAspect="1"/>
+          </p:cNvPicPr>
+          <p:nvPr/>
+        </p:nvPicPr>
+        <p:blipFill>
+          <a:blip r:embed="rId3" cstate="print">
+            <a:extLst>
+              <a:ext uri="{28A0092B-C50C-407E-A947-70E740481C1C}">
+                <a14:useLocalDpi xmlns:a14="http://schemas.microsoft.com/office/drawing/2010/main" val="0"/>
+              </a:ext>
+            </a:extLst>
+          </a:blip>
+          <a:stretch>
+            <a:fillRect/>
+          </a:stretch>
+        </p:blipFill>
+        <p:spPr>
+          <a:xfrm>
+            <a:off x="693388" y="1911918"/>
+            <a:ext cx="686112" cy="290911"/>
+          </a:xfrm>
+          <a:prstGeom prst="rect">
+            <a:avLst/>
+          </a:prstGeom>
+        </p:spPr>
+      </p:pic>
+      <p:pic>
+        <p:nvPicPr>
+          <p:cNvPr id="101" name="Picture 100"/>
+          <p:cNvPicPr>
+            <a:picLocks noChangeAspect="1"/>
+          </p:cNvPicPr>
+          <p:nvPr/>
+        </p:nvPicPr>
+        <p:blipFill>
+          <a:blip r:embed="rId4" cstate="print">
+            <a:extLst>
+              <a:ext uri="{28A0092B-C50C-407E-A947-70E740481C1C}">
+                <a14:useLocalDpi xmlns:a14="http://schemas.microsoft.com/office/drawing/2010/main" val="0"/>
+              </a:ext>
+            </a:extLst>
+          </a:blip>
+          <a:stretch>
+            <a:fillRect/>
+          </a:stretch>
+        </p:blipFill>
+        <p:spPr>
+          <a:xfrm>
+            <a:off x="707227" y="1319306"/>
+            <a:ext cx="620692" cy="263890"/>
+          </a:xfrm>
+          <a:prstGeom prst="rect">
+            <a:avLst/>
+          </a:prstGeom>
+        </p:spPr>
+      </p:pic>
+      <p:pic>
+        <p:nvPicPr>
+          <p:cNvPr id="102" name="Picture 101"/>
+          <p:cNvPicPr>
+            <a:picLocks noChangeAspect="1"/>
+          </p:cNvPicPr>
+          <p:nvPr/>
+        </p:nvPicPr>
+        <p:blipFill>
+          <a:blip r:embed="rId5" cstate="print">
+            <a:extLst>
+              <a:ext uri="{28A0092B-C50C-407E-A947-70E740481C1C}">
+                <a14:useLocalDpi xmlns:a14="http://schemas.microsoft.com/office/drawing/2010/main" val="0"/>
+              </a:ext>
+            </a:extLst>
+          </a:blip>
+          <a:stretch>
+            <a:fillRect/>
+          </a:stretch>
+        </p:blipFill>
+        <p:spPr>
+          <a:xfrm>
+            <a:off x="718864" y="1608952"/>
+            <a:ext cx="609055" cy="322609"/>
+          </a:xfrm>
+          <a:prstGeom prst="rect">
+            <a:avLst/>
+          </a:prstGeom>
+        </p:spPr>
+      </p:pic>
+      <p:pic>
+        <p:nvPicPr>
+          <p:cNvPr id="103" name="Picture 102"/>
+          <p:cNvPicPr>
+            <a:picLocks noChangeAspect="1"/>
+          </p:cNvPicPr>
+          <p:nvPr/>
+        </p:nvPicPr>
+        <p:blipFill>
+          <a:blip r:embed="rId6" cstate="print">
+            <a:extLst>
+              <a:ext uri="{28A0092B-C50C-407E-A947-70E740481C1C}">
+                <a14:useLocalDpi xmlns:a14="http://schemas.microsoft.com/office/drawing/2010/main" val="0"/>
+              </a:ext>
+            </a:extLst>
+          </a:blip>
+          <a:stretch>
+            <a:fillRect/>
+          </a:stretch>
+        </p:blipFill>
+        <p:spPr>
+          <a:xfrm>
+            <a:off x="718864" y="1039582"/>
+            <a:ext cx="609055" cy="233946"/>
+          </a:xfrm>
+          <a:prstGeom prst="rect">
+            <a:avLst/>
+          </a:prstGeom>
+        </p:spPr>
+      </p:pic>
+      <p:cxnSp>
+        <p:nvCxnSpPr>
+          <p:cNvPr id="105" name="Straight Connector 104"/>
+          <p:cNvCxnSpPr>
+            <a:endCxn id="4" idx="2"/>
+          </p:cNvCxnSpPr>
+          <p:nvPr/>
+        </p:nvCxnSpPr>
+        <p:spPr>
+          <a:xfrm flipV="1">
+            <a:off x="1379500" y="1510424"/>
+            <a:ext cx="788905" cy="1229"/>
+          </a:xfrm>
+          <a:prstGeom prst="line">
+            <a:avLst/>
+          </a:prstGeom>
+          <a:ln w="19050">
+            <a:prstDash val="sysDash"/>
+          </a:ln>
+        </p:spPr>
+        <p:style>
+          <a:lnRef idx="1">
+            <a:schemeClr val="dk1"/>
+          </a:lnRef>
+          <a:fillRef idx="0">
+            <a:schemeClr val="dk1"/>
+          </a:fillRef>
+          <a:effectRef idx="0">
+            <a:schemeClr val="dk1"/>
+          </a:effectRef>
+          <a:fontRef idx="minor">
+            <a:schemeClr val="tx1"/>
+          </a:fontRef>
+        </p:style>
+      </p:cxnSp>
+      <p:sp>
+        <p:nvSpPr>
+          <p:cNvPr id="106" name="TextBox 105"/>
+          <p:cNvSpPr txBox="1"/>
+          <p:nvPr/>
+        </p:nvSpPr>
+        <p:spPr>
+          <a:xfrm>
+            <a:off x="1122829" y="1069601"/>
+            <a:ext cx="1255104" cy="430887"/>
+          </a:xfrm>
+          <a:prstGeom prst="rect">
+            <a:avLst/>
+          </a:prstGeom>
+          <a:noFill/>
+        </p:spPr>
+        <p:txBody>
+          <a:bodyPr wrap="square" rtlCol="0">
+            <a:spAutoFit/>
+          </a:bodyPr>
+          <a:lstStyle/>
+          <a:p>
+            <a:pPr algn="ctr"/>
+            <a:r>
+              <a:rPr lang="en-US" sz="1100" b="1" i="1" dirty="0" smtClean="0">
+                <a:latin typeface="Arial Narrow" panose="020B0606020202030204" pitchFamily="34" charset="0"/>
+              </a:rPr>
+              <a:t>Live</a:t>
+            </a:r>
+          </a:p>
+          <a:p>
+            <a:pPr algn="ctr"/>
+            <a:r>
+              <a:rPr lang="en-US" sz="1100" b="1" i="1" dirty="0" smtClean="0">
+                <a:latin typeface="Arial Narrow" panose="020B0606020202030204" pitchFamily="34" charset="0"/>
+              </a:rPr>
+              <a:t>Social</a:t>
+            </a:r>
+            <a:r>
+              <a:rPr lang="en-US" sz="1100" b="1" i="1" dirty="0" smtClean="0">
+                <a:latin typeface="Arial Narrow" panose="020B0606020202030204" pitchFamily="34" charset="0"/>
+              </a:rPr>
+              <a:t> </a:t>
+            </a:r>
+            <a:r>
+              <a:rPr lang="en-US" sz="1100" b="1" i="1" dirty="0" smtClean="0">
+                <a:latin typeface="Arial Narrow" panose="020B0606020202030204" pitchFamily="34" charset="0"/>
+              </a:rPr>
+              <a:t>Stream</a:t>
+            </a:r>
+            <a:endParaRPr lang="en-US" sz="1100" b="1" i="1" dirty="0">
+              <a:latin typeface="Arial Narrow" panose="020B0606020202030204" pitchFamily="34" charset="0"/>
+            </a:endParaRPr>
+          </a:p>
+        </p:txBody>
+      </p:sp>
+      <p:graphicFrame>
+        <p:nvGraphicFramePr>
+          <p:cNvPr id="36" name="Diagram 35"/>
+          <p:cNvGraphicFramePr/>
+          <p:nvPr>
+            <p:extLst>
+              <p:ext uri="{D42A27DB-BD31-4B8C-83A1-F6EECF244321}">
+                <p14:modId xmlns:p14="http://schemas.microsoft.com/office/powerpoint/2010/main" val="598760188"/>
+              </p:ext>
+            </p:extLst>
+          </p:nvPr>
+        </p:nvGraphicFramePr>
+        <p:xfrm>
+          <a:off x="1622870" y="3074650"/>
+          <a:ext cx="5894848" cy="2192715"/>
+        </p:xfrm>
+        <a:graphic>
+          <a:graphicData uri="http://schemas.openxmlformats.org/drawingml/2006/diagram">
+            <dgm:relIds xmlns:dgm="http://schemas.openxmlformats.org/drawingml/2006/diagram" xmlns:r="http://schemas.openxmlformats.org/officeDocument/2006/relationships" r:dm="rId7" r:lo="rId8" r:qs="rId9" r:cs="rId10"/>
+          </a:graphicData>
+        </a:graphic>
+      </p:graphicFrame>
       <p:grpSp>
         <p:nvGrpSpPr>
-          <p:cNvPr id="83" name="Group 82"/>
+          <p:cNvPr id="60" name="Group 59"/>
           <p:cNvGrpSpPr/>
           <p:nvPr/>
         </p:nvGrpSpPr>
         <p:grpSpPr>
           <a:xfrm>
-            <a:off x="323528" y="1452499"/>
-            <a:ext cx="8687821" cy="4138985"/>
-            <a:chOff x="44378" y="1842770"/>
-            <a:chExt cx="8687821" cy="4138985"/>
+            <a:off x="5228982" y="2271442"/>
+            <a:ext cx="2070229" cy="1404368"/>
+            <a:chOff x="4989752" y="3326953"/>
+            <a:chExt cx="1710929" cy="1104510"/>
           </a:xfrm>
         </p:grpSpPr>
-        <p:sp>
-          <p:nvSpPr>
-            <p:cNvPr id="70" name="Snip Diagonal Corner Rectangle 69"/>
-            <p:cNvSpPr/>
-            <p:nvPr/>
-          </p:nvSpPr>
-          <p:spPr>
-            <a:xfrm>
-              <a:off x="7522858" y="4178798"/>
-              <a:ext cx="1124506" cy="1500838"/>
-            </a:xfrm>
-            <a:prstGeom prst="snip2DiagRect">
-              <a:avLst/>
-            </a:prstGeom>
-            <a:ln/>
-          </p:spPr>
-          <p:style>
-            <a:lnRef idx="2">
-              <a:schemeClr val="accent6"/>
-            </a:lnRef>
-            <a:fillRef idx="1">
-              <a:schemeClr val="lt1"/>
-            </a:fillRef>
-            <a:effectRef idx="0">
-              <a:schemeClr val="accent6"/>
-            </a:effectRef>
-            <a:fontRef idx="minor">
-              <a:schemeClr val="dk1"/>
-            </a:fontRef>
-          </p:style>
-          <p:txBody>
-            <a:bodyPr rtlCol="0" anchor="ctr"/>
-            <a:lstStyle/>
-            <a:p>
-              <a:pPr algn="ctr"/>
-              <a:endParaRPr lang="en-US"/>
-            </a:p>
-          </p:txBody>
-        </p:sp>
-        <p:sp>
-          <p:nvSpPr>
-            <p:cNvPr id="69" name="Snip Diagonal Corner Rectangle 68"/>
-            <p:cNvSpPr/>
-            <p:nvPr/>
-          </p:nvSpPr>
-          <p:spPr>
-            <a:xfrm>
-              <a:off x="107503" y="4160410"/>
-              <a:ext cx="1076678" cy="1500838"/>
-            </a:xfrm>
-            <a:prstGeom prst="snip2DiagRect">
-              <a:avLst/>
-            </a:prstGeom>
-            <a:ln/>
-          </p:spPr>
-          <p:style>
-            <a:lnRef idx="2">
-              <a:schemeClr val="accent4"/>
-            </a:lnRef>
-            <a:fillRef idx="1">
-              <a:schemeClr val="lt1"/>
-            </a:fillRef>
-            <a:effectRef idx="0">
-              <a:schemeClr val="accent4"/>
-            </a:effectRef>
-            <a:fontRef idx="minor">
-              <a:schemeClr val="dk1"/>
-            </a:fontRef>
-          </p:style>
-          <p:txBody>
-            <a:bodyPr rtlCol="0" anchor="ctr"/>
-            <a:lstStyle/>
-            <a:p>
-              <a:pPr algn="ctr"/>
-              <a:endParaRPr lang="en-US"/>
-            </a:p>
-          </p:txBody>
-        </p:sp>
-        <p:sp>
-          <p:nvSpPr>
-            <p:cNvPr id="4" name="Flowchart: Magnetic Disk 3"/>
-            <p:cNvSpPr/>
-            <p:nvPr/>
-          </p:nvSpPr>
-          <p:spPr>
-            <a:xfrm>
-              <a:off x="1384906" y="1842770"/>
-              <a:ext cx="1296144" cy="1482951"/>
-            </a:xfrm>
-            <a:prstGeom prst="flowChartMagneticDisk">
-              <a:avLst/>
-            </a:prstGeom>
-            <a:ln/>
-          </p:spPr>
-          <p:style>
-            <a:lnRef idx="2">
-              <a:schemeClr val="accent2"/>
-            </a:lnRef>
-            <a:fillRef idx="1">
-              <a:schemeClr val="lt1"/>
-            </a:fillRef>
-            <a:effectRef idx="0">
-              <a:schemeClr val="accent2"/>
-            </a:effectRef>
-            <a:fontRef idx="minor">
-              <a:schemeClr val="dk1"/>
-            </a:fontRef>
-          </p:style>
-          <p:txBody>
-            <a:bodyPr rtlCol="0" anchor="ctr"/>
-            <a:lstStyle/>
-            <a:p>
-              <a:pPr algn="ctr"/>
-              <a:endParaRPr lang="en-US"/>
-            </a:p>
-          </p:txBody>
-        </p:sp>
-        <p:sp>
-          <p:nvSpPr>
-            <p:cNvPr id="6" name="Snip Single Corner Rectangle 5"/>
-            <p:cNvSpPr/>
-            <p:nvPr/>
-          </p:nvSpPr>
-          <p:spPr>
-            <a:xfrm rot="10800000">
-              <a:off x="5960867" y="1844000"/>
-              <a:ext cx="1472711" cy="1482951"/>
-            </a:xfrm>
-            <a:prstGeom prst="snip1Rect">
-              <a:avLst/>
-            </a:prstGeom>
-            <a:ln/>
-          </p:spPr>
-          <p:style>
-            <a:lnRef idx="2">
-              <a:schemeClr val="accent3"/>
-            </a:lnRef>
-            <a:fillRef idx="1">
-              <a:schemeClr val="lt1"/>
-            </a:fillRef>
-            <a:effectRef idx="0">
-              <a:schemeClr val="accent3"/>
-            </a:effectRef>
-            <a:fontRef idx="minor">
-              <a:schemeClr val="dk1"/>
-            </a:fontRef>
-          </p:style>
-          <p:txBody>
-            <a:bodyPr rtlCol="0" anchor="ctr"/>
-            <a:lstStyle/>
-            <a:p>
-              <a:pPr algn="ctr"/>
-              <a:endParaRPr lang="en-US"/>
-            </a:p>
-          </p:txBody>
-        </p:sp>
         <p:cxnSp>
           <p:nvCxnSpPr>
-            <p:cNvPr id="13" name="Straight Arrow Connector 12"/>
+            <p:cNvPr id="61" name="Straight Arrow Connector 60"/>
             <p:cNvCxnSpPr/>
             <p:nvPr/>
           </p:nvCxnSpPr>
           <p:spPr>
             <a:xfrm>
-              <a:off x="2706701" y="2570873"/>
-              <a:ext cx="1126477" cy="0"/>
+              <a:off x="4989752" y="3717032"/>
+              <a:ext cx="0" cy="714431"/>
             </a:xfrm>
             <a:prstGeom prst="straightConnector1">
               <a:avLst/>
@@ -17172,14 +17754,14 @@
         </p:cxnSp>
         <p:cxnSp>
           <p:nvCxnSpPr>
-            <p:cNvPr id="17" name="Straight Arrow Connector 16"/>
+            <p:cNvPr id="63" name="Straight Arrow Connector 62"/>
             <p:cNvCxnSpPr/>
             <p:nvPr/>
           </p:nvCxnSpPr>
           <p:spPr>
-            <a:xfrm>
-              <a:off x="4985306" y="2570873"/>
-              <a:ext cx="975561" cy="0"/>
+            <a:xfrm flipV="1">
+              <a:off x="6700681" y="3326953"/>
+              <a:ext cx="0" cy="390079"/>
             </a:xfrm>
             <a:prstGeom prst="straightConnector1">
               <a:avLst/>
@@ -17208,426 +17790,14 @@
         </p:cxnSp>
         <p:cxnSp>
           <p:nvCxnSpPr>
-            <p:cNvPr id="25" name="Straight Arrow Connector 24"/>
-            <p:cNvCxnSpPr/>
-            <p:nvPr/>
-          </p:nvCxnSpPr>
-          <p:spPr>
-            <a:xfrm flipH="1" flipV="1">
-              <a:off x="7214606" y="4929217"/>
-              <a:ext cx="308252" cy="1240"/>
-            </a:xfrm>
-            <a:prstGeom prst="straightConnector1">
-              <a:avLst/>
-            </a:prstGeom>
-            <a:ln w="19050">
-              <a:solidFill>
-                <a:schemeClr val="tx1"/>
-              </a:solidFill>
-              <a:tailEnd type="arrow"/>
-            </a:ln>
-          </p:spPr>
-          <p:style>
-            <a:lnRef idx="1">
-              <a:schemeClr val="accent1"/>
-            </a:lnRef>
-            <a:fillRef idx="0">
-              <a:schemeClr val="accent1"/>
-            </a:fillRef>
-            <a:effectRef idx="0">
-              <a:schemeClr val="accent1"/>
-            </a:effectRef>
-            <a:fontRef idx="minor">
-              <a:schemeClr val="tx1"/>
-            </a:fontRef>
-          </p:style>
-        </p:cxnSp>
-        <p:cxnSp>
-          <p:nvCxnSpPr>
-            <p:cNvPr id="33" name="Straight Arrow Connector 32"/>
-            <p:cNvCxnSpPr>
-              <a:stCxn id="36" idx="1"/>
-            </p:cNvCxnSpPr>
-            <p:nvPr/>
-          </p:nvCxnSpPr>
-          <p:spPr>
-            <a:xfrm flipH="1">
-              <a:off x="1184182" y="4885397"/>
-              <a:ext cx="219466" cy="14811"/>
-            </a:xfrm>
-            <a:prstGeom prst="straightConnector1">
-              <a:avLst/>
-            </a:prstGeom>
-            <a:ln w="19050">
-              <a:solidFill>
-                <a:schemeClr val="tx1"/>
-              </a:solidFill>
-              <a:tailEnd type="arrow"/>
-            </a:ln>
-          </p:spPr>
-          <p:style>
-            <a:lnRef idx="1">
-              <a:schemeClr val="accent1"/>
-            </a:lnRef>
-            <a:fillRef idx="0">
-              <a:schemeClr val="accent1"/>
-            </a:fillRef>
-            <a:effectRef idx="0">
-              <a:schemeClr val="accent1"/>
-            </a:effectRef>
-            <a:fontRef idx="minor">
-              <a:schemeClr val="tx1"/>
-            </a:fontRef>
-          </p:style>
-        </p:cxnSp>
-        <p:sp>
-          <p:nvSpPr>
-            <p:cNvPr id="40" name="TextBox 39"/>
-            <p:cNvSpPr txBox="1"/>
-            <p:nvPr/>
-          </p:nvSpPr>
-          <p:spPr>
-            <a:xfrm>
-              <a:off x="1533373" y="2431586"/>
-              <a:ext cx="1343489" cy="307777"/>
-            </a:xfrm>
-            <a:prstGeom prst="rect">
-              <a:avLst/>
-            </a:prstGeom>
-            <a:noFill/>
-          </p:spPr>
-          <p:txBody>
-            <a:bodyPr wrap="square" rtlCol="0">
-              <a:spAutoFit/>
-            </a:bodyPr>
-            <a:lstStyle/>
-            <a:p>
-              <a:r>
-                <a:rPr lang="en-US" sz="1400" b="1" dirty="0" err="1" smtClean="0">
-                  <a:latin typeface="Arial Narrow" panose="020B0606020202030204" pitchFamily="34" charset="0"/>
-                  <a:cs typeface="Arial" panose="020B0604020202020204" pitchFamily="34" charset="0"/>
-                </a:rPr>
-                <a:t>EventMedia</a:t>
-              </a:r>
-              <a:endParaRPr lang="en-US" sz="1400" b="1" dirty="0">
-                <a:latin typeface="Arial Narrow" panose="020B0606020202030204" pitchFamily="34" charset="0"/>
-                <a:cs typeface="Arial" panose="020B0604020202020204" pitchFamily="34" charset="0"/>
-              </a:endParaRPr>
-            </a:p>
-          </p:txBody>
-        </p:sp>
-        <p:sp>
-          <p:nvSpPr>
-            <p:cNvPr id="42" name="TextBox 41"/>
-            <p:cNvSpPr txBox="1"/>
-            <p:nvPr/>
-          </p:nvSpPr>
-          <p:spPr>
-            <a:xfrm>
-              <a:off x="5914505" y="2464716"/>
-              <a:ext cx="1565433" cy="646331"/>
-            </a:xfrm>
-            <a:prstGeom prst="rect">
-              <a:avLst/>
-            </a:prstGeom>
-            <a:noFill/>
-          </p:spPr>
-          <p:txBody>
-            <a:bodyPr wrap="square" rtlCol="0">
-              <a:spAutoFit/>
-            </a:bodyPr>
-            <a:lstStyle/>
-            <a:p>
-              <a:pPr algn="ctr"/>
-              <a:r>
-                <a:rPr lang="en-US" sz="1200" dirty="0" err="1" smtClean="0">
-                  <a:latin typeface="Arial Narrow" panose="020B0606020202030204" pitchFamily="34" charset="0"/>
-                  <a:cs typeface="Arial" panose="020B0604020202020204" pitchFamily="34" charset="0"/>
-                </a:rPr>
-                <a:t>eventID|eventTitle</a:t>
-              </a:r>
-              <a:endParaRPr lang="en-US" sz="1200" dirty="0" smtClean="0">
-                <a:latin typeface="Arial Narrow" panose="020B0606020202030204" pitchFamily="34" charset="0"/>
-                <a:cs typeface="Arial" panose="020B0604020202020204" pitchFamily="34" charset="0"/>
-              </a:endParaRPr>
-            </a:p>
-            <a:p>
-              <a:pPr algn="ctr"/>
-              <a:r>
-                <a:rPr lang="en-US" sz="1200" dirty="0" smtClean="0">
-                  <a:latin typeface="Arial Narrow" panose="020B0606020202030204" pitchFamily="34" charset="0"/>
-                  <a:cs typeface="Arial" panose="020B0604020202020204" pitchFamily="34" charset="0"/>
-                </a:rPr>
-                <a:t>|</a:t>
-              </a:r>
-              <a:r>
-                <a:rPr lang="en-US" sz="1200" dirty="0" err="1" smtClean="0">
-                  <a:latin typeface="Arial Narrow" panose="020B0606020202030204" pitchFamily="34" charset="0"/>
-                  <a:cs typeface="Arial" panose="020B0604020202020204" pitchFamily="34" charset="0"/>
-                </a:rPr>
-                <a:t>Agent|Location</a:t>
-              </a:r>
-              <a:r>
-                <a:rPr lang="en-US" sz="1200" dirty="0" smtClean="0">
-                  <a:latin typeface="Arial Narrow" panose="020B0606020202030204" pitchFamily="34" charset="0"/>
-                  <a:cs typeface="Arial" panose="020B0604020202020204" pitchFamily="34" charset="0"/>
-                </a:rPr>
-                <a:t>|</a:t>
-              </a:r>
-            </a:p>
-            <a:p>
-              <a:pPr algn="ctr"/>
-              <a:r>
-                <a:rPr lang="en-US" sz="1200" dirty="0" smtClean="0">
-                  <a:latin typeface="Arial Narrow" panose="020B0606020202030204" pitchFamily="34" charset="0"/>
-                  <a:cs typeface="Arial" panose="020B0604020202020204" pitchFamily="34" charset="0"/>
-                </a:rPr>
-                <a:t>Category</a:t>
-              </a:r>
-              <a:endParaRPr lang="en-US" sz="1200" dirty="0">
-                <a:latin typeface="Arial Narrow" panose="020B0606020202030204" pitchFamily="34" charset="0"/>
-                <a:cs typeface="Arial" panose="020B0604020202020204" pitchFamily="34" charset="0"/>
-              </a:endParaRPr>
-            </a:p>
-          </p:txBody>
-        </p:sp>
-        <p:sp>
-          <p:nvSpPr>
-            <p:cNvPr id="45" name="TextBox 44"/>
-            <p:cNvSpPr txBox="1"/>
-            <p:nvPr/>
-          </p:nvSpPr>
-          <p:spPr>
-            <a:xfrm>
-              <a:off x="5895762" y="1957772"/>
-              <a:ext cx="1584176" cy="307777"/>
-            </a:xfrm>
-            <a:prstGeom prst="rect">
-              <a:avLst/>
-            </a:prstGeom>
-            <a:noFill/>
-          </p:spPr>
-          <p:txBody>
-            <a:bodyPr wrap="square" rtlCol="0">
-              <a:spAutoFit/>
-            </a:bodyPr>
-            <a:lstStyle/>
-            <a:p>
-              <a:pPr algn="ctr"/>
-              <a:r>
-                <a:rPr lang="en-US" sz="1400" b="1" dirty="0" smtClean="0">
-                  <a:latin typeface="Arial Narrow" panose="020B0606020202030204" pitchFamily="34" charset="0"/>
-                  <a:cs typeface="Arial" panose="020B0604020202020204" pitchFamily="34" charset="0"/>
-                </a:rPr>
-                <a:t>Indexer of Events</a:t>
-              </a:r>
-              <a:endParaRPr lang="en-US" sz="1400" b="1" dirty="0">
-                <a:latin typeface="Arial Narrow" panose="020B0606020202030204" pitchFamily="34" charset="0"/>
-                <a:cs typeface="Arial" panose="020B0604020202020204" pitchFamily="34" charset="0"/>
-              </a:endParaRPr>
-            </a:p>
-          </p:txBody>
-        </p:sp>
-        <p:sp>
-          <p:nvSpPr>
-            <p:cNvPr id="56" name="TextBox 55"/>
-            <p:cNvSpPr txBox="1"/>
-            <p:nvPr/>
-          </p:nvSpPr>
-          <p:spPr>
-            <a:xfrm>
-              <a:off x="44378" y="4380771"/>
-              <a:ext cx="1224136" cy="938719"/>
-            </a:xfrm>
-            <a:prstGeom prst="rect">
-              <a:avLst/>
-            </a:prstGeom>
-            <a:noFill/>
-          </p:spPr>
-          <p:txBody>
-            <a:bodyPr wrap="square" rtlCol="0">
-              <a:spAutoFit/>
-            </a:bodyPr>
-            <a:lstStyle/>
-            <a:p>
-              <a:pPr algn="ctr"/>
-              <a:r>
-                <a:rPr lang="en-US" sz="1100" i="1" dirty="0" smtClean="0">
-                  <a:latin typeface="Arial Narrow" panose="020B0606020202030204" pitchFamily="34" charset="0"/>
-                </a:rPr>
-                <a:t>“Insomniac presents &lt;EVENT&gt;Volume Sundays&lt;/EVENT&gt; featuring Zeds Dead…”</a:t>
-              </a:r>
-              <a:endParaRPr lang="en-US" sz="1100" i="1" dirty="0">
-                <a:latin typeface="Arial Narrow" panose="020B0606020202030204" pitchFamily="34" charset="0"/>
-              </a:endParaRPr>
-            </a:p>
-          </p:txBody>
-        </p:sp>
-        <p:sp>
-          <p:nvSpPr>
-            <p:cNvPr id="57" name="TextBox 56"/>
-            <p:cNvSpPr txBox="1"/>
-            <p:nvPr/>
-          </p:nvSpPr>
-          <p:spPr>
-            <a:xfrm>
-              <a:off x="7508063" y="4510394"/>
-              <a:ext cx="1224136" cy="769441"/>
-            </a:xfrm>
-            <a:prstGeom prst="rect">
-              <a:avLst/>
-            </a:prstGeom>
-            <a:noFill/>
-          </p:spPr>
-          <p:txBody>
-            <a:bodyPr wrap="square" rtlCol="0">
-              <a:spAutoFit/>
-            </a:bodyPr>
-            <a:lstStyle/>
-            <a:p>
-              <a:pPr algn="ctr"/>
-              <a:r>
-                <a:rPr lang="en-US" sz="1100" i="1" dirty="0" smtClean="0">
-                  <a:latin typeface="Arial Narrow" panose="020B0606020202030204" pitchFamily="34" charset="0"/>
-                </a:rPr>
-                <a:t>“Insomniac presents Volume Sundays featuring Zeds Dead…”</a:t>
-              </a:r>
-              <a:endParaRPr lang="en-US" sz="1100" i="1" dirty="0">
-                <a:latin typeface="Arial Narrow" panose="020B0606020202030204" pitchFamily="34" charset="0"/>
-              </a:endParaRPr>
-            </a:p>
-          </p:txBody>
-        </p:sp>
-        <p:pic>
-          <p:nvPicPr>
-            <p:cNvPr id="100" name="Picture 99"/>
-            <p:cNvPicPr>
-              <a:picLocks noChangeAspect="1"/>
-            </p:cNvPicPr>
-            <p:nvPr/>
-          </p:nvPicPr>
-          <p:blipFill>
-            <a:blip r:embed="rId3" cstate="print">
-              <a:extLst>
-                <a:ext uri="{28A0092B-C50C-407E-A947-70E740481C1C}">
-                  <a14:useLocalDpi xmlns:a14="http://schemas.microsoft.com/office/drawing/2010/main" val="0"/>
-                </a:ext>
-              </a:extLst>
-            </a:blip>
-            <a:stretch>
-              <a:fillRect/>
-            </a:stretch>
-          </p:blipFill>
-          <p:spPr>
-            <a:xfrm>
-              <a:off x="82027" y="2985740"/>
-              <a:ext cx="686112" cy="290911"/>
-            </a:xfrm>
-            <a:prstGeom prst="rect">
-              <a:avLst/>
-            </a:prstGeom>
-          </p:spPr>
-        </p:pic>
-        <p:pic>
-          <p:nvPicPr>
-            <p:cNvPr id="101" name="Picture 100"/>
-            <p:cNvPicPr>
-              <a:picLocks noChangeAspect="1"/>
-            </p:cNvPicPr>
-            <p:nvPr/>
-          </p:nvPicPr>
-          <p:blipFill>
-            <a:blip r:embed="rId4" cstate="print">
-              <a:extLst>
-                <a:ext uri="{28A0092B-C50C-407E-A947-70E740481C1C}">
-                  <a14:useLocalDpi xmlns:a14="http://schemas.microsoft.com/office/drawing/2010/main" val="0"/>
-                </a:ext>
-              </a:extLst>
-            </a:blip>
-            <a:stretch>
-              <a:fillRect/>
-            </a:stretch>
-          </p:blipFill>
-          <p:spPr>
-            <a:xfrm>
-              <a:off x="95866" y="2393128"/>
-              <a:ext cx="620692" cy="263890"/>
-            </a:xfrm>
-            <a:prstGeom prst="rect">
-              <a:avLst/>
-            </a:prstGeom>
-          </p:spPr>
-        </p:pic>
-        <p:pic>
-          <p:nvPicPr>
-            <p:cNvPr id="102" name="Picture 101"/>
-            <p:cNvPicPr>
-              <a:picLocks noChangeAspect="1"/>
-            </p:cNvPicPr>
-            <p:nvPr/>
-          </p:nvPicPr>
-          <p:blipFill>
-            <a:blip r:embed="rId5" cstate="print">
-              <a:extLst>
-                <a:ext uri="{28A0092B-C50C-407E-A947-70E740481C1C}">
-                  <a14:useLocalDpi xmlns:a14="http://schemas.microsoft.com/office/drawing/2010/main" val="0"/>
-                </a:ext>
-              </a:extLst>
-            </a:blip>
-            <a:stretch>
-              <a:fillRect/>
-            </a:stretch>
-          </p:blipFill>
-          <p:spPr>
-            <a:xfrm>
-              <a:off x="107503" y="2682774"/>
-              <a:ext cx="609055" cy="322609"/>
-            </a:xfrm>
-            <a:prstGeom prst="rect">
-              <a:avLst/>
-            </a:prstGeom>
-          </p:spPr>
-        </p:pic>
-        <p:pic>
-          <p:nvPicPr>
-            <p:cNvPr id="103" name="Picture 102"/>
-            <p:cNvPicPr>
-              <a:picLocks noChangeAspect="1"/>
-            </p:cNvPicPr>
-            <p:nvPr/>
-          </p:nvPicPr>
-          <p:blipFill>
-            <a:blip r:embed="rId6" cstate="print">
-              <a:extLst>
-                <a:ext uri="{28A0092B-C50C-407E-A947-70E740481C1C}">
-                  <a14:useLocalDpi xmlns:a14="http://schemas.microsoft.com/office/drawing/2010/main" val="0"/>
-                </a:ext>
-              </a:extLst>
-            </a:blip>
-            <a:stretch>
-              <a:fillRect/>
-            </a:stretch>
-          </p:blipFill>
-          <p:spPr>
-            <a:xfrm>
-              <a:off x="107503" y="2113404"/>
-              <a:ext cx="609055" cy="233946"/>
-            </a:xfrm>
-            <a:prstGeom prst="rect">
-              <a:avLst/>
-            </a:prstGeom>
-          </p:spPr>
-        </p:pic>
-        <p:cxnSp>
-          <p:nvCxnSpPr>
-            <p:cNvPr id="105" name="Straight Connector 104"/>
+            <p:cNvPr id="64" name="Straight Connector 63"/>
             <p:cNvCxnSpPr/>
             <p:nvPr/>
           </p:nvCxnSpPr>
           <p:spPr>
             <a:xfrm>
-              <a:off x="768139" y="2585475"/>
-              <a:ext cx="573855" cy="0"/>
+              <a:off x="4989752" y="3717032"/>
+              <a:ext cx="1710929" cy="0"/>
             </a:xfrm>
             <a:prstGeom prst="line">
               <a:avLst/>
@@ -17653,428 +17823,421 @@
             </a:fontRef>
           </p:style>
         </p:cxnSp>
+      </p:grpSp>
+      <p:cxnSp>
+        <p:nvCxnSpPr>
+          <p:cNvPr id="71" name="Straight Arrow Connector 70"/>
+          <p:cNvCxnSpPr/>
+          <p:nvPr/>
+        </p:nvCxnSpPr>
+        <p:spPr>
+          <a:xfrm>
+            <a:off x="3795692" y="2202829"/>
+            <a:ext cx="0" cy="1298179"/>
+          </a:xfrm>
+          <a:prstGeom prst="straightConnector1">
+            <a:avLst/>
+          </a:prstGeom>
+          <a:ln w="19050">
+            <a:solidFill>
+              <a:schemeClr val="tx1"/>
+            </a:solidFill>
+            <a:tailEnd type="arrow"/>
+          </a:ln>
+        </p:spPr>
+        <p:style>
+          <a:lnRef idx="1">
+            <a:schemeClr val="accent1"/>
+          </a:lnRef>
+          <a:fillRef idx="0">
+            <a:schemeClr val="accent1"/>
+          </a:fillRef>
+          <a:effectRef idx="0">
+            <a:schemeClr val="accent1"/>
+          </a:effectRef>
+          <a:fontRef idx="minor">
+            <a:schemeClr val="tx1"/>
+          </a:fontRef>
+        </p:style>
+      </p:cxnSp>
+      <p:cxnSp>
+        <p:nvCxnSpPr>
+          <p:cNvPr id="72" name="Straight Connector 71"/>
+          <p:cNvCxnSpPr/>
+          <p:nvPr/>
+        </p:nvCxnSpPr>
+        <p:spPr>
+          <a:xfrm>
+            <a:off x="3779912" y="2202829"/>
+            <a:ext cx="2115148" cy="0"/>
+          </a:xfrm>
+          <a:prstGeom prst="line">
+            <a:avLst/>
+          </a:prstGeom>
+          <a:ln w="19050">
+            <a:solidFill>
+              <a:schemeClr val="tx1"/>
+            </a:solidFill>
+          </a:ln>
+        </p:spPr>
+        <p:style>
+          <a:lnRef idx="1">
+            <a:schemeClr val="accent1"/>
+          </a:lnRef>
+          <a:fillRef idx="0">
+            <a:schemeClr val="accent1"/>
+          </a:fillRef>
+          <a:effectRef idx="0">
+            <a:schemeClr val="accent1"/>
+          </a:effectRef>
+          <a:fontRef idx="minor">
+            <a:schemeClr val="tx1"/>
+          </a:fontRef>
+        </p:style>
+      </p:cxnSp>
+      <p:cxnSp>
+        <p:nvCxnSpPr>
+          <p:cNvPr id="77" name="Straight Arrow Connector 76"/>
+          <p:cNvCxnSpPr/>
+          <p:nvPr/>
+        </p:nvCxnSpPr>
+        <p:spPr>
+          <a:xfrm>
+            <a:off x="5778777" y="2199917"/>
+            <a:ext cx="970635" cy="1232"/>
+          </a:xfrm>
+          <a:prstGeom prst="straightConnector1">
+            <a:avLst/>
+          </a:prstGeom>
+          <a:ln w="19050">
+            <a:solidFill>
+              <a:schemeClr val="tx1"/>
+            </a:solidFill>
+            <a:tailEnd type="arrow"/>
+          </a:ln>
+        </p:spPr>
+        <p:style>
+          <a:lnRef idx="1">
+            <a:schemeClr val="accent1"/>
+          </a:lnRef>
+          <a:fillRef idx="0">
+            <a:schemeClr val="accent1"/>
+          </a:fillRef>
+          <a:effectRef idx="0">
+            <a:schemeClr val="accent1"/>
+          </a:effectRef>
+          <a:fontRef idx="minor">
+            <a:schemeClr val="tx1"/>
+          </a:fontRef>
+        </p:style>
+      </p:cxnSp>
+      <p:grpSp>
+        <p:nvGrpSpPr>
+          <p:cNvPr id="89" name="Group 88"/>
+          <p:cNvGrpSpPr/>
+          <p:nvPr/>
+        </p:nvGrpSpPr>
+        <p:grpSpPr>
+          <a:xfrm>
+            <a:off x="4444536" y="1288528"/>
+            <a:ext cx="1117597" cy="406508"/>
+            <a:chOff x="4871076" y="418842"/>
+            <a:chExt cx="1022234" cy="406508"/>
+          </a:xfrm>
+        </p:grpSpPr>
         <p:sp>
           <p:nvSpPr>
-            <p:cNvPr id="106" name="TextBox 105"/>
-            <p:cNvSpPr txBox="1"/>
+            <p:cNvPr id="90" name="Rounded Rectangle 89"/>
+            <p:cNvSpPr/>
             <p:nvPr/>
           </p:nvSpPr>
           <p:spPr>
             <a:xfrm>
-              <a:off x="425083" y="2177684"/>
-              <a:ext cx="1224136" cy="369332"/>
+              <a:off x="4871076" y="418842"/>
+              <a:ext cx="1022234" cy="406508"/>
+            </a:xfrm>
+            <a:prstGeom prst="roundRect">
+              <a:avLst>
+                <a:gd name="adj" fmla="val 10000"/>
+              </a:avLst>
+            </a:prstGeom>
+            <a:ln>
+              <a:solidFill>
+                <a:schemeClr val="tx2"/>
+              </a:solidFill>
+            </a:ln>
+          </p:spPr>
+          <p:style>
+            <a:lnRef idx="2">
+              <a:schemeClr val="accent1">
+                <a:shade val="80000"/>
+                <a:hueOff val="0"/>
+                <a:satOff val="0"/>
+                <a:lumOff val="0"/>
+                <a:alphaOff val="0"/>
+              </a:schemeClr>
+            </a:lnRef>
+            <a:fillRef idx="1">
+              <a:schemeClr val="lt1">
+                <a:hueOff val="0"/>
+                <a:satOff val="0"/>
+                <a:lumOff val="0"/>
+                <a:alphaOff val="0"/>
+              </a:schemeClr>
+            </a:fillRef>
+            <a:effectRef idx="0">
+              <a:schemeClr val="lt1">
+                <a:hueOff val="0"/>
+                <a:satOff val="0"/>
+                <a:lumOff val="0"/>
+                <a:alphaOff val="0"/>
+              </a:schemeClr>
+            </a:effectRef>
+            <a:fontRef idx="minor">
+              <a:schemeClr val="dk1">
+                <a:hueOff val="0"/>
+                <a:satOff val="0"/>
+                <a:lumOff val="0"/>
+                <a:alphaOff val="0"/>
+              </a:schemeClr>
+            </a:fontRef>
+          </p:style>
+        </p:sp>
+        <p:sp>
+          <p:nvSpPr>
+            <p:cNvPr id="91" name="Rounded Rectangle 4"/>
+            <p:cNvSpPr/>
+            <p:nvPr/>
+          </p:nvSpPr>
+          <p:spPr>
+            <a:xfrm>
+              <a:off x="4882984" y="430748"/>
+              <a:ext cx="998422" cy="382696"/>
             </a:xfrm>
             <a:prstGeom prst="rect">
               <a:avLst/>
             </a:prstGeom>
-            <a:noFill/>
-          </p:spPr>
-          <p:txBody>
-            <a:bodyPr wrap="square" rtlCol="0">
-              <a:spAutoFit/>
-            </a:bodyPr>
-            <a:lstStyle/>
-            <a:p>
-              <a:pPr algn="ctr"/>
-              <a:r>
-                <a:rPr lang="en-US" sz="900" i="1" dirty="0" smtClean="0">
-                  <a:latin typeface="Arial Narrow" panose="020B0606020202030204" pitchFamily="34" charset="0"/>
-                </a:rPr>
-                <a:t>Live </a:t>
-              </a:r>
-            </a:p>
-            <a:p>
-              <a:pPr algn="ctr"/>
-              <a:r>
-                <a:rPr lang="en-US" sz="900" i="1" dirty="0" smtClean="0">
-                  <a:latin typeface="Arial Narrow" panose="020B0606020202030204" pitchFamily="34" charset="0"/>
-                </a:rPr>
-                <a:t>Data Stream</a:t>
-              </a:r>
-              <a:endParaRPr lang="en-US" sz="900" i="1" dirty="0">
-                <a:latin typeface="Arial Narrow" panose="020B0606020202030204" pitchFamily="34" charset="0"/>
-              </a:endParaRPr>
-            </a:p>
-          </p:txBody>
-        </p:sp>
-        <p:graphicFrame>
-          <p:nvGraphicFramePr>
-            <p:cNvPr id="36" name="Diagram 35"/>
-            <p:cNvGraphicFramePr/>
-            <p:nvPr>
-              <p:extLst>
-                <p:ext uri="{D42A27DB-BD31-4B8C-83A1-F6EECF244321}">
-                  <p14:modId xmlns:p14="http://schemas.microsoft.com/office/powerpoint/2010/main" val="2180093065"/>
-                </p:ext>
-              </p:extLst>
-            </p:nvPr>
-          </p:nvGraphicFramePr>
-          <p:xfrm>
-            <a:off x="1403648" y="3789040"/>
-            <a:ext cx="5894848" cy="2192715"/>
-          </p:xfrm>
-          <a:graphic>
-            <a:graphicData uri="http://schemas.openxmlformats.org/drawingml/2006/diagram">
-              <dgm:relIds xmlns:dgm="http://schemas.openxmlformats.org/drawingml/2006/diagram" xmlns:r="http://schemas.openxmlformats.org/officeDocument/2006/relationships" r:dm="rId7" r:lo="rId8" r:qs="rId9" r:cs="rId10"/>
-            </a:graphicData>
-          </a:graphic>
-        </p:graphicFrame>
-        <p:grpSp>
-          <p:nvGrpSpPr>
-            <p:cNvPr id="60" name="Group 59"/>
-            <p:cNvGrpSpPr/>
-            <p:nvPr/>
-          </p:nvGrpSpPr>
-          <p:grpSpPr>
-            <a:xfrm>
-              <a:off x="4989752" y="3326953"/>
-              <a:ext cx="1710929" cy="1104510"/>
-              <a:chOff x="4989752" y="3326953"/>
-              <a:chExt cx="1710929" cy="1104510"/>
-            </a:xfrm>
-          </p:grpSpPr>
-          <p:cxnSp>
-            <p:nvCxnSpPr>
-              <p:cNvPr id="61" name="Straight Arrow Connector 60"/>
-              <p:cNvCxnSpPr/>
-              <p:nvPr/>
-            </p:nvCxnSpPr>
-            <p:spPr>
-              <a:xfrm>
-                <a:off x="4989752" y="3717032"/>
-                <a:ext cx="0" cy="714431"/>
-              </a:xfrm>
-              <a:prstGeom prst="straightConnector1">
-                <a:avLst/>
-              </a:prstGeom>
-              <a:ln w="28575">
-                <a:solidFill>
-                  <a:srgbClr val="588CF4"/>
-                </a:solidFill>
-                <a:tailEnd type="arrow"/>
-              </a:ln>
-            </p:spPr>
-            <p:style>
-              <a:lnRef idx="1">
-                <a:schemeClr val="accent1"/>
-              </a:lnRef>
-              <a:fillRef idx="0">
-                <a:schemeClr val="accent1"/>
-              </a:fillRef>
-              <a:effectRef idx="0">
-                <a:schemeClr val="accent1"/>
-              </a:effectRef>
-              <a:fontRef idx="minor">
-                <a:schemeClr val="tx1"/>
-              </a:fontRef>
-            </p:style>
-          </p:cxnSp>
-          <p:cxnSp>
-            <p:nvCxnSpPr>
-              <p:cNvPr id="63" name="Straight Arrow Connector 62"/>
-              <p:cNvCxnSpPr/>
-              <p:nvPr/>
-            </p:nvCxnSpPr>
-            <p:spPr>
-              <a:xfrm flipV="1">
-                <a:off x="6700681" y="3326953"/>
-                <a:ext cx="0" cy="390079"/>
-              </a:xfrm>
-              <a:prstGeom prst="straightConnector1">
-                <a:avLst/>
-              </a:prstGeom>
-              <a:ln w="28575">
-                <a:solidFill>
-                  <a:srgbClr val="588CF4"/>
-                </a:solidFill>
-                <a:tailEnd type="arrow"/>
-              </a:ln>
-            </p:spPr>
-            <p:style>
-              <a:lnRef idx="1">
-                <a:schemeClr val="accent1"/>
-              </a:lnRef>
-              <a:fillRef idx="0">
-                <a:schemeClr val="accent1"/>
-              </a:fillRef>
-              <a:effectRef idx="0">
-                <a:schemeClr val="accent1"/>
-              </a:effectRef>
-              <a:fontRef idx="minor">
-                <a:schemeClr val="tx1"/>
-              </a:fontRef>
-            </p:style>
-          </p:cxnSp>
-          <p:cxnSp>
-            <p:nvCxnSpPr>
-              <p:cNvPr id="64" name="Straight Connector 63"/>
-              <p:cNvCxnSpPr/>
-              <p:nvPr/>
-            </p:nvCxnSpPr>
-            <p:spPr>
-              <a:xfrm>
-                <a:off x="4989752" y="3717032"/>
-                <a:ext cx="1710929" cy="0"/>
-              </a:xfrm>
-              <a:prstGeom prst="line">
-                <a:avLst/>
-              </a:prstGeom>
-              <a:ln w="28575">
-                <a:solidFill>
-                  <a:srgbClr val="588CF4"/>
-                </a:solidFill>
-              </a:ln>
-            </p:spPr>
-            <p:style>
-              <a:lnRef idx="1">
-                <a:schemeClr val="accent1"/>
-              </a:lnRef>
-              <a:fillRef idx="0">
-                <a:schemeClr val="accent1"/>
-              </a:fillRef>
-              <a:effectRef idx="0">
-                <a:schemeClr val="accent1"/>
-              </a:effectRef>
-              <a:fontRef idx="minor">
-                <a:schemeClr val="tx1"/>
-              </a:fontRef>
-            </p:style>
-          </p:cxnSp>
-        </p:grpSp>
-        <p:cxnSp>
-          <p:nvCxnSpPr>
-            <p:cNvPr id="71" name="Straight Arrow Connector 70"/>
-            <p:cNvCxnSpPr/>
-            <p:nvPr/>
-          </p:nvCxnSpPr>
-          <p:spPr>
-            <a:xfrm>
-              <a:off x="3741194" y="3325721"/>
-              <a:ext cx="0" cy="896291"/>
-            </a:xfrm>
-            <a:prstGeom prst="straightConnector1">
-              <a:avLst/>
-            </a:prstGeom>
-            <a:ln w="28575">
+            <a:ln>
               <a:solidFill>
-                <a:srgbClr val="588CF4"/>
-              </a:solidFill>
-              <a:tailEnd type="arrow"/>
-            </a:ln>
-          </p:spPr>
-          <p:style>
-            <a:lnRef idx="1">
-              <a:schemeClr val="accent1"/>
-            </a:lnRef>
-            <a:fillRef idx="0">
-              <a:schemeClr val="accent1"/>
-            </a:fillRef>
-            <a:effectRef idx="0">
-              <a:schemeClr val="accent1"/>
-            </a:effectRef>
-            <a:fontRef idx="minor">
-              <a:schemeClr val="tx1"/>
-            </a:fontRef>
-          </p:style>
-        </p:cxnSp>
-        <p:cxnSp>
-          <p:nvCxnSpPr>
-            <p:cNvPr id="72" name="Straight Connector 71"/>
-            <p:cNvCxnSpPr/>
-            <p:nvPr/>
-          </p:nvCxnSpPr>
-          <p:spPr>
-            <a:xfrm>
-              <a:off x="3737497" y="3326953"/>
-              <a:ext cx="1710929" cy="0"/>
-            </a:xfrm>
-            <a:prstGeom prst="line">
-              <a:avLst/>
-            </a:prstGeom>
-            <a:ln w="28575">
-              <a:solidFill>
-                <a:srgbClr val="588CF4"/>
+                <a:schemeClr val="tx2"/>
               </a:solidFill>
             </a:ln>
           </p:spPr>
           <p:style>
-            <a:lnRef idx="1">
-              <a:schemeClr val="accent1"/>
+            <a:lnRef idx="0">
+              <a:scrgbClr r="0" g="0" b="0"/>
             </a:lnRef>
             <a:fillRef idx="0">
-              <a:schemeClr val="accent1"/>
+              <a:scrgbClr r="0" g="0" b="0"/>
             </a:fillRef>
             <a:effectRef idx="0">
-              <a:schemeClr val="accent1"/>
+              <a:scrgbClr r="0" g="0" b="0"/>
             </a:effectRef>
             <a:fontRef idx="minor">
-              <a:schemeClr val="tx1"/>
+              <a:schemeClr val="dk1">
+                <a:hueOff val="0"/>
+                <a:satOff val="0"/>
+                <a:lumOff val="0"/>
+                <a:alphaOff val="0"/>
+              </a:schemeClr>
             </a:fontRef>
           </p:style>
-        </p:cxnSp>
-        <p:cxnSp>
-          <p:nvCxnSpPr>
-            <p:cNvPr id="77" name="Straight Arrow Connector 76"/>
-            <p:cNvCxnSpPr/>
-            <p:nvPr/>
-          </p:nvCxnSpPr>
-          <p:spPr>
-            <a:xfrm>
-              <a:off x="5218342" y="3327373"/>
-              <a:ext cx="970635" cy="1232"/>
-            </a:xfrm>
-            <a:prstGeom prst="straightConnector1">
-              <a:avLst/>
-            </a:prstGeom>
-            <a:ln w="28575">
-              <a:solidFill>
-                <a:srgbClr val="588CF4"/>
-              </a:solidFill>
-              <a:tailEnd type="arrow"/>
-            </a:ln>
-          </p:spPr>
-          <p:style>
-            <a:lnRef idx="1">
-              <a:schemeClr val="accent1"/>
-            </a:lnRef>
-            <a:fillRef idx="0">
-              <a:schemeClr val="accent1"/>
-            </a:fillRef>
-            <a:effectRef idx="0">
-              <a:schemeClr val="accent1"/>
-            </a:effectRef>
-            <a:fontRef idx="minor">
+          <p:txBody>
+            <a:bodyPr spcFirstLastPara="0" vert="horz" wrap="square" lIns="20955" tIns="13970" rIns="20955" bIns="13970" numCol="1" spcCol="1270" anchor="ctr" anchorCtr="0">
+              <a:noAutofit/>
+            </a:bodyPr>
+            <a:lstStyle/>
+            <a:p>
+              <a:pPr lvl="0" algn="ctr" defTabSz="488950">
+                <a:lnSpc>
+                  <a:spcPct val="90000"/>
+                </a:lnSpc>
+                <a:spcBef>
+                  <a:spcPct val="0"/>
+                </a:spcBef>
+                <a:spcAft>
+                  <a:spcPct val="35000"/>
+                </a:spcAft>
+              </a:pPr>
+              <a:r>
+                <a:rPr lang="en-US" sz="1100" kern="1200" dirty="0"/>
+                <a:t>Pre-Processing</a:t>
+              </a:r>
+            </a:p>
+          </p:txBody>
+        </p:sp>
+      </p:grpSp>
+      <p:cxnSp>
+        <p:nvCxnSpPr>
+          <p:cNvPr id="37" name="Straight Arrow Connector 36"/>
+          <p:cNvCxnSpPr/>
+          <p:nvPr/>
+        </p:nvCxnSpPr>
+        <p:spPr>
+          <a:xfrm flipH="1" flipV="1">
+            <a:off x="1225374" y="4169751"/>
+            <a:ext cx="308252" cy="1240"/>
+          </a:xfrm>
+          <a:prstGeom prst="straightConnector1">
+            <a:avLst/>
+          </a:prstGeom>
+          <a:ln w="19050">
+            <a:solidFill>
               <a:schemeClr val="tx1"/>
-            </a:fontRef>
-          </p:style>
-        </p:cxnSp>
-        <p:grpSp>
-          <p:nvGrpSpPr>
-            <p:cNvPr id="89" name="Group 88"/>
-            <p:cNvGrpSpPr/>
-            <p:nvPr/>
-          </p:nvGrpSpPr>
-          <p:grpSpPr>
-            <a:xfrm>
-              <a:off x="3833177" y="2362350"/>
-              <a:ext cx="1117597" cy="406508"/>
-              <a:chOff x="4871078" y="418842"/>
-              <a:chExt cx="1022234" cy="406508"/>
-            </a:xfrm>
-          </p:grpSpPr>
-          <p:sp>
-            <p:nvSpPr>
-              <p:cNvPr id="90" name="Rounded Rectangle 89"/>
-              <p:cNvSpPr/>
-              <p:nvPr/>
-            </p:nvSpPr>
-            <p:spPr>
-              <a:xfrm>
-                <a:off x="4871078" y="418842"/>
-                <a:ext cx="1022234" cy="406508"/>
-              </a:xfrm>
-              <a:prstGeom prst="roundRect">
-                <a:avLst>
-                  <a:gd name="adj" fmla="val 10000"/>
-                </a:avLst>
-              </a:prstGeom>
-            </p:spPr>
-            <p:style>
-              <a:lnRef idx="2">
-                <a:schemeClr val="accent1">
-                  <a:shade val="80000"/>
-                  <a:hueOff val="0"/>
-                  <a:satOff val="0"/>
-                  <a:lumOff val="0"/>
-                  <a:alphaOff val="0"/>
-                </a:schemeClr>
-              </a:lnRef>
-              <a:fillRef idx="1">
-                <a:schemeClr val="lt1">
-                  <a:hueOff val="0"/>
-                  <a:satOff val="0"/>
-                  <a:lumOff val="0"/>
-                  <a:alphaOff val="0"/>
-                </a:schemeClr>
-              </a:fillRef>
-              <a:effectRef idx="0">
-                <a:schemeClr val="lt1">
-                  <a:hueOff val="0"/>
-                  <a:satOff val="0"/>
-                  <a:lumOff val="0"/>
-                  <a:alphaOff val="0"/>
-                </a:schemeClr>
-              </a:effectRef>
-              <a:fontRef idx="minor">
-                <a:schemeClr val="dk1">
-                  <a:hueOff val="0"/>
-                  <a:satOff val="0"/>
-                  <a:lumOff val="0"/>
-                  <a:alphaOff val="0"/>
-                </a:schemeClr>
-              </a:fontRef>
-            </p:style>
-          </p:sp>
-          <p:sp>
-            <p:nvSpPr>
-              <p:cNvPr id="91" name="Rounded Rectangle 4"/>
-              <p:cNvSpPr/>
-              <p:nvPr/>
-            </p:nvSpPr>
-            <p:spPr>
-              <a:xfrm>
-                <a:off x="4882984" y="430748"/>
-                <a:ext cx="998422" cy="382696"/>
-              </a:xfrm>
-              <a:prstGeom prst="rect">
-                <a:avLst/>
-              </a:prstGeom>
-            </p:spPr>
-            <p:style>
-              <a:lnRef idx="0">
-                <a:scrgbClr r="0" g="0" b="0"/>
-              </a:lnRef>
-              <a:fillRef idx="0">
-                <a:scrgbClr r="0" g="0" b="0"/>
-              </a:fillRef>
-              <a:effectRef idx="0">
-                <a:scrgbClr r="0" g="0" b="0"/>
-              </a:effectRef>
-              <a:fontRef idx="minor">
-                <a:schemeClr val="dk1">
-                  <a:hueOff val="0"/>
-                  <a:satOff val="0"/>
-                  <a:lumOff val="0"/>
-                  <a:alphaOff val="0"/>
-                </a:schemeClr>
-              </a:fontRef>
-            </p:style>
-            <p:txBody>
-              <a:bodyPr spcFirstLastPara="0" vert="horz" wrap="square" lIns="20955" tIns="13970" rIns="20955" bIns="13970" numCol="1" spcCol="1270" anchor="ctr" anchorCtr="0">
-                <a:noAutofit/>
-              </a:bodyPr>
-              <a:lstStyle/>
-              <a:p>
-                <a:pPr lvl="0" algn="ctr" defTabSz="488950">
-                  <a:lnSpc>
-                    <a:spcPct val="90000"/>
-                  </a:lnSpc>
-                  <a:spcBef>
-                    <a:spcPct val="0"/>
-                  </a:spcBef>
-                  <a:spcAft>
-                    <a:spcPct val="35000"/>
-                  </a:spcAft>
-                </a:pPr>
-                <a:r>
-                  <a:rPr lang="en-US" sz="1100" b="1" kern="1200" dirty="0"/>
-                  <a:t>Pre-Processing</a:t>
-                </a:r>
-              </a:p>
-            </p:txBody>
-          </p:sp>
-        </p:grpSp>
-      </p:grpSp>
+            </a:solidFill>
+            <a:tailEnd type="arrow"/>
+          </a:ln>
+        </p:spPr>
+        <p:style>
+          <a:lnRef idx="1">
+            <a:schemeClr val="accent1"/>
+          </a:lnRef>
+          <a:fillRef idx="0">
+            <a:schemeClr val="accent1"/>
+          </a:fillRef>
+          <a:effectRef idx="0">
+            <a:schemeClr val="accent1"/>
+          </a:effectRef>
+          <a:fontRef idx="minor">
+            <a:schemeClr val="tx1"/>
+          </a:fontRef>
+        </p:style>
+      </p:cxnSp>
+      <p:cxnSp>
+        <p:nvCxnSpPr>
+          <p:cNvPr id="44" name="Straight Arrow Connector 43"/>
+          <p:cNvCxnSpPr/>
+          <p:nvPr/>
+        </p:nvCxnSpPr>
+        <p:spPr>
+          <a:xfrm flipH="1" flipV="1">
+            <a:off x="7634940" y="4191001"/>
+            <a:ext cx="308252" cy="1240"/>
+          </a:xfrm>
+          <a:prstGeom prst="straightConnector1">
+            <a:avLst/>
+          </a:prstGeom>
+          <a:ln w="19050">
+            <a:solidFill>
+              <a:schemeClr val="tx1"/>
+            </a:solidFill>
+            <a:tailEnd type="arrow"/>
+          </a:ln>
+        </p:spPr>
+        <p:style>
+          <a:lnRef idx="1">
+            <a:schemeClr val="accent1"/>
+          </a:lnRef>
+          <a:fillRef idx="0">
+            <a:schemeClr val="accent1"/>
+          </a:fillRef>
+          <a:effectRef idx="0">
+            <a:schemeClr val="accent1"/>
+          </a:effectRef>
+          <a:fontRef idx="minor">
+            <a:schemeClr val="tx1"/>
+          </a:fontRef>
+        </p:style>
+      </p:cxnSp>
+      <p:cxnSp>
+        <p:nvCxnSpPr>
+          <p:cNvPr id="47" name="Straight Arrow Connector 46"/>
+          <p:cNvCxnSpPr/>
+          <p:nvPr/>
+        </p:nvCxnSpPr>
+        <p:spPr>
+          <a:xfrm>
+            <a:off x="3488222" y="1481109"/>
+            <a:ext cx="975561" cy="0"/>
+          </a:xfrm>
+          <a:prstGeom prst="straightConnector1">
+            <a:avLst/>
+          </a:prstGeom>
+          <a:ln w="19050">
+            <a:tailEnd type="arrow"/>
+          </a:ln>
+        </p:spPr>
+        <p:style>
+          <a:lnRef idx="1">
+            <a:schemeClr val="dk1"/>
+          </a:lnRef>
+          <a:fillRef idx="0">
+            <a:schemeClr val="dk1"/>
+          </a:fillRef>
+          <a:effectRef idx="0">
+            <a:schemeClr val="dk1"/>
+          </a:effectRef>
+          <a:fontRef idx="minor">
+            <a:schemeClr val="tx1"/>
+          </a:fontRef>
+        </p:style>
+      </p:cxnSp>
+      <p:cxnSp>
+        <p:nvCxnSpPr>
+          <p:cNvPr id="49" name="Straight Connector 48"/>
+          <p:cNvCxnSpPr/>
+          <p:nvPr/>
+        </p:nvCxnSpPr>
+        <p:spPr>
+          <a:xfrm>
+            <a:off x="1379500" y="1583196"/>
+            <a:ext cx="765334" cy="1"/>
+          </a:xfrm>
+          <a:prstGeom prst="line">
+            <a:avLst/>
+          </a:prstGeom>
+          <a:ln w="19050">
+            <a:prstDash val="sysDash"/>
+          </a:ln>
+        </p:spPr>
+        <p:style>
+          <a:lnRef idx="1">
+            <a:schemeClr val="dk1"/>
+          </a:lnRef>
+          <a:fillRef idx="0">
+            <a:schemeClr val="dk1"/>
+          </a:fillRef>
+          <a:effectRef idx="0">
+            <a:schemeClr val="dk1"/>
+          </a:effectRef>
+          <a:fontRef idx="minor">
+            <a:schemeClr val="tx1"/>
+          </a:fontRef>
+        </p:style>
+      </p:cxnSp>
+      <p:cxnSp>
+        <p:nvCxnSpPr>
+          <p:cNvPr id="50" name="Straight Connector 49"/>
+          <p:cNvCxnSpPr/>
+          <p:nvPr/>
+        </p:nvCxnSpPr>
+        <p:spPr>
+          <a:xfrm flipV="1">
+            <a:off x="1379500" y="1641389"/>
+            <a:ext cx="788905" cy="1229"/>
+          </a:xfrm>
+          <a:prstGeom prst="line">
+            <a:avLst/>
+          </a:prstGeom>
+          <a:ln w="19050">
+            <a:prstDash val="sysDash"/>
+          </a:ln>
+        </p:spPr>
+        <p:style>
+          <a:lnRef idx="1">
+            <a:schemeClr val="dk1"/>
+          </a:lnRef>
+          <a:fillRef idx="0">
+            <a:schemeClr val="dk1"/>
+          </a:fillRef>
+          <a:effectRef idx="0">
+            <a:schemeClr val="dk1"/>
+          </a:effectRef>
+          <a:fontRef idx="minor">
+            <a:schemeClr val="tx1"/>
+          </a:fontRef>
+        </p:style>
+      </p:cxnSp>
     </p:spTree>
     <p:extLst>
       <p:ext uri="{BB962C8B-B14F-4D97-AF65-F5344CB8AC3E}">
@@ -18561,7 +18724,7 @@
           <a:lstStyle/>
           <a:p>
             <a:r>
-              <a:rPr lang="en-US" sz="1400" b="1" dirty="0" err="1" smtClean="0">
+              <a:rPr lang="en-US" sz="1400" b="1" dirty="0" smtClean="0">
                 <a:latin typeface="Arial Narrow" panose="020B0606020202030204" pitchFamily="34" charset="0"/>
                 <a:cs typeface="Arial" panose="020B0604020202020204" pitchFamily="34" charset="0"/>
               </a:rPr>
@@ -18635,16 +18798,12 @@
           <a:p>
             <a:pPr algn="ctr"/>
             <a:r>
-              <a:rPr lang="en-US" sz="1200" dirty="0" err="1" smtClean="0">
+              <a:rPr lang="en-US" sz="1200" dirty="0" smtClean="0">
                 <a:latin typeface="Arial Narrow" panose="020B0606020202030204" pitchFamily="34" charset="0"/>
                 <a:cs typeface="Arial" panose="020B0604020202020204" pitchFamily="34" charset="0"/>
               </a:rPr>
               <a:t>eventID|eventTitle</a:t>
             </a:r>
-            <a:endParaRPr lang="en-US" sz="1200" dirty="0" smtClean="0">
-              <a:latin typeface="Arial Narrow" panose="020B0606020202030204" pitchFamily="34" charset="0"/>
-              <a:cs typeface="Arial" panose="020B0604020202020204" pitchFamily="34" charset="0"/>
-            </a:endParaRPr>
           </a:p>
           <a:p>
             <a:pPr algn="ctr"/>
@@ -18653,21 +18812,7 @@
                 <a:latin typeface="Arial Narrow" panose="020B0606020202030204" pitchFamily="34" charset="0"/>
                 <a:cs typeface="Arial" panose="020B0604020202020204" pitchFamily="34" charset="0"/>
               </a:rPr>
-              <a:t>|</a:t>
-            </a:r>
-            <a:r>
-              <a:rPr lang="en-US" sz="1200" dirty="0" err="1" smtClean="0">
-                <a:latin typeface="Arial Narrow" panose="020B0606020202030204" pitchFamily="34" charset="0"/>
-                <a:cs typeface="Arial" panose="020B0604020202020204" pitchFamily="34" charset="0"/>
-              </a:rPr>
-              <a:t>Agent|Location</a:t>
-            </a:r>
-            <a:r>
-              <a:rPr lang="en-US" sz="1200" dirty="0" smtClean="0">
-                <a:latin typeface="Arial Narrow" panose="020B0606020202030204" pitchFamily="34" charset="0"/>
-                <a:cs typeface="Arial" panose="020B0604020202020204" pitchFamily="34" charset="0"/>
-              </a:rPr>
-              <a:t>|</a:t>
+              <a:t>|Agent|Location|</a:t>
             </a:r>
           </a:p>
           <a:p>

</xml_diff>

<commit_message>
slight alignment changes made
</commit_message>
<xml_diff>
--- a/paper/architecture_source.pptx
+++ b/paper/architecture_source.pptx
@@ -13586,1053 +13586,846 @@
           </a:p>
         </p:txBody>
       </p:sp>
-      <p:grpSp>
-        <p:nvGrpSpPr>
-          <p:cNvPr id="32" name="Group 31"/>
-          <p:cNvGrpSpPr/>
+      <p:sp>
+        <p:nvSpPr>
+          <p:cNvPr id="33" name="Rounded Rectangle 32"/>
+          <p:cNvSpPr/>
           <p:nvPr/>
-        </p:nvGrpSpPr>
-        <p:grpSpPr>
+        </p:nvSpPr>
+        <p:spPr>
           <a:xfrm>
-            <a:off x="568051" y="2295431"/>
-            <a:ext cx="8069709" cy="2257675"/>
-            <a:chOff x="546189" y="2284879"/>
-            <a:chExt cx="8069709" cy="2257675"/>
+            <a:off x="568051" y="2796373"/>
+            <a:ext cx="1511542" cy="1695994"/>
           </a:xfrm>
-        </p:grpSpPr>
-        <p:sp>
-          <p:nvSpPr>
-            <p:cNvPr id="33" name="Rounded Rectangle 32"/>
-            <p:cNvSpPr/>
-            <p:nvPr/>
-          </p:nvSpPr>
-          <p:spPr>
-            <a:xfrm>
-              <a:off x="546189" y="2785821"/>
-              <a:ext cx="1511542" cy="1695994"/>
-            </a:xfrm>
-            <a:prstGeom prst="roundRect">
-              <a:avLst>
-                <a:gd name="adj" fmla="val 10000"/>
-              </a:avLst>
-            </a:prstGeom>
-          </p:spPr>
-          <p:style>
-            <a:lnRef idx="2">
-              <a:schemeClr val="accent1">
-                <a:hueOff val="0"/>
-                <a:satOff val="0"/>
-                <a:lumOff val="0"/>
-                <a:alphaOff val="0"/>
-              </a:schemeClr>
-            </a:lnRef>
-            <a:fillRef idx="1">
-              <a:schemeClr val="accent1">
-                <a:alpha val="90000"/>
-                <a:tint val="40000"/>
-                <a:hueOff val="0"/>
-                <a:satOff val="0"/>
-                <a:lumOff val="0"/>
-                <a:alphaOff val="0"/>
-              </a:schemeClr>
-            </a:fillRef>
-            <a:effectRef idx="0">
-              <a:schemeClr val="accent1">
-                <a:alpha val="90000"/>
-                <a:tint val="40000"/>
-                <a:hueOff val="0"/>
-                <a:satOff val="0"/>
-                <a:lumOff val="0"/>
-                <a:alphaOff val="0"/>
-              </a:schemeClr>
-            </a:effectRef>
-            <a:fontRef idx="minor">
-              <a:schemeClr val="dk1">
-                <a:hueOff val="0"/>
-                <a:satOff val="0"/>
-                <a:lumOff val="0"/>
-                <a:alphaOff val="0"/>
-              </a:schemeClr>
-            </a:fontRef>
-          </p:style>
-        </p:sp>
-        <p:sp>
-          <p:nvSpPr>
-            <p:cNvPr id="35" name="Shape 34"/>
-            <p:cNvSpPr/>
-            <p:nvPr/>
-          </p:nvSpPr>
-          <p:spPr>
-            <a:xfrm rot="10800000">
-              <a:off x="1335651" y="2336718"/>
-              <a:ext cx="1901851" cy="1842772"/>
-            </a:xfrm>
-            <a:prstGeom prst="leftCircularArrow">
-              <a:avLst>
-                <a:gd name="adj1" fmla="val 4021"/>
-                <a:gd name="adj2" fmla="val 505141"/>
-                <a:gd name="adj3" fmla="val 2306229"/>
-                <a:gd name="adj4" fmla="val 9050066"/>
-                <a:gd name="adj5" fmla="val 4691"/>
-              </a:avLst>
-            </a:prstGeom>
-          </p:spPr>
-          <p:style>
-            <a:lnRef idx="0">
-              <a:schemeClr val="accent1">
-                <a:tint val="60000"/>
-                <a:hueOff val="0"/>
-                <a:satOff val="0"/>
-                <a:lumOff val="0"/>
-                <a:alphaOff val="0"/>
-              </a:schemeClr>
-            </a:lnRef>
-            <a:fillRef idx="1">
-              <a:schemeClr val="accent1">
-                <a:tint val="60000"/>
-                <a:hueOff val="0"/>
-                <a:satOff val="0"/>
-                <a:lumOff val="0"/>
-                <a:alphaOff val="0"/>
-              </a:schemeClr>
-            </a:fillRef>
-            <a:effectRef idx="1">
-              <a:schemeClr val="accent1">
-                <a:tint val="60000"/>
-                <a:hueOff val="0"/>
-                <a:satOff val="0"/>
-                <a:lumOff val="0"/>
-                <a:alphaOff val="0"/>
-              </a:schemeClr>
-            </a:effectRef>
-            <a:fontRef idx="minor">
-              <a:schemeClr val="dk1">
-                <a:hueOff val="0"/>
-                <a:satOff val="0"/>
-                <a:lumOff val="0"/>
-                <a:alphaOff val="0"/>
-              </a:schemeClr>
-            </a:fontRef>
-          </p:style>
-        </p:sp>
-        <p:sp>
-          <p:nvSpPr>
-            <p:cNvPr id="37" name="Freeform 36"/>
-            <p:cNvSpPr/>
-            <p:nvPr/>
-          </p:nvSpPr>
-          <p:spPr>
-            <a:xfrm>
-              <a:off x="796574" y="3971786"/>
-              <a:ext cx="1514618" cy="570768"/>
-            </a:xfrm>
-            <a:custGeom>
-              <a:avLst/>
-              <a:gdLst>
-                <a:gd name="connsiteX0" fmla="*/ 0 w 1514618"/>
-                <a:gd name="connsiteY0" fmla="*/ 57077 h 570768"/>
-                <a:gd name="connsiteX1" fmla="*/ 57077 w 1514618"/>
-                <a:gd name="connsiteY1" fmla="*/ 0 h 570768"/>
-                <a:gd name="connsiteX2" fmla="*/ 1457541 w 1514618"/>
-                <a:gd name="connsiteY2" fmla="*/ 0 h 570768"/>
-                <a:gd name="connsiteX3" fmla="*/ 1514618 w 1514618"/>
-                <a:gd name="connsiteY3" fmla="*/ 57077 h 570768"/>
-                <a:gd name="connsiteX4" fmla="*/ 1514618 w 1514618"/>
-                <a:gd name="connsiteY4" fmla="*/ 513691 h 570768"/>
-                <a:gd name="connsiteX5" fmla="*/ 1457541 w 1514618"/>
-                <a:gd name="connsiteY5" fmla="*/ 570768 h 570768"/>
-                <a:gd name="connsiteX6" fmla="*/ 57077 w 1514618"/>
-                <a:gd name="connsiteY6" fmla="*/ 570768 h 570768"/>
-                <a:gd name="connsiteX7" fmla="*/ 0 w 1514618"/>
-                <a:gd name="connsiteY7" fmla="*/ 513691 h 570768"/>
-                <a:gd name="connsiteX8" fmla="*/ 0 w 1514618"/>
-                <a:gd name="connsiteY8" fmla="*/ 57077 h 570768"/>
-              </a:gdLst>
-              <a:ahLst/>
-              <a:cxnLst>
-                <a:cxn ang="0">
-                  <a:pos x="connsiteX0" y="connsiteY0"/>
-                </a:cxn>
-                <a:cxn ang="0">
-                  <a:pos x="connsiteX1" y="connsiteY1"/>
-                </a:cxn>
-                <a:cxn ang="0">
-                  <a:pos x="connsiteX2" y="connsiteY2"/>
-                </a:cxn>
-                <a:cxn ang="0">
-                  <a:pos x="connsiteX3" y="connsiteY3"/>
-                </a:cxn>
-                <a:cxn ang="0">
-                  <a:pos x="connsiteX4" y="connsiteY4"/>
-                </a:cxn>
-                <a:cxn ang="0">
-                  <a:pos x="connsiteX5" y="connsiteY5"/>
-                </a:cxn>
-                <a:cxn ang="0">
-                  <a:pos x="connsiteX6" y="connsiteY6"/>
-                </a:cxn>
-                <a:cxn ang="0">
-                  <a:pos x="connsiteX7" y="connsiteY7"/>
-                </a:cxn>
-                <a:cxn ang="0">
-                  <a:pos x="connsiteX8" y="connsiteY8"/>
-                </a:cxn>
-              </a:cxnLst>
-              <a:rect l="l" t="t" r="r" b="b"/>
-              <a:pathLst>
-                <a:path w="1514618" h="570768">
-                  <a:moveTo>
-                    <a:pt x="0" y="57077"/>
-                  </a:moveTo>
-                  <a:cubicBezTo>
-                    <a:pt x="0" y="25554"/>
-                    <a:pt x="25554" y="0"/>
-                    <a:pt x="57077" y="0"/>
-                  </a:cubicBezTo>
-                  <a:lnTo>
-                    <a:pt x="1457541" y="0"/>
-                  </a:lnTo>
-                  <a:cubicBezTo>
-                    <a:pt x="1489064" y="0"/>
-                    <a:pt x="1514618" y="25554"/>
-                    <a:pt x="1514618" y="57077"/>
-                  </a:cubicBezTo>
-                  <a:lnTo>
-                    <a:pt x="1514618" y="513691"/>
-                  </a:lnTo>
-                  <a:cubicBezTo>
-                    <a:pt x="1514618" y="545214"/>
-                    <a:pt x="1489064" y="570768"/>
-                    <a:pt x="1457541" y="570768"/>
-                  </a:cubicBezTo>
-                  <a:lnTo>
-                    <a:pt x="57077" y="570768"/>
-                  </a:lnTo>
-                  <a:cubicBezTo>
-                    <a:pt x="25554" y="570768"/>
-                    <a:pt x="0" y="545214"/>
-                    <a:pt x="0" y="513691"/>
-                  </a:cubicBezTo>
-                  <a:lnTo>
-                    <a:pt x="0" y="57077"/>
-                  </a:lnTo>
-                  <a:close/>
-                </a:path>
-              </a:pathLst>
-            </a:custGeom>
-          </p:spPr>
-          <p:style>
-            <a:lnRef idx="3">
-              <a:schemeClr val="accent1">
-                <a:shade val="80000"/>
-                <a:hueOff val="0"/>
-                <a:satOff val="0"/>
-                <a:lumOff val="0"/>
-                <a:alphaOff val="0"/>
-              </a:schemeClr>
-            </a:lnRef>
-            <a:fillRef idx="1">
-              <a:schemeClr val="lt1">
-                <a:hueOff val="0"/>
-                <a:satOff val="0"/>
-                <a:lumOff val="0"/>
-                <a:alphaOff val="0"/>
-              </a:schemeClr>
-            </a:fillRef>
-            <a:effectRef idx="1">
-              <a:schemeClr val="lt1">
-                <a:hueOff val="0"/>
-                <a:satOff val="0"/>
-                <a:lumOff val="0"/>
-                <a:alphaOff val="0"/>
-              </a:schemeClr>
-            </a:effectRef>
-            <a:fontRef idx="minor">
-              <a:schemeClr val="dk1">
-                <a:hueOff val="0"/>
-                <a:satOff val="0"/>
-                <a:lumOff val="0"/>
-                <a:alphaOff val="0"/>
-              </a:schemeClr>
-            </a:fontRef>
-          </p:style>
-          <p:txBody>
-            <a:bodyPr spcFirstLastPara="0" vert="horz" wrap="square" lIns="47197" tIns="37037" rIns="47197" bIns="37037" numCol="1" spcCol="1270" anchor="ctr" anchorCtr="0">
-              <a:noAutofit/>
-            </a:bodyPr>
-            <a:lstStyle/>
-            <a:p>
-              <a:pPr lvl="0" algn="ctr" defTabSz="711200">
-                <a:lnSpc>
-                  <a:spcPct val="90000"/>
-                </a:lnSpc>
-                <a:spcBef>
-                  <a:spcPct val="0"/>
-                </a:spcBef>
-                <a:spcAft>
-                  <a:spcPct val="35000"/>
-                </a:spcAft>
-              </a:pPr>
-              <a:r>
-                <a:rPr lang="en-US" sz="1600" b="1" kern="1200" dirty="0"/>
-                <a:t>Post-Processing</a:t>
-              </a:r>
-              <a:endParaRPr lang="en-US" sz="1200" b="1" kern="1200" dirty="0"/>
-            </a:p>
-          </p:txBody>
-        </p:sp>
-        <p:sp>
-          <p:nvSpPr>
-            <p:cNvPr id="39" name="Rounded Rectangle 38"/>
-            <p:cNvSpPr/>
-            <p:nvPr/>
-          </p:nvSpPr>
-          <p:spPr>
-            <a:xfrm>
-              <a:off x="2588394" y="2788518"/>
-              <a:ext cx="1511542" cy="1741760"/>
-            </a:xfrm>
-            <a:prstGeom prst="roundRect">
-              <a:avLst>
-                <a:gd name="adj" fmla="val 10000"/>
-              </a:avLst>
-            </a:prstGeom>
-          </p:spPr>
-          <p:style>
-            <a:lnRef idx="2">
-              <a:schemeClr val="accent1">
-                <a:hueOff val="0"/>
-                <a:satOff val="0"/>
-                <a:lumOff val="0"/>
-                <a:alphaOff val="0"/>
-              </a:schemeClr>
-            </a:lnRef>
-            <a:fillRef idx="1">
-              <a:schemeClr val="accent1">
-                <a:alpha val="90000"/>
-                <a:tint val="40000"/>
-                <a:hueOff val="0"/>
-                <a:satOff val="0"/>
-                <a:lumOff val="0"/>
-                <a:alphaOff val="0"/>
-              </a:schemeClr>
-            </a:fillRef>
-            <a:effectRef idx="0">
-              <a:schemeClr val="accent1">
-                <a:alpha val="90000"/>
-                <a:tint val="40000"/>
-                <a:hueOff val="0"/>
-                <a:satOff val="0"/>
-                <a:lumOff val="0"/>
-                <a:alphaOff val="0"/>
-              </a:schemeClr>
-            </a:effectRef>
-            <a:fontRef idx="minor">
-              <a:schemeClr val="dk1">
-                <a:hueOff val="0"/>
-                <a:satOff val="0"/>
-                <a:lumOff val="0"/>
-                <a:alphaOff val="0"/>
-              </a:schemeClr>
-            </a:fontRef>
-          </p:style>
-        </p:sp>
-        <p:sp>
-          <p:nvSpPr>
-            <p:cNvPr id="44" name="Freeform 43"/>
-            <p:cNvSpPr/>
-            <p:nvPr/>
-          </p:nvSpPr>
-          <p:spPr>
-            <a:xfrm>
-              <a:off x="2793255" y="2734934"/>
-              <a:ext cx="1599520" cy="594748"/>
-            </a:xfrm>
-            <a:custGeom>
-              <a:avLst/>
-              <a:gdLst>
-                <a:gd name="connsiteX0" fmla="*/ 0 w 1599520"/>
-                <a:gd name="connsiteY0" fmla="*/ 59475 h 594748"/>
-                <a:gd name="connsiteX1" fmla="*/ 59475 w 1599520"/>
-                <a:gd name="connsiteY1" fmla="*/ 0 h 594748"/>
-                <a:gd name="connsiteX2" fmla="*/ 1540045 w 1599520"/>
-                <a:gd name="connsiteY2" fmla="*/ 0 h 594748"/>
-                <a:gd name="connsiteX3" fmla="*/ 1599520 w 1599520"/>
-                <a:gd name="connsiteY3" fmla="*/ 59475 h 594748"/>
-                <a:gd name="connsiteX4" fmla="*/ 1599520 w 1599520"/>
-                <a:gd name="connsiteY4" fmla="*/ 535273 h 594748"/>
-                <a:gd name="connsiteX5" fmla="*/ 1540045 w 1599520"/>
-                <a:gd name="connsiteY5" fmla="*/ 594748 h 594748"/>
-                <a:gd name="connsiteX6" fmla="*/ 59475 w 1599520"/>
-                <a:gd name="connsiteY6" fmla="*/ 594748 h 594748"/>
-                <a:gd name="connsiteX7" fmla="*/ 0 w 1599520"/>
-                <a:gd name="connsiteY7" fmla="*/ 535273 h 594748"/>
-                <a:gd name="connsiteX8" fmla="*/ 0 w 1599520"/>
-                <a:gd name="connsiteY8" fmla="*/ 59475 h 594748"/>
-              </a:gdLst>
-              <a:ahLst/>
-              <a:cxnLst>
-                <a:cxn ang="0">
-                  <a:pos x="connsiteX0" y="connsiteY0"/>
-                </a:cxn>
-                <a:cxn ang="0">
-                  <a:pos x="connsiteX1" y="connsiteY1"/>
-                </a:cxn>
-                <a:cxn ang="0">
-                  <a:pos x="connsiteX2" y="connsiteY2"/>
-                </a:cxn>
-                <a:cxn ang="0">
-                  <a:pos x="connsiteX3" y="connsiteY3"/>
-                </a:cxn>
-                <a:cxn ang="0">
-                  <a:pos x="connsiteX4" y="connsiteY4"/>
-                </a:cxn>
-                <a:cxn ang="0">
-                  <a:pos x="connsiteX5" y="connsiteY5"/>
-                </a:cxn>
-                <a:cxn ang="0">
-                  <a:pos x="connsiteX6" y="connsiteY6"/>
-                </a:cxn>
-                <a:cxn ang="0">
-                  <a:pos x="connsiteX7" y="connsiteY7"/>
-                </a:cxn>
-                <a:cxn ang="0">
-                  <a:pos x="connsiteX8" y="connsiteY8"/>
-                </a:cxn>
-              </a:cxnLst>
-              <a:rect l="l" t="t" r="r" b="b"/>
-              <a:pathLst>
-                <a:path w="1599520" h="594748">
-                  <a:moveTo>
-                    <a:pt x="0" y="59475"/>
-                  </a:moveTo>
-                  <a:cubicBezTo>
-                    <a:pt x="0" y="26628"/>
-                    <a:pt x="26628" y="0"/>
-                    <a:pt x="59475" y="0"/>
-                  </a:cubicBezTo>
-                  <a:lnTo>
-                    <a:pt x="1540045" y="0"/>
-                  </a:lnTo>
-                  <a:cubicBezTo>
-                    <a:pt x="1572892" y="0"/>
-                    <a:pt x="1599520" y="26628"/>
-                    <a:pt x="1599520" y="59475"/>
-                  </a:cubicBezTo>
-                  <a:lnTo>
-                    <a:pt x="1599520" y="535273"/>
-                  </a:lnTo>
-                  <a:cubicBezTo>
-                    <a:pt x="1599520" y="568120"/>
-                    <a:pt x="1572892" y="594748"/>
-                    <a:pt x="1540045" y="594748"/>
-                  </a:cubicBezTo>
-                  <a:lnTo>
-                    <a:pt x="59475" y="594748"/>
-                  </a:lnTo>
-                  <a:cubicBezTo>
-                    <a:pt x="26628" y="594748"/>
-                    <a:pt x="0" y="568120"/>
-                    <a:pt x="0" y="535273"/>
-                  </a:cubicBezTo>
-                  <a:lnTo>
-                    <a:pt x="0" y="59475"/>
-                  </a:lnTo>
-                  <a:close/>
-                </a:path>
-              </a:pathLst>
-            </a:custGeom>
-          </p:spPr>
-          <p:style>
-            <a:lnRef idx="3">
-              <a:schemeClr val="accent1">
-                <a:shade val="80000"/>
-                <a:hueOff val="0"/>
-                <a:satOff val="0"/>
-                <a:lumOff val="0"/>
-                <a:alphaOff val="0"/>
-              </a:schemeClr>
-            </a:lnRef>
-            <a:fillRef idx="1">
-              <a:schemeClr val="lt1">
-                <a:hueOff val="0"/>
-                <a:satOff val="0"/>
-                <a:lumOff val="0"/>
-                <a:alphaOff val="0"/>
-              </a:schemeClr>
-            </a:fillRef>
-            <a:effectRef idx="1">
-              <a:schemeClr val="lt1">
-                <a:hueOff val="0"/>
-                <a:satOff val="0"/>
-                <a:lumOff val="0"/>
-                <a:alphaOff val="0"/>
-              </a:schemeClr>
-            </a:effectRef>
-            <a:fontRef idx="minor">
-              <a:schemeClr val="dk1">
-                <a:hueOff val="0"/>
-                <a:satOff val="0"/>
-                <a:lumOff val="0"/>
-                <a:alphaOff val="0"/>
-              </a:schemeClr>
-            </a:fontRef>
-          </p:style>
-          <p:txBody>
-            <a:bodyPr spcFirstLastPara="0" vert="horz" wrap="square" lIns="47900" tIns="37740" rIns="47900" bIns="37740" numCol="1" spcCol="1270" anchor="ctr" anchorCtr="0">
-              <a:noAutofit/>
-            </a:bodyPr>
-            <a:lstStyle/>
-            <a:p>
-              <a:pPr lvl="0" algn="ctr" defTabSz="711200">
-                <a:lnSpc>
-                  <a:spcPct val="90000"/>
-                </a:lnSpc>
-                <a:spcBef>
-                  <a:spcPct val="0"/>
-                </a:spcBef>
-                <a:spcAft>
-                  <a:spcPct val="35000"/>
-                </a:spcAft>
-              </a:pPr>
-              <a:r>
-                <a:rPr lang="en-US" sz="1600" b="1" i="1" kern="1200" dirty="0">
-                  <a:latin typeface="Arial Narrow" panose="020B0606020202030204" pitchFamily="34" charset="0"/>
-                </a:rPr>
-                <a:t>Disambiguation</a:t>
-              </a:r>
-            </a:p>
-          </p:txBody>
-        </p:sp>
-        <p:sp>
-          <p:nvSpPr>
-            <p:cNvPr id="48" name="Rounded Rectangle 47"/>
-            <p:cNvSpPr/>
-            <p:nvPr/>
-          </p:nvSpPr>
-          <p:spPr>
-            <a:xfrm>
-              <a:off x="4768973" y="2776369"/>
-              <a:ext cx="1511542" cy="1702539"/>
-            </a:xfrm>
-            <a:prstGeom prst="roundRect">
-              <a:avLst>
-                <a:gd name="adj" fmla="val 10000"/>
-              </a:avLst>
-            </a:prstGeom>
-          </p:spPr>
-          <p:style>
-            <a:lnRef idx="2">
-              <a:schemeClr val="accent1">
-                <a:hueOff val="0"/>
-                <a:satOff val="0"/>
-                <a:lumOff val="0"/>
-                <a:alphaOff val="0"/>
-              </a:schemeClr>
-            </a:lnRef>
-            <a:fillRef idx="1">
-              <a:schemeClr val="accent1">
-                <a:alpha val="90000"/>
-                <a:tint val="40000"/>
-                <a:hueOff val="0"/>
-                <a:satOff val="0"/>
-                <a:lumOff val="0"/>
-                <a:alphaOff val="0"/>
-              </a:schemeClr>
-            </a:fillRef>
-            <a:effectRef idx="0">
-              <a:schemeClr val="accent1">
-                <a:alpha val="90000"/>
-                <a:tint val="40000"/>
-                <a:hueOff val="0"/>
-                <a:satOff val="0"/>
-                <a:lumOff val="0"/>
-                <a:alphaOff val="0"/>
-              </a:schemeClr>
-            </a:effectRef>
-            <a:fontRef idx="minor">
-              <a:schemeClr val="dk1">
-                <a:hueOff val="0"/>
-                <a:satOff val="0"/>
-                <a:lumOff val="0"/>
-                <a:alphaOff val="0"/>
-              </a:schemeClr>
-            </a:fontRef>
-          </p:style>
-        </p:sp>
-        <p:sp>
-          <p:nvSpPr>
-            <p:cNvPr id="51" name="Shape 50"/>
-            <p:cNvSpPr/>
-            <p:nvPr/>
-          </p:nvSpPr>
-          <p:spPr>
-            <a:xfrm rot="10800000">
-              <a:off x="5689962" y="2284879"/>
-              <a:ext cx="1843367" cy="1930187"/>
-            </a:xfrm>
-            <a:prstGeom prst="leftCircularArrow">
-              <a:avLst>
-                <a:gd name="adj1" fmla="val 3838"/>
-                <a:gd name="adj2" fmla="val 480147"/>
-                <a:gd name="adj3" fmla="val 2267822"/>
-                <a:gd name="adj4" fmla="val 9036653"/>
-                <a:gd name="adj5" fmla="val 4478"/>
-              </a:avLst>
-            </a:prstGeom>
-          </p:spPr>
-          <p:style>
-            <a:lnRef idx="0">
-              <a:schemeClr val="accent1">
-                <a:tint val="60000"/>
-                <a:hueOff val="0"/>
-                <a:satOff val="0"/>
-                <a:lumOff val="0"/>
-                <a:alphaOff val="0"/>
-              </a:schemeClr>
-            </a:lnRef>
-            <a:fillRef idx="1">
-              <a:schemeClr val="accent1">
-                <a:tint val="60000"/>
-                <a:hueOff val="0"/>
-                <a:satOff val="0"/>
-                <a:lumOff val="0"/>
-                <a:alphaOff val="0"/>
-              </a:schemeClr>
-            </a:fillRef>
-            <a:effectRef idx="1">
-              <a:schemeClr val="accent1">
-                <a:tint val="60000"/>
-                <a:hueOff val="0"/>
-                <a:satOff val="0"/>
-                <a:lumOff val="0"/>
-                <a:alphaOff val="0"/>
-              </a:schemeClr>
-            </a:effectRef>
-            <a:fontRef idx="minor">
-              <a:schemeClr val="dk1">
-                <a:hueOff val="0"/>
-                <a:satOff val="0"/>
-                <a:lumOff val="0"/>
-                <a:alphaOff val="0"/>
-              </a:schemeClr>
-            </a:fontRef>
-          </p:style>
-        </p:sp>
-        <p:sp>
-          <p:nvSpPr>
-            <p:cNvPr id="52" name="Freeform 51"/>
-            <p:cNvSpPr/>
-            <p:nvPr/>
-          </p:nvSpPr>
-          <p:spPr>
-            <a:xfrm>
-              <a:off x="4990111" y="3984241"/>
-              <a:ext cx="1552991" cy="555332"/>
-            </a:xfrm>
-            <a:custGeom>
-              <a:avLst/>
-              <a:gdLst>
-                <a:gd name="connsiteX0" fmla="*/ 0 w 1552991"/>
-                <a:gd name="connsiteY0" fmla="*/ 55533 h 555332"/>
-                <a:gd name="connsiteX1" fmla="*/ 55533 w 1552991"/>
-                <a:gd name="connsiteY1" fmla="*/ 0 h 555332"/>
-                <a:gd name="connsiteX2" fmla="*/ 1497458 w 1552991"/>
-                <a:gd name="connsiteY2" fmla="*/ 0 h 555332"/>
-                <a:gd name="connsiteX3" fmla="*/ 1552991 w 1552991"/>
-                <a:gd name="connsiteY3" fmla="*/ 55533 h 555332"/>
-                <a:gd name="connsiteX4" fmla="*/ 1552991 w 1552991"/>
-                <a:gd name="connsiteY4" fmla="*/ 499799 h 555332"/>
-                <a:gd name="connsiteX5" fmla="*/ 1497458 w 1552991"/>
-                <a:gd name="connsiteY5" fmla="*/ 555332 h 555332"/>
-                <a:gd name="connsiteX6" fmla="*/ 55533 w 1552991"/>
-                <a:gd name="connsiteY6" fmla="*/ 555332 h 555332"/>
-                <a:gd name="connsiteX7" fmla="*/ 0 w 1552991"/>
-                <a:gd name="connsiteY7" fmla="*/ 499799 h 555332"/>
-                <a:gd name="connsiteX8" fmla="*/ 0 w 1552991"/>
-                <a:gd name="connsiteY8" fmla="*/ 55533 h 555332"/>
-              </a:gdLst>
-              <a:ahLst/>
-              <a:cxnLst>
-                <a:cxn ang="0">
-                  <a:pos x="connsiteX0" y="connsiteY0"/>
-                </a:cxn>
-                <a:cxn ang="0">
-                  <a:pos x="connsiteX1" y="connsiteY1"/>
-                </a:cxn>
-                <a:cxn ang="0">
-                  <a:pos x="connsiteX2" y="connsiteY2"/>
-                </a:cxn>
-                <a:cxn ang="0">
-                  <a:pos x="connsiteX3" y="connsiteY3"/>
-                </a:cxn>
-                <a:cxn ang="0">
-                  <a:pos x="connsiteX4" y="connsiteY4"/>
-                </a:cxn>
-                <a:cxn ang="0">
-                  <a:pos x="connsiteX5" y="connsiteY5"/>
-                </a:cxn>
-                <a:cxn ang="0">
-                  <a:pos x="connsiteX6" y="connsiteY6"/>
-                </a:cxn>
-                <a:cxn ang="0">
-                  <a:pos x="connsiteX7" y="connsiteY7"/>
-                </a:cxn>
-                <a:cxn ang="0">
-                  <a:pos x="connsiteX8" y="connsiteY8"/>
-                </a:cxn>
-              </a:cxnLst>
-              <a:rect l="l" t="t" r="r" b="b"/>
-              <a:pathLst>
-                <a:path w="1552991" h="555332">
-                  <a:moveTo>
-                    <a:pt x="0" y="55533"/>
-                  </a:moveTo>
-                  <a:cubicBezTo>
-                    <a:pt x="0" y="24863"/>
-                    <a:pt x="24863" y="0"/>
-                    <a:pt x="55533" y="0"/>
-                  </a:cubicBezTo>
-                  <a:lnTo>
-                    <a:pt x="1497458" y="0"/>
-                  </a:lnTo>
-                  <a:cubicBezTo>
-                    <a:pt x="1528128" y="0"/>
-                    <a:pt x="1552991" y="24863"/>
-                    <a:pt x="1552991" y="55533"/>
-                  </a:cubicBezTo>
-                  <a:lnTo>
-                    <a:pt x="1552991" y="499799"/>
-                  </a:lnTo>
-                  <a:cubicBezTo>
-                    <a:pt x="1552991" y="530469"/>
-                    <a:pt x="1528128" y="555332"/>
-                    <a:pt x="1497458" y="555332"/>
-                  </a:cubicBezTo>
-                  <a:lnTo>
-                    <a:pt x="55533" y="555332"/>
-                  </a:lnTo>
-                  <a:cubicBezTo>
-                    <a:pt x="24863" y="555332"/>
-                    <a:pt x="0" y="530469"/>
-                    <a:pt x="0" y="499799"/>
-                  </a:cubicBezTo>
-                  <a:lnTo>
-                    <a:pt x="0" y="55533"/>
-                  </a:lnTo>
-                  <a:close/>
-                </a:path>
-              </a:pathLst>
-            </a:custGeom>
-          </p:spPr>
-          <p:style>
-            <a:lnRef idx="3">
-              <a:schemeClr val="accent1">
-                <a:shade val="80000"/>
-                <a:hueOff val="0"/>
-                <a:satOff val="0"/>
-                <a:lumOff val="0"/>
-                <a:alphaOff val="0"/>
-              </a:schemeClr>
-            </a:lnRef>
-            <a:fillRef idx="1">
-              <a:schemeClr val="lt1">
-                <a:hueOff val="0"/>
-                <a:satOff val="0"/>
-                <a:lumOff val="0"/>
-                <a:alphaOff val="0"/>
-              </a:schemeClr>
-            </a:fillRef>
-            <a:effectRef idx="1">
-              <a:schemeClr val="lt1">
-                <a:hueOff val="0"/>
-                <a:satOff val="0"/>
-                <a:lumOff val="0"/>
-                <a:alphaOff val="0"/>
-              </a:schemeClr>
-            </a:effectRef>
-            <a:fontRef idx="minor">
-              <a:schemeClr val="dk1">
-                <a:hueOff val="0"/>
-                <a:satOff val="0"/>
-                <a:lumOff val="0"/>
-                <a:alphaOff val="0"/>
-              </a:schemeClr>
-            </a:fontRef>
-          </p:style>
-          <p:txBody>
-            <a:bodyPr spcFirstLastPara="0" vert="horz" wrap="square" lIns="46745" tIns="36585" rIns="46745" bIns="36585" numCol="1" spcCol="1270" anchor="ctr" anchorCtr="0">
-              <a:noAutofit/>
-            </a:bodyPr>
-            <a:lstStyle/>
-            <a:p>
-              <a:pPr lvl="0" algn="ctr" defTabSz="711200">
-                <a:lnSpc>
-                  <a:spcPct val="90000"/>
-                </a:lnSpc>
-                <a:spcBef>
-                  <a:spcPct val="0"/>
-                </a:spcBef>
-                <a:spcAft>
-                  <a:spcPct val="35000"/>
-                </a:spcAft>
-              </a:pPr>
-              <a:r>
-                <a:rPr lang="en-US" sz="1600" b="1" i="1" kern="1200" dirty="0">
-                  <a:latin typeface="Arial Narrow" panose="020B0606020202030204" pitchFamily="34" charset="0"/>
-                </a:rPr>
-                <a:t>Candidate </a:t>
-              </a:r>
-              <a:endParaRPr lang="en-US" sz="1600" b="1" i="1" kern="1200" dirty="0" smtClean="0">
+          <a:prstGeom prst="roundRect">
+            <a:avLst>
+              <a:gd name="adj" fmla="val 10000"/>
+            </a:avLst>
+          </a:prstGeom>
+        </p:spPr>
+        <p:style>
+          <a:lnRef idx="2">
+            <a:schemeClr val="accent1">
+              <a:hueOff val="0"/>
+              <a:satOff val="0"/>
+              <a:lumOff val="0"/>
+              <a:alphaOff val="0"/>
+            </a:schemeClr>
+          </a:lnRef>
+          <a:fillRef idx="1">
+            <a:schemeClr val="accent1">
+              <a:alpha val="90000"/>
+              <a:tint val="40000"/>
+              <a:hueOff val="0"/>
+              <a:satOff val="0"/>
+              <a:lumOff val="0"/>
+              <a:alphaOff val="0"/>
+            </a:schemeClr>
+          </a:fillRef>
+          <a:effectRef idx="0">
+            <a:schemeClr val="accent1">
+              <a:alpha val="90000"/>
+              <a:tint val="40000"/>
+              <a:hueOff val="0"/>
+              <a:satOff val="0"/>
+              <a:lumOff val="0"/>
+              <a:alphaOff val="0"/>
+            </a:schemeClr>
+          </a:effectRef>
+          <a:fontRef idx="minor">
+            <a:schemeClr val="dk1">
+              <a:hueOff val="0"/>
+              <a:satOff val="0"/>
+              <a:lumOff val="0"/>
+              <a:alphaOff val="0"/>
+            </a:schemeClr>
+          </a:fontRef>
+        </p:style>
+      </p:sp>
+      <p:sp>
+        <p:nvSpPr>
+          <p:cNvPr id="35" name="Shape 34"/>
+          <p:cNvSpPr/>
+          <p:nvPr/>
+        </p:nvSpPr>
+        <p:spPr>
+          <a:xfrm rot="10800000">
+            <a:off x="1357513" y="2295431"/>
+            <a:ext cx="1901851" cy="1842772"/>
+          </a:xfrm>
+          <a:prstGeom prst="leftCircularArrow">
+            <a:avLst>
+              <a:gd name="adj1" fmla="val 4021"/>
+              <a:gd name="adj2" fmla="val 505141"/>
+              <a:gd name="adj3" fmla="val 2306229"/>
+              <a:gd name="adj4" fmla="val 9050066"/>
+              <a:gd name="adj5" fmla="val 4691"/>
+            </a:avLst>
+          </a:prstGeom>
+        </p:spPr>
+        <p:style>
+          <a:lnRef idx="0">
+            <a:schemeClr val="accent1">
+              <a:tint val="60000"/>
+              <a:hueOff val="0"/>
+              <a:satOff val="0"/>
+              <a:lumOff val="0"/>
+              <a:alphaOff val="0"/>
+            </a:schemeClr>
+          </a:lnRef>
+          <a:fillRef idx="1">
+            <a:schemeClr val="accent1">
+              <a:tint val="60000"/>
+              <a:hueOff val="0"/>
+              <a:satOff val="0"/>
+              <a:lumOff val="0"/>
+              <a:alphaOff val="0"/>
+            </a:schemeClr>
+          </a:fillRef>
+          <a:effectRef idx="1">
+            <a:schemeClr val="accent1">
+              <a:tint val="60000"/>
+              <a:hueOff val="0"/>
+              <a:satOff val="0"/>
+              <a:lumOff val="0"/>
+              <a:alphaOff val="0"/>
+            </a:schemeClr>
+          </a:effectRef>
+          <a:fontRef idx="minor">
+            <a:schemeClr val="dk1">
+              <a:hueOff val="0"/>
+              <a:satOff val="0"/>
+              <a:lumOff val="0"/>
+              <a:alphaOff val="0"/>
+            </a:schemeClr>
+          </a:fontRef>
+        </p:style>
+      </p:sp>
+      <p:sp>
+        <p:nvSpPr>
+          <p:cNvPr id="37" name="Freeform 36"/>
+          <p:cNvSpPr/>
+          <p:nvPr/>
+        </p:nvSpPr>
+        <p:spPr>
+          <a:xfrm>
+            <a:off x="818436" y="3982338"/>
+            <a:ext cx="1514618" cy="570768"/>
+          </a:xfrm>
+          <a:custGeom>
+            <a:avLst/>
+            <a:gdLst>
+              <a:gd name="connsiteX0" fmla="*/ 0 w 1514618"/>
+              <a:gd name="connsiteY0" fmla="*/ 57077 h 570768"/>
+              <a:gd name="connsiteX1" fmla="*/ 57077 w 1514618"/>
+              <a:gd name="connsiteY1" fmla="*/ 0 h 570768"/>
+              <a:gd name="connsiteX2" fmla="*/ 1457541 w 1514618"/>
+              <a:gd name="connsiteY2" fmla="*/ 0 h 570768"/>
+              <a:gd name="connsiteX3" fmla="*/ 1514618 w 1514618"/>
+              <a:gd name="connsiteY3" fmla="*/ 57077 h 570768"/>
+              <a:gd name="connsiteX4" fmla="*/ 1514618 w 1514618"/>
+              <a:gd name="connsiteY4" fmla="*/ 513691 h 570768"/>
+              <a:gd name="connsiteX5" fmla="*/ 1457541 w 1514618"/>
+              <a:gd name="connsiteY5" fmla="*/ 570768 h 570768"/>
+              <a:gd name="connsiteX6" fmla="*/ 57077 w 1514618"/>
+              <a:gd name="connsiteY6" fmla="*/ 570768 h 570768"/>
+              <a:gd name="connsiteX7" fmla="*/ 0 w 1514618"/>
+              <a:gd name="connsiteY7" fmla="*/ 513691 h 570768"/>
+              <a:gd name="connsiteX8" fmla="*/ 0 w 1514618"/>
+              <a:gd name="connsiteY8" fmla="*/ 57077 h 570768"/>
+            </a:gdLst>
+            <a:ahLst/>
+            <a:cxnLst>
+              <a:cxn ang="0">
+                <a:pos x="connsiteX0" y="connsiteY0"/>
+              </a:cxn>
+              <a:cxn ang="0">
+                <a:pos x="connsiteX1" y="connsiteY1"/>
+              </a:cxn>
+              <a:cxn ang="0">
+                <a:pos x="connsiteX2" y="connsiteY2"/>
+              </a:cxn>
+              <a:cxn ang="0">
+                <a:pos x="connsiteX3" y="connsiteY3"/>
+              </a:cxn>
+              <a:cxn ang="0">
+                <a:pos x="connsiteX4" y="connsiteY4"/>
+              </a:cxn>
+              <a:cxn ang="0">
+                <a:pos x="connsiteX5" y="connsiteY5"/>
+              </a:cxn>
+              <a:cxn ang="0">
+                <a:pos x="connsiteX6" y="connsiteY6"/>
+              </a:cxn>
+              <a:cxn ang="0">
+                <a:pos x="connsiteX7" y="connsiteY7"/>
+              </a:cxn>
+              <a:cxn ang="0">
+                <a:pos x="connsiteX8" y="connsiteY8"/>
+              </a:cxn>
+            </a:cxnLst>
+            <a:rect l="l" t="t" r="r" b="b"/>
+            <a:pathLst>
+              <a:path w="1514618" h="570768">
+                <a:moveTo>
+                  <a:pt x="0" y="57077"/>
+                </a:moveTo>
+                <a:cubicBezTo>
+                  <a:pt x="0" y="25554"/>
+                  <a:pt x="25554" y="0"/>
+                  <a:pt x="57077" y="0"/>
+                </a:cubicBezTo>
+                <a:lnTo>
+                  <a:pt x="1457541" y="0"/>
+                </a:lnTo>
+                <a:cubicBezTo>
+                  <a:pt x="1489064" y="0"/>
+                  <a:pt x="1514618" y="25554"/>
+                  <a:pt x="1514618" y="57077"/>
+                </a:cubicBezTo>
+                <a:lnTo>
+                  <a:pt x="1514618" y="513691"/>
+                </a:lnTo>
+                <a:cubicBezTo>
+                  <a:pt x="1514618" y="545214"/>
+                  <a:pt x="1489064" y="570768"/>
+                  <a:pt x="1457541" y="570768"/>
+                </a:cubicBezTo>
+                <a:lnTo>
+                  <a:pt x="57077" y="570768"/>
+                </a:lnTo>
+                <a:cubicBezTo>
+                  <a:pt x="25554" y="570768"/>
+                  <a:pt x="0" y="545214"/>
+                  <a:pt x="0" y="513691"/>
+                </a:cubicBezTo>
+                <a:lnTo>
+                  <a:pt x="0" y="57077"/>
+                </a:lnTo>
+                <a:close/>
+              </a:path>
+            </a:pathLst>
+          </a:custGeom>
+        </p:spPr>
+        <p:style>
+          <a:lnRef idx="3">
+            <a:schemeClr val="accent1">
+              <a:shade val="80000"/>
+              <a:hueOff val="0"/>
+              <a:satOff val="0"/>
+              <a:lumOff val="0"/>
+              <a:alphaOff val="0"/>
+            </a:schemeClr>
+          </a:lnRef>
+          <a:fillRef idx="1">
+            <a:schemeClr val="lt1">
+              <a:hueOff val="0"/>
+              <a:satOff val="0"/>
+              <a:lumOff val="0"/>
+              <a:alphaOff val="0"/>
+            </a:schemeClr>
+          </a:fillRef>
+          <a:effectRef idx="1">
+            <a:schemeClr val="lt1">
+              <a:hueOff val="0"/>
+              <a:satOff val="0"/>
+              <a:lumOff val="0"/>
+              <a:alphaOff val="0"/>
+            </a:schemeClr>
+          </a:effectRef>
+          <a:fontRef idx="minor">
+            <a:schemeClr val="dk1">
+              <a:hueOff val="0"/>
+              <a:satOff val="0"/>
+              <a:lumOff val="0"/>
+              <a:alphaOff val="0"/>
+            </a:schemeClr>
+          </a:fontRef>
+        </p:style>
+        <p:txBody>
+          <a:bodyPr spcFirstLastPara="0" vert="horz" wrap="square" lIns="47197" tIns="37037" rIns="47197" bIns="37037" numCol="1" spcCol="1270" anchor="ctr" anchorCtr="0">
+            <a:noAutofit/>
+          </a:bodyPr>
+          <a:lstStyle/>
+          <a:p>
+            <a:pPr lvl="0" algn="ctr" defTabSz="711200">
+              <a:lnSpc>
+                <a:spcPct val="90000"/>
+              </a:lnSpc>
+              <a:spcBef>
+                <a:spcPct val="0"/>
+              </a:spcBef>
+              <a:spcAft>
+                <a:spcPct val="35000"/>
+              </a:spcAft>
+            </a:pPr>
+            <a:r>
+              <a:rPr lang="en-US" sz="1600" b="1" kern="1200" dirty="0"/>
+              <a:t>Post-Processing</a:t>
+            </a:r>
+            <a:endParaRPr lang="en-US" sz="1200" b="1" kern="1200" dirty="0"/>
+          </a:p>
+        </p:txBody>
+      </p:sp>
+      <p:sp>
+        <p:nvSpPr>
+          <p:cNvPr id="39" name="Rounded Rectangle 38"/>
+          <p:cNvSpPr/>
+          <p:nvPr/>
+        </p:nvSpPr>
+        <p:spPr>
+          <a:xfrm>
+            <a:off x="2610256" y="2799070"/>
+            <a:ext cx="1511542" cy="1741760"/>
+          </a:xfrm>
+          <a:prstGeom prst="roundRect">
+            <a:avLst>
+              <a:gd name="adj" fmla="val 10000"/>
+            </a:avLst>
+          </a:prstGeom>
+        </p:spPr>
+        <p:style>
+          <a:lnRef idx="2">
+            <a:schemeClr val="accent1">
+              <a:hueOff val="0"/>
+              <a:satOff val="0"/>
+              <a:lumOff val="0"/>
+              <a:alphaOff val="0"/>
+            </a:schemeClr>
+          </a:lnRef>
+          <a:fillRef idx="1">
+            <a:schemeClr val="accent1">
+              <a:alpha val="90000"/>
+              <a:tint val="40000"/>
+              <a:hueOff val="0"/>
+              <a:satOff val="0"/>
+              <a:lumOff val="0"/>
+              <a:alphaOff val="0"/>
+            </a:schemeClr>
+          </a:fillRef>
+          <a:effectRef idx="0">
+            <a:schemeClr val="accent1">
+              <a:alpha val="90000"/>
+              <a:tint val="40000"/>
+              <a:hueOff val="0"/>
+              <a:satOff val="0"/>
+              <a:lumOff val="0"/>
+              <a:alphaOff val="0"/>
+            </a:schemeClr>
+          </a:effectRef>
+          <a:fontRef idx="minor">
+            <a:schemeClr val="dk1">
+              <a:hueOff val="0"/>
+              <a:satOff val="0"/>
+              <a:lumOff val="0"/>
+              <a:alphaOff val="0"/>
+            </a:schemeClr>
+          </a:fontRef>
+        </p:style>
+      </p:sp>
+      <p:sp>
+        <p:nvSpPr>
+          <p:cNvPr id="44" name="Freeform 43"/>
+          <p:cNvSpPr/>
+          <p:nvPr/>
+        </p:nvSpPr>
+        <p:spPr>
+          <a:xfrm>
+            <a:off x="2815117" y="2745486"/>
+            <a:ext cx="1599520" cy="594748"/>
+          </a:xfrm>
+          <a:custGeom>
+            <a:avLst/>
+            <a:gdLst>
+              <a:gd name="connsiteX0" fmla="*/ 0 w 1599520"/>
+              <a:gd name="connsiteY0" fmla="*/ 59475 h 594748"/>
+              <a:gd name="connsiteX1" fmla="*/ 59475 w 1599520"/>
+              <a:gd name="connsiteY1" fmla="*/ 0 h 594748"/>
+              <a:gd name="connsiteX2" fmla="*/ 1540045 w 1599520"/>
+              <a:gd name="connsiteY2" fmla="*/ 0 h 594748"/>
+              <a:gd name="connsiteX3" fmla="*/ 1599520 w 1599520"/>
+              <a:gd name="connsiteY3" fmla="*/ 59475 h 594748"/>
+              <a:gd name="connsiteX4" fmla="*/ 1599520 w 1599520"/>
+              <a:gd name="connsiteY4" fmla="*/ 535273 h 594748"/>
+              <a:gd name="connsiteX5" fmla="*/ 1540045 w 1599520"/>
+              <a:gd name="connsiteY5" fmla="*/ 594748 h 594748"/>
+              <a:gd name="connsiteX6" fmla="*/ 59475 w 1599520"/>
+              <a:gd name="connsiteY6" fmla="*/ 594748 h 594748"/>
+              <a:gd name="connsiteX7" fmla="*/ 0 w 1599520"/>
+              <a:gd name="connsiteY7" fmla="*/ 535273 h 594748"/>
+              <a:gd name="connsiteX8" fmla="*/ 0 w 1599520"/>
+              <a:gd name="connsiteY8" fmla="*/ 59475 h 594748"/>
+            </a:gdLst>
+            <a:ahLst/>
+            <a:cxnLst>
+              <a:cxn ang="0">
+                <a:pos x="connsiteX0" y="connsiteY0"/>
+              </a:cxn>
+              <a:cxn ang="0">
+                <a:pos x="connsiteX1" y="connsiteY1"/>
+              </a:cxn>
+              <a:cxn ang="0">
+                <a:pos x="connsiteX2" y="connsiteY2"/>
+              </a:cxn>
+              <a:cxn ang="0">
+                <a:pos x="connsiteX3" y="connsiteY3"/>
+              </a:cxn>
+              <a:cxn ang="0">
+                <a:pos x="connsiteX4" y="connsiteY4"/>
+              </a:cxn>
+              <a:cxn ang="0">
+                <a:pos x="connsiteX5" y="connsiteY5"/>
+              </a:cxn>
+              <a:cxn ang="0">
+                <a:pos x="connsiteX6" y="connsiteY6"/>
+              </a:cxn>
+              <a:cxn ang="0">
+                <a:pos x="connsiteX7" y="connsiteY7"/>
+              </a:cxn>
+              <a:cxn ang="0">
+                <a:pos x="connsiteX8" y="connsiteY8"/>
+              </a:cxn>
+            </a:cxnLst>
+            <a:rect l="l" t="t" r="r" b="b"/>
+            <a:pathLst>
+              <a:path w="1599520" h="594748">
+                <a:moveTo>
+                  <a:pt x="0" y="59475"/>
+                </a:moveTo>
+                <a:cubicBezTo>
+                  <a:pt x="0" y="26628"/>
+                  <a:pt x="26628" y="0"/>
+                  <a:pt x="59475" y="0"/>
+                </a:cubicBezTo>
+                <a:lnTo>
+                  <a:pt x="1540045" y="0"/>
+                </a:lnTo>
+                <a:cubicBezTo>
+                  <a:pt x="1572892" y="0"/>
+                  <a:pt x="1599520" y="26628"/>
+                  <a:pt x="1599520" y="59475"/>
+                </a:cubicBezTo>
+                <a:lnTo>
+                  <a:pt x="1599520" y="535273"/>
+                </a:lnTo>
+                <a:cubicBezTo>
+                  <a:pt x="1599520" y="568120"/>
+                  <a:pt x="1572892" y="594748"/>
+                  <a:pt x="1540045" y="594748"/>
+                </a:cubicBezTo>
+                <a:lnTo>
+                  <a:pt x="59475" y="594748"/>
+                </a:lnTo>
+                <a:cubicBezTo>
+                  <a:pt x="26628" y="594748"/>
+                  <a:pt x="0" y="568120"/>
+                  <a:pt x="0" y="535273"/>
+                </a:cubicBezTo>
+                <a:lnTo>
+                  <a:pt x="0" y="59475"/>
+                </a:lnTo>
+                <a:close/>
+              </a:path>
+            </a:pathLst>
+          </a:custGeom>
+        </p:spPr>
+        <p:style>
+          <a:lnRef idx="3">
+            <a:schemeClr val="accent1">
+              <a:shade val="80000"/>
+              <a:hueOff val="0"/>
+              <a:satOff val="0"/>
+              <a:lumOff val="0"/>
+              <a:alphaOff val="0"/>
+            </a:schemeClr>
+          </a:lnRef>
+          <a:fillRef idx="1">
+            <a:schemeClr val="lt1">
+              <a:hueOff val="0"/>
+              <a:satOff val="0"/>
+              <a:lumOff val="0"/>
+              <a:alphaOff val="0"/>
+            </a:schemeClr>
+          </a:fillRef>
+          <a:effectRef idx="1">
+            <a:schemeClr val="lt1">
+              <a:hueOff val="0"/>
+              <a:satOff val="0"/>
+              <a:lumOff val="0"/>
+              <a:alphaOff val="0"/>
+            </a:schemeClr>
+          </a:effectRef>
+          <a:fontRef idx="minor">
+            <a:schemeClr val="dk1">
+              <a:hueOff val="0"/>
+              <a:satOff val="0"/>
+              <a:lumOff val="0"/>
+              <a:alphaOff val="0"/>
+            </a:schemeClr>
+          </a:fontRef>
+        </p:style>
+        <p:txBody>
+          <a:bodyPr spcFirstLastPara="0" vert="horz" wrap="square" lIns="47900" tIns="37740" rIns="47900" bIns="37740" numCol="1" spcCol="1270" anchor="ctr" anchorCtr="0">
+            <a:noAutofit/>
+          </a:bodyPr>
+          <a:lstStyle/>
+          <a:p>
+            <a:pPr lvl="0" algn="ctr" defTabSz="711200">
+              <a:lnSpc>
+                <a:spcPct val="90000"/>
+              </a:lnSpc>
+              <a:spcBef>
+                <a:spcPct val="0"/>
+              </a:spcBef>
+              <a:spcAft>
+                <a:spcPct val="35000"/>
+              </a:spcAft>
+            </a:pPr>
+            <a:r>
+              <a:rPr lang="en-US" sz="1600" b="1" i="1" kern="1200" dirty="0">
                 <a:latin typeface="Arial Narrow" panose="020B0606020202030204" pitchFamily="34" charset="0"/>
-              </a:endParaRPr>
-            </a:p>
-            <a:p>
-              <a:pPr lvl="0" algn="ctr" defTabSz="711200">
-                <a:lnSpc>
-                  <a:spcPct val="90000"/>
-                </a:lnSpc>
-                <a:spcBef>
-                  <a:spcPct val="0"/>
-                </a:spcBef>
-                <a:spcAft>
-                  <a:spcPct val="35000"/>
-                </a:spcAft>
-              </a:pPr>
-              <a:r>
-                <a:rPr lang="en-US" sz="1600" b="1" i="1" kern="1200" dirty="0" smtClean="0">
-                  <a:latin typeface="Arial Narrow" panose="020B0606020202030204" pitchFamily="34" charset="0"/>
-                </a:rPr>
-                <a:t>Selection</a:t>
-              </a:r>
-              <a:endParaRPr lang="en-US" sz="1600" b="1" i="1" kern="1200" dirty="0">
-                <a:latin typeface="Arial Narrow" panose="020B0606020202030204" pitchFamily="34" charset="0"/>
-              </a:endParaRPr>
-            </a:p>
-          </p:txBody>
-        </p:sp>
-        <p:sp>
-          <p:nvSpPr>
-            <p:cNvPr id="54" name="Rounded Rectangle 53"/>
-            <p:cNvSpPr/>
-            <p:nvPr/>
-          </p:nvSpPr>
-          <p:spPr>
-            <a:xfrm>
-              <a:off x="6780255" y="2806628"/>
-              <a:ext cx="1511542" cy="1735926"/>
-            </a:xfrm>
-            <a:prstGeom prst="roundRect">
-              <a:avLst>
-                <a:gd name="adj" fmla="val 10000"/>
-              </a:avLst>
-            </a:prstGeom>
-          </p:spPr>
-          <p:style>
-            <a:lnRef idx="2">
-              <a:schemeClr val="accent1">
-                <a:hueOff val="0"/>
-                <a:satOff val="0"/>
-                <a:lumOff val="0"/>
-                <a:alphaOff val="0"/>
-              </a:schemeClr>
-            </a:lnRef>
-            <a:fillRef idx="1">
-              <a:schemeClr val="accent1">
-                <a:alpha val="90000"/>
-                <a:tint val="40000"/>
-                <a:hueOff val="0"/>
-                <a:satOff val="0"/>
-                <a:lumOff val="0"/>
-                <a:alphaOff val="0"/>
-              </a:schemeClr>
-            </a:fillRef>
-            <a:effectRef idx="0">
-              <a:schemeClr val="accent1">
-                <a:alpha val="90000"/>
-                <a:tint val="40000"/>
-                <a:hueOff val="0"/>
-                <a:satOff val="0"/>
-                <a:lumOff val="0"/>
-                <a:alphaOff val="0"/>
-              </a:schemeClr>
-            </a:effectRef>
-            <a:fontRef idx="minor">
-              <a:schemeClr val="dk1">
-                <a:hueOff val="0"/>
-                <a:satOff val="0"/>
-                <a:lumOff val="0"/>
-                <a:alphaOff val="0"/>
-              </a:schemeClr>
-            </a:fontRef>
-          </p:style>
-        </p:sp>
-        <p:sp>
-          <p:nvSpPr>
-            <p:cNvPr id="55" name="Freeform 54"/>
-            <p:cNvSpPr/>
-            <p:nvPr/>
-          </p:nvSpPr>
-          <p:spPr>
-            <a:xfrm>
-              <a:off x="7037204" y="2754358"/>
-              <a:ext cx="1578694" cy="580054"/>
-            </a:xfrm>
-            <a:custGeom>
-              <a:avLst/>
-              <a:gdLst>
-                <a:gd name="connsiteX0" fmla="*/ 0 w 1578694"/>
-                <a:gd name="connsiteY0" fmla="*/ 58005 h 580054"/>
-                <a:gd name="connsiteX1" fmla="*/ 58005 w 1578694"/>
-                <a:gd name="connsiteY1" fmla="*/ 0 h 580054"/>
-                <a:gd name="connsiteX2" fmla="*/ 1520689 w 1578694"/>
-                <a:gd name="connsiteY2" fmla="*/ 0 h 580054"/>
-                <a:gd name="connsiteX3" fmla="*/ 1578694 w 1578694"/>
-                <a:gd name="connsiteY3" fmla="*/ 58005 h 580054"/>
-                <a:gd name="connsiteX4" fmla="*/ 1578694 w 1578694"/>
-                <a:gd name="connsiteY4" fmla="*/ 522049 h 580054"/>
-                <a:gd name="connsiteX5" fmla="*/ 1520689 w 1578694"/>
-                <a:gd name="connsiteY5" fmla="*/ 580054 h 580054"/>
-                <a:gd name="connsiteX6" fmla="*/ 58005 w 1578694"/>
-                <a:gd name="connsiteY6" fmla="*/ 580054 h 580054"/>
-                <a:gd name="connsiteX7" fmla="*/ 0 w 1578694"/>
-                <a:gd name="connsiteY7" fmla="*/ 522049 h 580054"/>
-                <a:gd name="connsiteX8" fmla="*/ 0 w 1578694"/>
-                <a:gd name="connsiteY8" fmla="*/ 58005 h 580054"/>
-              </a:gdLst>
-              <a:ahLst/>
-              <a:cxnLst>
-                <a:cxn ang="0">
-                  <a:pos x="connsiteX0" y="connsiteY0"/>
-                </a:cxn>
-                <a:cxn ang="0">
-                  <a:pos x="connsiteX1" y="connsiteY1"/>
-                </a:cxn>
-                <a:cxn ang="0">
-                  <a:pos x="connsiteX2" y="connsiteY2"/>
-                </a:cxn>
-                <a:cxn ang="0">
-                  <a:pos x="connsiteX3" y="connsiteY3"/>
-                </a:cxn>
-                <a:cxn ang="0">
-                  <a:pos x="connsiteX4" y="connsiteY4"/>
-                </a:cxn>
-                <a:cxn ang="0">
-                  <a:pos x="connsiteX5" y="connsiteY5"/>
-                </a:cxn>
-                <a:cxn ang="0">
-                  <a:pos x="connsiteX6" y="connsiteY6"/>
-                </a:cxn>
-                <a:cxn ang="0">
-                  <a:pos x="connsiteX7" y="connsiteY7"/>
-                </a:cxn>
-                <a:cxn ang="0">
-                  <a:pos x="connsiteX8" y="connsiteY8"/>
-                </a:cxn>
-              </a:cxnLst>
-              <a:rect l="l" t="t" r="r" b="b"/>
-              <a:pathLst>
-                <a:path w="1578694" h="580054">
-                  <a:moveTo>
-                    <a:pt x="0" y="58005"/>
-                  </a:moveTo>
-                  <a:cubicBezTo>
-                    <a:pt x="0" y="25970"/>
-                    <a:pt x="25970" y="0"/>
-                    <a:pt x="58005" y="0"/>
-                  </a:cubicBezTo>
-                  <a:lnTo>
-                    <a:pt x="1520689" y="0"/>
-                  </a:lnTo>
-                  <a:cubicBezTo>
-                    <a:pt x="1552724" y="0"/>
-                    <a:pt x="1578694" y="25970"/>
-                    <a:pt x="1578694" y="58005"/>
-                  </a:cubicBezTo>
-                  <a:lnTo>
-                    <a:pt x="1578694" y="522049"/>
-                  </a:lnTo>
-                  <a:cubicBezTo>
-                    <a:pt x="1578694" y="554084"/>
-                    <a:pt x="1552724" y="580054"/>
-                    <a:pt x="1520689" y="580054"/>
-                  </a:cubicBezTo>
-                  <a:lnTo>
-                    <a:pt x="58005" y="580054"/>
-                  </a:lnTo>
-                  <a:cubicBezTo>
-                    <a:pt x="25970" y="580054"/>
-                    <a:pt x="0" y="554084"/>
-                    <a:pt x="0" y="522049"/>
-                  </a:cubicBezTo>
-                  <a:lnTo>
-                    <a:pt x="0" y="58005"/>
-                  </a:lnTo>
-                  <a:close/>
-                </a:path>
-              </a:pathLst>
-            </a:custGeom>
-          </p:spPr>
-          <p:style>
-            <a:lnRef idx="3">
-              <a:schemeClr val="accent1">
-                <a:shade val="80000"/>
-                <a:hueOff val="0"/>
-                <a:satOff val="0"/>
-                <a:lumOff val="0"/>
-                <a:alphaOff val="0"/>
-              </a:schemeClr>
-            </a:lnRef>
-            <a:fillRef idx="1">
-              <a:schemeClr val="lt1">
-                <a:hueOff val="0"/>
-                <a:satOff val="0"/>
-                <a:lumOff val="0"/>
-                <a:alphaOff val="0"/>
-              </a:schemeClr>
-            </a:fillRef>
-            <a:effectRef idx="1">
-              <a:schemeClr val="lt1">
-                <a:hueOff val="0"/>
-                <a:satOff val="0"/>
-                <a:lumOff val="0"/>
-                <a:alphaOff val="0"/>
-              </a:schemeClr>
-            </a:effectRef>
-            <a:fontRef idx="minor">
-              <a:schemeClr val="dk1">
-                <a:hueOff val="0"/>
-                <a:satOff val="0"/>
-                <a:lumOff val="0"/>
-                <a:alphaOff val="0"/>
-              </a:schemeClr>
-            </a:fontRef>
-          </p:style>
-          <p:txBody>
-            <a:bodyPr spcFirstLastPara="0" vert="horz" wrap="square" lIns="47469" tIns="37309" rIns="47469" bIns="37309" numCol="1" spcCol="1270" anchor="ctr" anchorCtr="0">
-              <a:noAutofit/>
-            </a:bodyPr>
-            <a:lstStyle/>
-            <a:p>
-              <a:pPr lvl="0" algn="ctr" defTabSz="711200">
-                <a:lnSpc>
-                  <a:spcPct val="90000"/>
-                </a:lnSpc>
-                <a:spcBef>
-                  <a:spcPct val="0"/>
-                </a:spcBef>
-                <a:spcAft>
-                  <a:spcPct val="35000"/>
-                </a:spcAft>
-              </a:pPr>
-              <a:r>
-                <a:rPr lang="en-US" sz="1600" b="1" kern="1200" dirty="0"/>
-                <a:t>Pre-Processing</a:t>
-              </a:r>
-            </a:p>
-          </p:txBody>
-        </p:sp>
-      </p:grpSp>
+              </a:rPr>
+              <a:t>Disambiguation</a:t>
+            </a:r>
+          </a:p>
+        </p:txBody>
+      </p:sp>
+      <p:sp>
+        <p:nvSpPr>
+          <p:cNvPr id="48" name="Rounded Rectangle 47"/>
+          <p:cNvSpPr/>
+          <p:nvPr/>
+        </p:nvSpPr>
+        <p:spPr>
+          <a:xfrm>
+            <a:off x="4790835" y="2786921"/>
+            <a:ext cx="1511542" cy="1702539"/>
+          </a:xfrm>
+          <a:prstGeom prst="roundRect">
+            <a:avLst>
+              <a:gd name="adj" fmla="val 10000"/>
+            </a:avLst>
+          </a:prstGeom>
+        </p:spPr>
+        <p:style>
+          <a:lnRef idx="2">
+            <a:schemeClr val="accent1">
+              <a:hueOff val="0"/>
+              <a:satOff val="0"/>
+              <a:lumOff val="0"/>
+              <a:alphaOff val="0"/>
+            </a:schemeClr>
+          </a:lnRef>
+          <a:fillRef idx="1">
+            <a:schemeClr val="accent1">
+              <a:alpha val="90000"/>
+              <a:tint val="40000"/>
+              <a:hueOff val="0"/>
+              <a:satOff val="0"/>
+              <a:lumOff val="0"/>
+              <a:alphaOff val="0"/>
+            </a:schemeClr>
+          </a:fillRef>
+          <a:effectRef idx="0">
+            <a:schemeClr val="accent1">
+              <a:alpha val="90000"/>
+              <a:tint val="40000"/>
+              <a:hueOff val="0"/>
+              <a:satOff val="0"/>
+              <a:lumOff val="0"/>
+              <a:alphaOff val="0"/>
+            </a:schemeClr>
+          </a:effectRef>
+          <a:fontRef idx="minor">
+            <a:schemeClr val="dk1">
+              <a:hueOff val="0"/>
+              <a:satOff val="0"/>
+              <a:lumOff val="0"/>
+              <a:alphaOff val="0"/>
+            </a:schemeClr>
+          </a:fontRef>
+        </p:style>
+      </p:sp>
+      <p:sp>
+        <p:nvSpPr>
+          <p:cNvPr id="51" name="Shape 50"/>
+          <p:cNvSpPr/>
+          <p:nvPr/>
+        </p:nvSpPr>
+        <p:spPr>
+          <a:xfrm rot="10800000">
+            <a:off x="5711824" y="2295431"/>
+            <a:ext cx="1843367" cy="1930187"/>
+          </a:xfrm>
+          <a:prstGeom prst="leftCircularArrow">
+            <a:avLst>
+              <a:gd name="adj1" fmla="val 3838"/>
+              <a:gd name="adj2" fmla="val 480147"/>
+              <a:gd name="adj3" fmla="val 2267822"/>
+              <a:gd name="adj4" fmla="val 9036653"/>
+              <a:gd name="adj5" fmla="val 4478"/>
+            </a:avLst>
+          </a:prstGeom>
+        </p:spPr>
+        <p:style>
+          <a:lnRef idx="0">
+            <a:schemeClr val="accent1">
+              <a:tint val="60000"/>
+              <a:hueOff val="0"/>
+              <a:satOff val="0"/>
+              <a:lumOff val="0"/>
+              <a:alphaOff val="0"/>
+            </a:schemeClr>
+          </a:lnRef>
+          <a:fillRef idx="1">
+            <a:schemeClr val="accent1">
+              <a:tint val="60000"/>
+              <a:hueOff val="0"/>
+              <a:satOff val="0"/>
+              <a:lumOff val="0"/>
+              <a:alphaOff val="0"/>
+            </a:schemeClr>
+          </a:fillRef>
+          <a:effectRef idx="1">
+            <a:schemeClr val="accent1">
+              <a:tint val="60000"/>
+              <a:hueOff val="0"/>
+              <a:satOff val="0"/>
+              <a:lumOff val="0"/>
+              <a:alphaOff val="0"/>
+            </a:schemeClr>
+          </a:effectRef>
+          <a:fontRef idx="minor">
+            <a:schemeClr val="dk1">
+              <a:hueOff val="0"/>
+              <a:satOff val="0"/>
+              <a:lumOff val="0"/>
+              <a:alphaOff val="0"/>
+            </a:schemeClr>
+          </a:fontRef>
+        </p:style>
+      </p:sp>
+      <p:sp>
+        <p:nvSpPr>
+          <p:cNvPr id="54" name="Rounded Rectangle 53"/>
+          <p:cNvSpPr/>
+          <p:nvPr/>
+        </p:nvSpPr>
+        <p:spPr>
+          <a:xfrm>
+            <a:off x="6802117" y="2817180"/>
+            <a:ext cx="1511542" cy="1735926"/>
+          </a:xfrm>
+          <a:prstGeom prst="roundRect">
+            <a:avLst>
+              <a:gd name="adj" fmla="val 10000"/>
+            </a:avLst>
+          </a:prstGeom>
+        </p:spPr>
+        <p:style>
+          <a:lnRef idx="2">
+            <a:schemeClr val="accent1">
+              <a:hueOff val="0"/>
+              <a:satOff val="0"/>
+              <a:lumOff val="0"/>
+              <a:alphaOff val="0"/>
+            </a:schemeClr>
+          </a:lnRef>
+          <a:fillRef idx="1">
+            <a:schemeClr val="accent1">
+              <a:alpha val="90000"/>
+              <a:tint val="40000"/>
+              <a:hueOff val="0"/>
+              <a:satOff val="0"/>
+              <a:lumOff val="0"/>
+              <a:alphaOff val="0"/>
+            </a:schemeClr>
+          </a:fillRef>
+          <a:effectRef idx="0">
+            <a:schemeClr val="accent1">
+              <a:alpha val="90000"/>
+              <a:tint val="40000"/>
+              <a:hueOff val="0"/>
+              <a:satOff val="0"/>
+              <a:lumOff val="0"/>
+              <a:alphaOff val="0"/>
+            </a:schemeClr>
+          </a:effectRef>
+          <a:fontRef idx="minor">
+            <a:schemeClr val="dk1">
+              <a:hueOff val="0"/>
+              <a:satOff val="0"/>
+              <a:lumOff val="0"/>
+              <a:alphaOff val="0"/>
+            </a:schemeClr>
+          </a:fontRef>
+        </p:style>
+      </p:sp>
+      <p:sp>
+        <p:nvSpPr>
+          <p:cNvPr id="55" name="Freeform 54"/>
+          <p:cNvSpPr/>
+          <p:nvPr/>
+        </p:nvSpPr>
+        <p:spPr>
+          <a:xfrm>
+            <a:off x="7059066" y="2764910"/>
+            <a:ext cx="1578694" cy="580054"/>
+          </a:xfrm>
+          <a:custGeom>
+            <a:avLst/>
+            <a:gdLst>
+              <a:gd name="connsiteX0" fmla="*/ 0 w 1578694"/>
+              <a:gd name="connsiteY0" fmla="*/ 58005 h 580054"/>
+              <a:gd name="connsiteX1" fmla="*/ 58005 w 1578694"/>
+              <a:gd name="connsiteY1" fmla="*/ 0 h 580054"/>
+              <a:gd name="connsiteX2" fmla="*/ 1520689 w 1578694"/>
+              <a:gd name="connsiteY2" fmla="*/ 0 h 580054"/>
+              <a:gd name="connsiteX3" fmla="*/ 1578694 w 1578694"/>
+              <a:gd name="connsiteY3" fmla="*/ 58005 h 580054"/>
+              <a:gd name="connsiteX4" fmla="*/ 1578694 w 1578694"/>
+              <a:gd name="connsiteY4" fmla="*/ 522049 h 580054"/>
+              <a:gd name="connsiteX5" fmla="*/ 1520689 w 1578694"/>
+              <a:gd name="connsiteY5" fmla="*/ 580054 h 580054"/>
+              <a:gd name="connsiteX6" fmla="*/ 58005 w 1578694"/>
+              <a:gd name="connsiteY6" fmla="*/ 580054 h 580054"/>
+              <a:gd name="connsiteX7" fmla="*/ 0 w 1578694"/>
+              <a:gd name="connsiteY7" fmla="*/ 522049 h 580054"/>
+              <a:gd name="connsiteX8" fmla="*/ 0 w 1578694"/>
+              <a:gd name="connsiteY8" fmla="*/ 58005 h 580054"/>
+            </a:gdLst>
+            <a:ahLst/>
+            <a:cxnLst>
+              <a:cxn ang="0">
+                <a:pos x="connsiteX0" y="connsiteY0"/>
+              </a:cxn>
+              <a:cxn ang="0">
+                <a:pos x="connsiteX1" y="connsiteY1"/>
+              </a:cxn>
+              <a:cxn ang="0">
+                <a:pos x="connsiteX2" y="connsiteY2"/>
+              </a:cxn>
+              <a:cxn ang="0">
+                <a:pos x="connsiteX3" y="connsiteY3"/>
+              </a:cxn>
+              <a:cxn ang="0">
+                <a:pos x="connsiteX4" y="connsiteY4"/>
+              </a:cxn>
+              <a:cxn ang="0">
+                <a:pos x="connsiteX5" y="connsiteY5"/>
+              </a:cxn>
+              <a:cxn ang="0">
+                <a:pos x="connsiteX6" y="connsiteY6"/>
+              </a:cxn>
+              <a:cxn ang="0">
+                <a:pos x="connsiteX7" y="connsiteY7"/>
+              </a:cxn>
+              <a:cxn ang="0">
+                <a:pos x="connsiteX8" y="connsiteY8"/>
+              </a:cxn>
+            </a:cxnLst>
+            <a:rect l="l" t="t" r="r" b="b"/>
+            <a:pathLst>
+              <a:path w="1578694" h="580054">
+                <a:moveTo>
+                  <a:pt x="0" y="58005"/>
+                </a:moveTo>
+                <a:cubicBezTo>
+                  <a:pt x="0" y="25970"/>
+                  <a:pt x="25970" y="0"/>
+                  <a:pt x="58005" y="0"/>
+                </a:cubicBezTo>
+                <a:lnTo>
+                  <a:pt x="1520689" y="0"/>
+                </a:lnTo>
+                <a:cubicBezTo>
+                  <a:pt x="1552724" y="0"/>
+                  <a:pt x="1578694" y="25970"/>
+                  <a:pt x="1578694" y="58005"/>
+                </a:cubicBezTo>
+                <a:lnTo>
+                  <a:pt x="1578694" y="522049"/>
+                </a:lnTo>
+                <a:cubicBezTo>
+                  <a:pt x="1578694" y="554084"/>
+                  <a:pt x="1552724" y="580054"/>
+                  <a:pt x="1520689" y="580054"/>
+                </a:cubicBezTo>
+                <a:lnTo>
+                  <a:pt x="58005" y="580054"/>
+                </a:lnTo>
+                <a:cubicBezTo>
+                  <a:pt x="25970" y="580054"/>
+                  <a:pt x="0" y="554084"/>
+                  <a:pt x="0" y="522049"/>
+                </a:cubicBezTo>
+                <a:lnTo>
+                  <a:pt x="0" y="58005"/>
+                </a:lnTo>
+                <a:close/>
+              </a:path>
+            </a:pathLst>
+          </a:custGeom>
+        </p:spPr>
+        <p:style>
+          <a:lnRef idx="3">
+            <a:schemeClr val="accent1">
+              <a:shade val="80000"/>
+              <a:hueOff val="0"/>
+              <a:satOff val="0"/>
+              <a:lumOff val="0"/>
+              <a:alphaOff val="0"/>
+            </a:schemeClr>
+          </a:lnRef>
+          <a:fillRef idx="1">
+            <a:schemeClr val="lt1">
+              <a:hueOff val="0"/>
+              <a:satOff val="0"/>
+              <a:lumOff val="0"/>
+              <a:alphaOff val="0"/>
+            </a:schemeClr>
+          </a:fillRef>
+          <a:effectRef idx="1">
+            <a:schemeClr val="lt1">
+              <a:hueOff val="0"/>
+              <a:satOff val="0"/>
+              <a:lumOff val="0"/>
+              <a:alphaOff val="0"/>
+            </a:schemeClr>
+          </a:effectRef>
+          <a:fontRef idx="minor">
+            <a:schemeClr val="dk1">
+              <a:hueOff val="0"/>
+              <a:satOff val="0"/>
+              <a:lumOff val="0"/>
+              <a:alphaOff val="0"/>
+            </a:schemeClr>
+          </a:fontRef>
+        </p:style>
+        <p:txBody>
+          <a:bodyPr spcFirstLastPara="0" vert="horz" wrap="square" lIns="47469" tIns="37309" rIns="47469" bIns="37309" numCol="1" spcCol="1270" anchor="ctr" anchorCtr="0">
+            <a:noAutofit/>
+          </a:bodyPr>
+          <a:lstStyle/>
+          <a:p>
+            <a:pPr lvl="0" algn="ctr" defTabSz="711200">
+              <a:lnSpc>
+                <a:spcPct val="90000"/>
+              </a:lnSpc>
+              <a:spcBef>
+                <a:spcPct val="0"/>
+              </a:spcBef>
+              <a:spcAft>
+                <a:spcPct val="35000"/>
+              </a:spcAft>
+            </a:pPr>
+            <a:r>
+              <a:rPr lang="en-US" sz="1600" b="1" kern="1200" dirty="0"/>
+              <a:t>Pre-Processing</a:t>
+            </a:r>
+          </a:p>
+        </p:txBody>
+      </p:sp>
       <p:cxnSp>
         <p:nvCxnSpPr>
           <p:cNvPr id="61" name="Straight Arrow Connector 60"/>
@@ -14929,7 +14722,7 @@
         </p:nvSpPr>
         <p:spPr>
           <a:xfrm>
-            <a:off x="2547549" y="923737"/>
+            <a:off x="2587619" y="923736"/>
             <a:ext cx="1343489" cy="307777"/>
           </a:xfrm>
           <a:prstGeom prst="rect">
@@ -15011,7 +14804,7 @@
         </p:nvSpPr>
         <p:spPr>
           <a:xfrm>
-            <a:off x="7300838" y="912590"/>
+            <a:off x="7300838" y="1012783"/>
             <a:ext cx="1379235" cy="577080"/>
           </a:xfrm>
           <a:prstGeom prst="rect">
@@ -15064,7 +14857,7 @@
         </p:nvSpPr>
         <p:spPr>
           <a:xfrm>
-            <a:off x="7300838" y="450261"/>
+            <a:off x="7311766" y="383204"/>
             <a:ext cx="1395750" cy="584775"/>
           </a:xfrm>
           <a:prstGeom prst="rect">
@@ -15779,7 +15572,7 @@
           <p:spPr>
             <a:xfrm>
               <a:off x="39731" y="3684144"/>
-              <a:ext cx="1224136" cy="1107996"/>
+              <a:ext cx="1224136" cy="769441"/>
             </a:xfrm>
             <a:prstGeom prst="rect">
               <a:avLst/>
@@ -15795,7 +15588,15 @@
               <a:pPr algn="ctr"/>
               <a:r>
                 <a:rPr lang="en-US" sz="1100" i="1" dirty="0" smtClean="0"/>
-                <a:t>“Insomniac presents &lt;EVENT&gt;Volume Sundays&lt;/EVENT&gt; featuring Zeds Dead…”</a:t>
+                <a:t>“Insomniac presents </a:t>
+              </a:r>
+              <a:r>
+                <a:rPr lang="en-US" sz="1100" i="1" dirty="0" smtClean="0"/>
+                <a:t>Volume Sundays featuring </a:t>
+              </a:r>
+              <a:r>
+                <a:rPr lang="en-US" sz="1100" i="1" dirty="0" smtClean="0"/>
+                <a:t>Zeds Dead…”</a:t>
               </a:r>
               <a:endParaRPr lang="en-US" sz="1100" i="1" dirty="0"/>
             </a:p>
@@ -15830,6 +15631,198 @@
               <a:t>Live</a:t>
             </a:r>
             <a:endParaRPr lang="en-US" sz="1300" dirty="0"/>
+          </a:p>
+        </p:txBody>
+      </p:sp>
+      <p:sp>
+        <p:nvSpPr>
+          <p:cNvPr id="52" name="Freeform 51"/>
+          <p:cNvSpPr/>
+          <p:nvPr/>
+        </p:nvSpPr>
+        <p:spPr>
+          <a:xfrm>
+            <a:off x="5011973" y="3994793"/>
+            <a:ext cx="1552991" cy="555332"/>
+          </a:xfrm>
+          <a:custGeom>
+            <a:avLst/>
+            <a:gdLst>
+              <a:gd name="connsiteX0" fmla="*/ 0 w 1552991"/>
+              <a:gd name="connsiteY0" fmla="*/ 55533 h 555332"/>
+              <a:gd name="connsiteX1" fmla="*/ 55533 w 1552991"/>
+              <a:gd name="connsiteY1" fmla="*/ 0 h 555332"/>
+              <a:gd name="connsiteX2" fmla="*/ 1497458 w 1552991"/>
+              <a:gd name="connsiteY2" fmla="*/ 0 h 555332"/>
+              <a:gd name="connsiteX3" fmla="*/ 1552991 w 1552991"/>
+              <a:gd name="connsiteY3" fmla="*/ 55533 h 555332"/>
+              <a:gd name="connsiteX4" fmla="*/ 1552991 w 1552991"/>
+              <a:gd name="connsiteY4" fmla="*/ 499799 h 555332"/>
+              <a:gd name="connsiteX5" fmla="*/ 1497458 w 1552991"/>
+              <a:gd name="connsiteY5" fmla="*/ 555332 h 555332"/>
+              <a:gd name="connsiteX6" fmla="*/ 55533 w 1552991"/>
+              <a:gd name="connsiteY6" fmla="*/ 555332 h 555332"/>
+              <a:gd name="connsiteX7" fmla="*/ 0 w 1552991"/>
+              <a:gd name="connsiteY7" fmla="*/ 499799 h 555332"/>
+              <a:gd name="connsiteX8" fmla="*/ 0 w 1552991"/>
+              <a:gd name="connsiteY8" fmla="*/ 55533 h 555332"/>
+            </a:gdLst>
+            <a:ahLst/>
+            <a:cxnLst>
+              <a:cxn ang="0">
+                <a:pos x="connsiteX0" y="connsiteY0"/>
+              </a:cxn>
+              <a:cxn ang="0">
+                <a:pos x="connsiteX1" y="connsiteY1"/>
+              </a:cxn>
+              <a:cxn ang="0">
+                <a:pos x="connsiteX2" y="connsiteY2"/>
+              </a:cxn>
+              <a:cxn ang="0">
+                <a:pos x="connsiteX3" y="connsiteY3"/>
+              </a:cxn>
+              <a:cxn ang="0">
+                <a:pos x="connsiteX4" y="connsiteY4"/>
+              </a:cxn>
+              <a:cxn ang="0">
+                <a:pos x="connsiteX5" y="connsiteY5"/>
+              </a:cxn>
+              <a:cxn ang="0">
+                <a:pos x="connsiteX6" y="connsiteY6"/>
+              </a:cxn>
+              <a:cxn ang="0">
+                <a:pos x="connsiteX7" y="connsiteY7"/>
+              </a:cxn>
+              <a:cxn ang="0">
+                <a:pos x="connsiteX8" y="connsiteY8"/>
+              </a:cxn>
+            </a:cxnLst>
+            <a:rect l="l" t="t" r="r" b="b"/>
+            <a:pathLst>
+              <a:path w="1552991" h="555332">
+                <a:moveTo>
+                  <a:pt x="0" y="55533"/>
+                </a:moveTo>
+                <a:cubicBezTo>
+                  <a:pt x="0" y="24863"/>
+                  <a:pt x="24863" y="0"/>
+                  <a:pt x="55533" y="0"/>
+                </a:cubicBezTo>
+                <a:lnTo>
+                  <a:pt x="1497458" y="0"/>
+                </a:lnTo>
+                <a:cubicBezTo>
+                  <a:pt x="1528128" y="0"/>
+                  <a:pt x="1552991" y="24863"/>
+                  <a:pt x="1552991" y="55533"/>
+                </a:cubicBezTo>
+                <a:lnTo>
+                  <a:pt x="1552991" y="499799"/>
+                </a:lnTo>
+                <a:cubicBezTo>
+                  <a:pt x="1552991" y="530469"/>
+                  <a:pt x="1528128" y="555332"/>
+                  <a:pt x="1497458" y="555332"/>
+                </a:cubicBezTo>
+                <a:lnTo>
+                  <a:pt x="55533" y="555332"/>
+                </a:lnTo>
+                <a:cubicBezTo>
+                  <a:pt x="24863" y="555332"/>
+                  <a:pt x="0" y="530469"/>
+                  <a:pt x="0" y="499799"/>
+                </a:cubicBezTo>
+                <a:lnTo>
+                  <a:pt x="0" y="55533"/>
+                </a:lnTo>
+                <a:close/>
+              </a:path>
+            </a:pathLst>
+          </a:custGeom>
+        </p:spPr>
+        <p:style>
+          <a:lnRef idx="3">
+            <a:schemeClr val="accent1">
+              <a:shade val="80000"/>
+              <a:hueOff val="0"/>
+              <a:satOff val="0"/>
+              <a:lumOff val="0"/>
+              <a:alphaOff val="0"/>
+            </a:schemeClr>
+          </a:lnRef>
+          <a:fillRef idx="1">
+            <a:schemeClr val="lt1">
+              <a:hueOff val="0"/>
+              <a:satOff val="0"/>
+              <a:lumOff val="0"/>
+              <a:alphaOff val="0"/>
+            </a:schemeClr>
+          </a:fillRef>
+          <a:effectRef idx="1">
+            <a:schemeClr val="lt1">
+              <a:hueOff val="0"/>
+              <a:satOff val="0"/>
+              <a:lumOff val="0"/>
+              <a:alphaOff val="0"/>
+            </a:schemeClr>
+          </a:effectRef>
+          <a:fontRef idx="minor">
+            <a:schemeClr val="dk1">
+              <a:hueOff val="0"/>
+              <a:satOff val="0"/>
+              <a:lumOff val="0"/>
+              <a:alphaOff val="0"/>
+            </a:schemeClr>
+          </a:fontRef>
+        </p:style>
+        <p:txBody>
+          <a:bodyPr spcFirstLastPara="0" vert="horz" wrap="square" lIns="46745" tIns="36585" rIns="46745" bIns="36585" numCol="1" spcCol="1270" anchor="ctr" anchorCtr="0">
+            <a:noAutofit/>
+          </a:bodyPr>
+          <a:lstStyle/>
+          <a:p>
+            <a:pPr lvl="0" algn="ctr" defTabSz="711200">
+              <a:lnSpc>
+                <a:spcPct val="90000"/>
+              </a:lnSpc>
+              <a:spcBef>
+                <a:spcPct val="0"/>
+              </a:spcBef>
+              <a:spcAft>
+                <a:spcPct val="35000"/>
+              </a:spcAft>
+            </a:pPr>
+            <a:r>
+              <a:rPr lang="en-US" sz="1600" b="1" i="1" kern="1200" dirty="0">
+                <a:latin typeface="Arial Narrow" panose="020B0606020202030204" pitchFamily="34" charset="0"/>
+              </a:rPr>
+              <a:t>Candidate </a:t>
+            </a:r>
+            <a:endParaRPr lang="en-US" sz="1600" b="1" i="1" kern="1200" dirty="0" smtClean="0">
+              <a:latin typeface="Arial Narrow" panose="020B0606020202030204" pitchFamily="34" charset="0"/>
+            </a:endParaRPr>
+          </a:p>
+          <a:p>
+            <a:pPr lvl="0" algn="ctr" defTabSz="711200">
+              <a:lnSpc>
+                <a:spcPct val="90000"/>
+              </a:lnSpc>
+              <a:spcBef>
+                <a:spcPct val="0"/>
+              </a:spcBef>
+              <a:spcAft>
+                <a:spcPct val="35000"/>
+              </a:spcAft>
+            </a:pPr>
+            <a:r>
+              <a:rPr lang="en-US" sz="1600" b="1" i="1" kern="1200" dirty="0" smtClean="0">
+                <a:latin typeface="Arial Narrow" panose="020B0606020202030204" pitchFamily="34" charset="0"/>
+              </a:rPr>
+              <a:t>Selection</a:t>
+            </a:r>
+            <a:endParaRPr lang="en-US" sz="1600" b="1" i="1" kern="1200" dirty="0">
+              <a:latin typeface="Arial Narrow" panose="020B0606020202030204" pitchFamily="34" charset="0"/>
+            </a:endParaRPr>
           </a:p>
         </p:txBody>
       </p:sp>

</xml_diff>

<commit_message>
some minor alignment improved
</commit_message>
<xml_diff>
--- a/paper/architecture_source.pptx
+++ b/paper/architecture_source.pptx
@@ -15496,113 +15496,90 @@
           </a:fontRef>
         </p:style>
       </p:cxnSp>
-      <p:grpSp>
-        <p:nvGrpSpPr>
-          <p:cNvPr id="104" name="Group 103"/>
-          <p:cNvGrpSpPr/>
+      <p:sp>
+        <p:nvSpPr>
+          <p:cNvPr id="107" name="Snip Diagonal Corner Rectangle 106"/>
+          <p:cNvSpPr/>
           <p:nvPr/>
-        </p:nvGrpSpPr>
-        <p:grpSpPr>
+        </p:nvSpPr>
+        <p:spPr>
           <a:xfrm>
-            <a:off x="7397573" y="5228498"/>
-            <a:ext cx="1224136" cy="1500838"/>
-            <a:chOff x="39731" y="3440582"/>
-            <a:chExt cx="1224136" cy="1500838"/>
+            <a:off x="7426306" y="5260903"/>
+            <a:ext cx="1166672" cy="1487240"/>
           </a:xfrm>
-        </p:grpSpPr>
-        <p:sp>
-          <p:nvSpPr>
-            <p:cNvPr id="107" name="Snip Diagonal Corner Rectangle 106"/>
-            <p:cNvSpPr/>
-            <p:nvPr/>
-          </p:nvSpPr>
-          <p:spPr>
-            <a:xfrm>
-              <a:off x="68463" y="3440582"/>
-              <a:ext cx="1166672" cy="1500838"/>
-            </a:xfrm>
-            <a:prstGeom prst="snip2DiagRect">
-              <a:avLst/>
-            </a:prstGeom>
+          <a:prstGeom prst="snip2DiagRect">
+            <a:avLst/>
+          </a:prstGeom>
+          <a:solidFill>
+            <a:schemeClr val="bg1"/>
+          </a:solidFill>
+          <a:ln w="28575">
             <a:solidFill>
-              <a:schemeClr val="bg1"/>
+              <a:schemeClr val="tx2"/>
             </a:solidFill>
-            <a:ln w="28575">
-              <a:solidFill>
-                <a:schemeClr val="tx2"/>
-              </a:solidFill>
-            </a:ln>
-            <a:effectLst>
-              <a:innerShdw blurRad="63500" dist="50800" dir="18900000">
-                <a:prstClr val="black">
-                  <a:alpha val="50000"/>
-                </a:prstClr>
-              </a:innerShdw>
-            </a:effectLst>
-          </p:spPr>
-          <p:style>
-            <a:lnRef idx="1">
-              <a:schemeClr val="accent1"/>
-            </a:lnRef>
-            <a:fillRef idx="2">
-              <a:schemeClr val="accent1"/>
-            </a:fillRef>
-            <a:effectRef idx="1">
-              <a:schemeClr val="accent1"/>
-            </a:effectRef>
-            <a:fontRef idx="minor">
-              <a:schemeClr val="dk1"/>
-            </a:fontRef>
-          </p:style>
-          <p:txBody>
-            <a:bodyPr rtlCol="0" anchor="ctr"/>
-            <a:lstStyle/>
-            <a:p>
-              <a:pPr algn="ctr"/>
-              <a:endParaRPr lang="en-US"/>
-            </a:p>
-          </p:txBody>
-        </p:sp>
-        <p:sp>
-          <p:nvSpPr>
-            <p:cNvPr id="108" name="TextBox 107"/>
-            <p:cNvSpPr txBox="1"/>
-            <p:nvPr/>
-          </p:nvSpPr>
-          <p:spPr>
-            <a:xfrm>
-              <a:off x="39731" y="3684144"/>
-              <a:ext cx="1224136" cy="769441"/>
-            </a:xfrm>
-            <a:prstGeom prst="rect">
-              <a:avLst/>
-            </a:prstGeom>
-            <a:noFill/>
-          </p:spPr>
-          <p:txBody>
-            <a:bodyPr wrap="square" rtlCol="0">
-              <a:spAutoFit/>
-            </a:bodyPr>
-            <a:lstStyle/>
-            <a:p>
-              <a:pPr algn="ctr"/>
-              <a:r>
-                <a:rPr lang="en-US" sz="1100" i="1" dirty="0" smtClean="0"/>
-                <a:t>“Insomniac presents </a:t>
-              </a:r>
-              <a:r>
-                <a:rPr lang="en-US" sz="1100" i="1" dirty="0" smtClean="0"/>
-                <a:t>Volume Sundays featuring </a:t>
-              </a:r>
-              <a:r>
-                <a:rPr lang="en-US" sz="1100" i="1" dirty="0" smtClean="0"/>
-                <a:t>Zeds Dead…”</a:t>
-              </a:r>
-              <a:endParaRPr lang="en-US" sz="1100" i="1" dirty="0"/>
-            </a:p>
-          </p:txBody>
-        </p:sp>
-      </p:grpSp>
+          </a:ln>
+          <a:effectLst>
+            <a:innerShdw blurRad="63500" dist="50800" dir="18900000">
+              <a:prstClr val="black">
+                <a:alpha val="50000"/>
+              </a:prstClr>
+            </a:innerShdw>
+          </a:effectLst>
+        </p:spPr>
+        <p:style>
+          <a:lnRef idx="1">
+            <a:schemeClr val="accent1"/>
+          </a:lnRef>
+          <a:fillRef idx="2">
+            <a:schemeClr val="accent1"/>
+          </a:fillRef>
+          <a:effectRef idx="1">
+            <a:schemeClr val="accent1"/>
+          </a:effectRef>
+          <a:fontRef idx="minor">
+            <a:schemeClr val="dk1"/>
+          </a:fontRef>
+        </p:style>
+        <p:txBody>
+          <a:bodyPr rtlCol="0" anchor="ctr"/>
+          <a:lstStyle/>
+          <a:p>
+            <a:pPr algn="ctr"/>
+            <a:endParaRPr lang="en-US"/>
+          </a:p>
+        </p:txBody>
+      </p:sp>
+      <p:sp>
+        <p:nvSpPr>
+          <p:cNvPr id="108" name="TextBox 107"/>
+          <p:cNvSpPr txBox="1"/>
+          <p:nvPr/>
+        </p:nvSpPr>
+        <p:spPr>
+          <a:xfrm>
+            <a:off x="7402700" y="5594196"/>
+            <a:ext cx="1224136" cy="769441"/>
+          </a:xfrm>
+          <a:prstGeom prst="rect">
+            <a:avLst/>
+          </a:prstGeom>
+          <a:noFill/>
+        </p:spPr>
+        <p:txBody>
+          <a:bodyPr wrap="square" rtlCol="0">
+            <a:spAutoFit/>
+          </a:bodyPr>
+          <a:lstStyle/>
+          <a:p>
+            <a:pPr algn="ctr"/>
+            <a:r>
+              <a:rPr lang="en-US" sz="1100" i="1" dirty="0" smtClean="0"/>
+              <a:t>“Insomniac presents Volume Sundays featuring Zeds Dead…”</a:t>
+            </a:r>
+            <a:endParaRPr lang="en-US" sz="1100" i="1" dirty="0"/>
+          </a:p>
+        </p:txBody>
+      </p:sp>
       <p:sp>
         <p:nvSpPr>
           <p:cNvPr id="131" name="Rectangle 130"/>

</xml_diff>

<commit_message>
polishing and fixing a couple of typos
</commit_message>
<xml_diff>
--- a/paper/architecture_source.pptx
+++ b/paper/architecture_source.pptx
@@ -37,7 +37,7 @@
       </p:grpSpPr>
       <p:sp>
         <p:nvSpPr>
-          <p:cNvPr id="39" name="PlaceHolder 1"/>
+          <p:cNvPr id="36" name="PlaceHolder 1"/>
           <p:cNvSpPr>
             <a:spLocks noGrp="1"/>
           </p:cNvSpPr>
@@ -67,7 +67,7 @@
       </p:sp>
       <p:sp>
         <p:nvSpPr>
-          <p:cNvPr id="40" name="PlaceHolder 2"/>
+          <p:cNvPr id="37" name="PlaceHolder 2"/>
           <p:cNvSpPr>
             <a:spLocks noGrp="1"/>
           </p:cNvSpPr>
@@ -97,7 +97,7 @@
       </p:sp>
       <p:sp>
         <p:nvSpPr>
-          <p:cNvPr id="41" name="PlaceHolder 3"/>
+          <p:cNvPr id="38" name="PlaceHolder 3"/>
           <p:cNvSpPr>
             <a:spLocks noGrp="1"/>
           </p:cNvSpPr>
@@ -128,7 +128,7 @@
       </p:sp>
       <p:sp>
         <p:nvSpPr>
-          <p:cNvPr id="42" name="PlaceHolder 4"/>
+          <p:cNvPr id="39" name="PlaceHolder 4"/>
           <p:cNvSpPr>
             <a:spLocks noGrp="1"/>
           </p:cNvSpPr>
@@ -158,7 +158,7 @@
       </p:sp>
       <p:sp>
         <p:nvSpPr>
-          <p:cNvPr id="43" name="PlaceHolder 5"/>
+          <p:cNvPr id="40" name="PlaceHolder 5"/>
           <p:cNvSpPr>
             <a:spLocks noGrp="1"/>
           </p:cNvSpPr>
@@ -179,7 +179,7 @@
           <a:bodyPr anchor="b" bIns="0" lIns="0" rIns="0" tIns="0" wrap="none"/>
           <a:p>
             <a:pPr algn="r"/>
-            <a:fld id="{FC4D60CB-595A-4E3C-986E-575C534599CD}" type="slidenum">
+            <a:fld id="{45BEC39B-EBE8-4226-8B6A-5F71F46DDE86}" type="slidenum">
               <a:rPr lang="en-IE"/>
               <a:t>&lt;number&gt;</a:t>
             </a:fld>
@@ -212,7 +212,7 @@
       </p:grpSpPr>
       <p:sp>
         <p:nvSpPr>
-          <p:cNvPr id="213" name="PlaceHolder 1"/>
+          <p:cNvPr id="210" name="PlaceHolder 1"/>
           <p:cNvSpPr>
             <a:spLocks noGrp="1"/>
           </p:cNvSpPr>
@@ -223,43 +223,47 @@
         <p:spPr>
           <a:xfrm>
             <a:off x="685800" y="4343400"/>
-            <a:ext cx="5486040" cy="4114440"/>
-          </a:xfrm>
-          <a:prstGeom prst="rect">
-            <a:avLst/>
-          </a:prstGeom>
-        </p:spPr>
-        <p:txBody>
-          <a:bodyPr/>
-          <a:p>
-            <a:endParaRPr/>
-          </a:p>
-        </p:txBody>
-      </p:sp>
-      <p:sp>
-        <p:nvSpPr>
-          <p:cNvPr id="214" name="TextShape 2"/>
-          <p:cNvSpPr txBox="1"/>
+            <a:ext cx="5485680" cy="4114080"/>
+          </a:xfrm>
+          <a:prstGeom prst="rect">
+            <a:avLst/>
+          </a:prstGeom>
+        </p:spPr>
+        <p:txBody>
+          <a:bodyPr bIns="0" lIns="0" rIns="0" tIns="0"/>
+          <a:p>
+            <a:endParaRPr/>
+          </a:p>
+        </p:txBody>
+      </p:sp>
+      <p:sp>
+        <p:nvSpPr>
+          <p:cNvPr id="211" name="CustomShape 2"/>
+          <p:cNvSpPr/>
           <p:nvPr/>
         </p:nvSpPr>
         <p:spPr>
           <a:xfrm>
             <a:off x="3884760" y="8685360"/>
-            <a:ext cx="2971440" cy="456840"/>
-          </a:xfrm>
-          <a:prstGeom prst="rect">
-            <a:avLst/>
-          </a:prstGeom>
-        </p:spPr>
-        <p:txBody>
-          <a:bodyPr anchor="b"/>
+            <a:ext cx="2971080" cy="456480"/>
+          </a:xfrm>
+          <a:prstGeom prst="rect">
+            <a:avLst/>
+          </a:prstGeom>
+          <a:noFill/>
+          <a:ln>
+            <a:noFill/>
+          </a:ln>
+        </p:spPr>
+        <p:txBody>
+          <a:bodyPr anchor="b" bIns="45000" lIns="90000" rIns="90000" tIns="45000"/>
           <a:p>
             <a:pPr algn="r">
               <a:lnSpc>
                 <a:spcPct val="100000"/>
               </a:lnSpc>
             </a:pPr>
-            <a:fld id="{8163C9B3-5449-46C6-A4A1-F3AFA21D090C}" type="slidenum">
+            <a:fld id="{7FD5484F-88ED-47A9-8630-F7CDF71BA3B5}" type="slidenum">
               <a:rPr lang="en-IE" sz="1200">
                 <a:solidFill>
                   <a:srgbClr val="000000"/>
@@ -297,7 +301,7 @@
       </p:grpSpPr>
       <p:sp>
         <p:nvSpPr>
-          <p:cNvPr id="215" name="PlaceHolder 1"/>
+          <p:cNvPr id="212" name="PlaceHolder 1"/>
           <p:cNvSpPr>
             <a:spLocks noGrp="1"/>
           </p:cNvSpPr>
@@ -308,43 +312,47 @@
         <p:spPr>
           <a:xfrm>
             <a:off x="685800" y="4343400"/>
-            <a:ext cx="5486040" cy="4114440"/>
-          </a:xfrm>
-          <a:prstGeom prst="rect">
-            <a:avLst/>
-          </a:prstGeom>
-        </p:spPr>
-        <p:txBody>
-          <a:bodyPr/>
-          <a:p>
-            <a:endParaRPr/>
-          </a:p>
-        </p:txBody>
-      </p:sp>
-      <p:sp>
-        <p:nvSpPr>
-          <p:cNvPr id="216" name="TextShape 2"/>
-          <p:cNvSpPr txBox="1"/>
+            <a:ext cx="5485680" cy="4114080"/>
+          </a:xfrm>
+          <a:prstGeom prst="rect">
+            <a:avLst/>
+          </a:prstGeom>
+        </p:spPr>
+        <p:txBody>
+          <a:bodyPr bIns="0" lIns="0" rIns="0" tIns="0"/>
+          <a:p>
+            <a:endParaRPr/>
+          </a:p>
+        </p:txBody>
+      </p:sp>
+      <p:sp>
+        <p:nvSpPr>
+          <p:cNvPr id="213" name="CustomShape 2"/>
+          <p:cNvSpPr/>
           <p:nvPr/>
         </p:nvSpPr>
         <p:spPr>
           <a:xfrm>
             <a:off x="3884760" y="8685360"/>
-            <a:ext cx="2971440" cy="456840"/>
-          </a:xfrm>
-          <a:prstGeom prst="rect">
-            <a:avLst/>
-          </a:prstGeom>
-        </p:spPr>
-        <p:txBody>
-          <a:bodyPr anchor="b"/>
+            <a:ext cx="2971080" cy="456480"/>
+          </a:xfrm>
+          <a:prstGeom prst="rect">
+            <a:avLst/>
+          </a:prstGeom>
+          <a:noFill/>
+          <a:ln>
+            <a:noFill/>
+          </a:ln>
+        </p:spPr>
+        <p:txBody>
+          <a:bodyPr anchor="b" bIns="45000" lIns="90000" rIns="90000" tIns="45000"/>
           <a:p>
             <a:pPr algn="r">
               <a:lnSpc>
                 <a:spcPct val="100000"/>
               </a:lnSpc>
             </a:pPr>
-            <a:fld id="{C7731087-8ABD-4D28-B41B-34B8CD732FF4}" type="slidenum">
+            <a:fld id="{1738A8C6-EDDE-4349-846F-1941C6A066AB}" type="slidenum">
               <a:rPr lang="en-IE" sz="1200">
                 <a:solidFill>
                   <a:srgbClr val="000000"/>
@@ -382,7 +390,7 @@
       </p:grpSpPr>
       <p:sp>
         <p:nvSpPr>
-          <p:cNvPr id="217" name="PlaceHolder 1"/>
+          <p:cNvPr id="214" name="PlaceHolder 1"/>
           <p:cNvSpPr>
             <a:spLocks noGrp="1"/>
           </p:cNvSpPr>
@@ -393,43 +401,47 @@
         <p:spPr>
           <a:xfrm>
             <a:off x="685800" y="4343400"/>
-            <a:ext cx="5486040" cy="4114440"/>
-          </a:xfrm>
-          <a:prstGeom prst="rect">
-            <a:avLst/>
-          </a:prstGeom>
-        </p:spPr>
-        <p:txBody>
-          <a:bodyPr/>
-          <a:p>
-            <a:endParaRPr/>
-          </a:p>
-        </p:txBody>
-      </p:sp>
-      <p:sp>
-        <p:nvSpPr>
-          <p:cNvPr id="218" name="TextShape 2"/>
-          <p:cNvSpPr txBox="1"/>
+            <a:ext cx="5485680" cy="4114080"/>
+          </a:xfrm>
+          <a:prstGeom prst="rect">
+            <a:avLst/>
+          </a:prstGeom>
+        </p:spPr>
+        <p:txBody>
+          <a:bodyPr bIns="0" lIns="0" rIns="0" tIns="0"/>
+          <a:p>
+            <a:endParaRPr/>
+          </a:p>
+        </p:txBody>
+      </p:sp>
+      <p:sp>
+        <p:nvSpPr>
+          <p:cNvPr id="215" name="CustomShape 2"/>
+          <p:cNvSpPr/>
           <p:nvPr/>
         </p:nvSpPr>
         <p:spPr>
           <a:xfrm>
             <a:off x="3884760" y="8685360"/>
-            <a:ext cx="2971440" cy="456840"/>
-          </a:xfrm>
-          <a:prstGeom prst="rect">
-            <a:avLst/>
-          </a:prstGeom>
-        </p:spPr>
-        <p:txBody>
-          <a:bodyPr anchor="b"/>
+            <a:ext cx="2971080" cy="456480"/>
+          </a:xfrm>
+          <a:prstGeom prst="rect">
+            <a:avLst/>
+          </a:prstGeom>
+          <a:noFill/>
+          <a:ln>
+            <a:noFill/>
+          </a:ln>
+        </p:spPr>
+        <p:txBody>
+          <a:bodyPr anchor="b" bIns="45000" lIns="90000" rIns="90000" tIns="45000"/>
           <a:p>
             <a:pPr algn="r">
               <a:lnSpc>
                 <a:spcPct val="100000"/>
               </a:lnSpc>
             </a:pPr>
-            <a:fld id="{1520E7E9-80EF-44EE-A915-40B1EEB3F398}" type="slidenum">
+            <a:fld id="{566D9128-776B-4CD9-B6FB-7872CAA6098A}" type="slidenum">
               <a:rPr lang="en-IE" sz="1200">
                 <a:solidFill>
                   <a:srgbClr val="000000"/>
@@ -467,7 +479,7 @@
       </p:grpSpPr>
       <p:sp>
         <p:nvSpPr>
-          <p:cNvPr id="219" name="PlaceHolder 1"/>
+          <p:cNvPr id="216" name="PlaceHolder 1"/>
           <p:cNvSpPr>
             <a:spLocks noGrp="1"/>
           </p:cNvSpPr>
@@ -478,43 +490,47 @@
         <p:spPr>
           <a:xfrm>
             <a:off x="685800" y="4343400"/>
-            <a:ext cx="5486040" cy="4114440"/>
-          </a:xfrm>
-          <a:prstGeom prst="rect">
-            <a:avLst/>
-          </a:prstGeom>
-        </p:spPr>
-        <p:txBody>
-          <a:bodyPr/>
-          <a:p>
-            <a:endParaRPr/>
-          </a:p>
-        </p:txBody>
-      </p:sp>
-      <p:sp>
-        <p:nvSpPr>
-          <p:cNvPr id="220" name="TextShape 2"/>
-          <p:cNvSpPr txBox="1"/>
+            <a:ext cx="5485680" cy="4114080"/>
+          </a:xfrm>
+          <a:prstGeom prst="rect">
+            <a:avLst/>
+          </a:prstGeom>
+        </p:spPr>
+        <p:txBody>
+          <a:bodyPr bIns="0" lIns="0" rIns="0" tIns="0"/>
+          <a:p>
+            <a:endParaRPr/>
+          </a:p>
+        </p:txBody>
+      </p:sp>
+      <p:sp>
+        <p:nvSpPr>
+          <p:cNvPr id="217" name="CustomShape 2"/>
+          <p:cNvSpPr/>
           <p:nvPr/>
         </p:nvSpPr>
         <p:spPr>
           <a:xfrm>
             <a:off x="3884760" y="8685360"/>
-            <a:ext cx="2971440" cy="456840"/>
-          </a:xfrm>
-          <a:prstGeom prst="rect">
-            <a:avLst/>
-          </a:prstGeom>
-        </p:spPr>
-        <p:txBody>
-          <a:bodyPr anchor="b"/>
+            <a:ext cx="2971080" cy="456480"/>
+          </a:xfrm>
+          <a:prstGeom prst="rect">
+            <a:avLst/>
+          </a:prstGeom>
+          <a:noFill/>
+          <a:ln>
+            <a:noFill/>
+          </a:ln>
+        </p:spPr>
+        <p:txBody>
+          <a:bodyPr anchor="b" bIns="45000" lIns="90000" rIns="90000" tIns="45000"/>
           <a:p>
             <a:pPr algn="r">
               <a:lnSpc>
                 <a:spcPct val="100000"/>
               </a:lnSpc>
             </a:pPr>
-            <a:fld id="{51F884DC-ADB4-40FC-A807-1266A62C2168}" type="slidenum">
+            <a:fld id="{9DB1D297-F4B2-46A1-9A16-39C125531F95}" type="slidenum">
               <a:rPr lang="en-IE" sz="1200">
                 <a:solidFill>
                   <a:srgbClr val="000000"/>
@@ -574,7 +590,7 @@
       </p:grpSpPr>
       <p:sp>
         <p:nvSpPr>
-          <p:cNvPr id="26" name="PlaceHolder 1"/>
+          <p:cNvPr id="23" name="PlaceHolder 1"/>
           <p:cNvSpPr>
             <a:spLocks noGrp="1"/>
           </p:cNvSpPr>
@@ -585,7 +601,7 @@
         <p:spPr>
           <a:xfrm>
             <a:off x="685800" y="2130480"/>
-            <a:ext cx="7772040" cy="1469880"/>
+            <a:ext cx="7771680" cy="1469880"/>
           </a:xfrm>
           <a:prstGeom prst="rect">
             <a:avLst/>
@@ -594,13 +610,14 @@
         <p:txBody>
           <a:bodyPr anchor="ctr" bIns="0" lIns="0" rIns="0" tIns="0" wrap="none"/>
           <a:p>
-            <a:endParaRPr/>
-          </a:p>
-        </p:txBody>
-      </p:sp>
-      <p:sp>
-        <p:nvSpPr>
-          <p:cNvPr id="27" name="PlaceHolder 2"/>
+            <a:pPr algn="ctr"/>
+            <a:endParaRPr/>
+          </a:p>
+        </p:txBody>
+      </p:sp>
+      <p:sp>
+        <p:nvSpPr>
+          <p:cNvPr id="24" name="PlaceHolder 2"/>
           <p:cNvSpPr>
             <a:spLocks noGrp="1"/>
           </p:cNvSpPr>
@@ -626,7 +643,7 @@
       </p:sp>
       <p:sp>
         <p:nvSpPr>
-          <p:cNvPr id="28" name="PlaceHolder 3"/>
+          <p:cNvPr id="25" name="PlaceHolder 3"/>
           <p:cNvSpPr>
             <a:spLocks noGrp="1"/>
           </p:cNvSpPr>
@@ -674,7 +691,7 @@
       </p:grpSpPr>
       <p:sp>
         <p:nvSpPr>
-          <p:cNvPr id="29" name="PlaceHolder 1"/>
+          <p:cNvPr id="26" name="PlaceHolder 1"/>
           <p:cNvSpPr>
             <a:spLocks noGrp="1"/>
           </p:cNvSpPr>
@@ -685,7 +702,7 @@
         <p:spPr>
           <a:xfrm>
             <a:off x="685800" y="2130480"/>
-            <a:ext cx="7772040" cy="1469880"/>
+            <a:ext cx="7771680" cy="1469880"/>
           </a:xfrm>
           <a:prstGeom prst="rect">
             <a:avLst/>
@@ -694,13 +711,14 @@
         <p:txBody>
           <a:bodyPr anchor="ctr" bIns="0" lIns="0" rIns="0" tIns="0" wrap="none"/>
           <a:p>
-            <a:endParaRPr/>
-          </a:p>
-        </p:txBody>
-      </p:sp>
-      <p:sp>
-        <p:nvSpPr>
-          <p:cNvPr id="30" name="PlaceHolder 2"/>
+            <a:pPr algn="ctr"/>
+            <a:endParaRPr/>
+          </a:p>
+        </p:txBody>
+      </p:sp>
+      <p:sp>
+        <p:nvSpPr>
+          <p:cNvPr id="27" name="PlaceHolder 2"/>
           <p:cNvSpPr>
             <a:spLocks noGrp="1"/>
           </p:cNvSpPr>
@@ -726,7 +744,7 @@
       </p:sp>
       <p:sp>
         <p:nvSpPr>
-          <p:cNvPr id="31" name="PlaceHolder 3"/>
+          <p:cNvPr id="28" name="PlaceHolder 3"/>
           <p:cNvSpPr>
             <a:spLocks noGrp="1"/>
           </p:cNvSpPr>
@@ -752,7 +770,7 @@
       </p:sp>
       <p:sp>
         <p:nvSpPr>
-          <p:cNvPr id="32" name="PlaceHolder 4"/>
+          <p:cNvPr id="29" name="PlaceHolder 4"/>
           <p:cNvSpPr>
             <a:spLocks noGrp="1"/>
           </p:cNvSpPr>
@@ -778,7 +796,7 @@
       </p:sp>
       <p:sp>
         <p:nvSpPr>
-          <p:cNvPr id="33" name="PlaceHolder 5"/>
+          <p:cNvPr id="30" name="PlaceHolder 5"/>
           <p:cNvSpPr>
             <a:spLocks noGrp="1"/>
           </p:cNvSpPr>
@@ -826,7 +844,7 @@
       </p:grpSpPr>
       <p:sp>
         <p:nvSpPr>
-          <p:cNvPr id="34" name="PlaceHolder 1"/>
+          <p:cNvPr id="31" name="PlaceHolder 1"/>
           <p:cNvSpPr>
             <a:spLocks noGrp="1"/>
           </p:cNvSpPr>
@@ -837,7 +855,7 @@
         <p:spPr>
           <a:xfrm>
             <a:off x="685800" y="2130480"/>
-            <a:ext cx="7772040" cy="1469880"/>
+            <a:ext cx="7771680" cy="1469880"/>
           </a:xfrm>
           <a:prstGeom prst="rect">
             <a:avLst/>
@@ -846,13 +864,14 @@
         <p:txBody>
           <a:bodyPr anchor="ctr" bIns="0" lIns="0" rIns="0" tIns="0" wrap="none"/>
           <a:p>
-            <a:endParaRPr/>
-          </a:p>
-        </p:txBody>
-      </p:sp>
-      <p:sp>
-        <p:nvSpPr>
-          <p:cNvPr id="35" name="PlaceHolder 2"/>
+            <a:pPr algn="ctr"/>
+            <a:endParaRPr/>
+          </a:p>
+        </p:txBody>
+      </p:sp>
+      <p:sp>
+        <p:nvSpPr>
+          <p:cNvPr id="32" name="PlaceHolder 2"/>
           <p:cNvSpPr>
             <a:spLocks noGrp="1"/>
           </p:cNvSpPr>
@@ -878,7 +897,7 @@
       </p:sp>
       <p:sp>
         <p:nvSpPr>
-          <p:cNvPr id="36" name="PlaceHolder 3"/>
+          <p:cNvPr id="33" name="PlaceHolder 3"/>
           <p:cNvSpPr>
             <a:spLocks noGrp="1"/>
           </p:cNvSpPr>
@@ -904,7 +923,7 @@
       </p:sp>
       <p:pic>
         <p:nvPicPr>
-          <p:cNvPr descr="" id="37" name=""/>
+          <p:cNvPr descr="" id="34" name=""/>
           <p:cNvPicPr/>
           <p:nvPr/>
         </p:nvPicPr>
@@ -929,7 +948,7 @@
       </p:pic>
       <p:pic>
         <p:nvPicPr>
-          <p:cNvPr descr="" id="38" name=""/>
+          <p:cNvPr descr="" id="35" name=""/>
           <p:cNvPicPr/>
           <p:nvPr/>
         </p:nvPicPr>
@@ -976,7 +995,7 @@
       </p:grpSpPr>
       <p:sp>
         <p:nvSpPr>
-          <p:cNvPr id="5" name="PlaceHolder 1"/>
+          <p:cNvPr id="2" name="PlaceHolder 1"/>
           <p:cNvSpPr>
             <a:spLocks noGrp="1"/>
           </p:cNvSpPr>
@@ -987,7 +1006,7 @@
         <p:spPr>
           <a:xfrm>
             <a:off x="685800" y="2130480"/>
-            <a:ext cx="7772040" cy="1469880"/>
+            <a:ext cx="7771680" cy="1469880"/>
           </a:xfrm>
           <a:prstGeom prst="rect">
             <a:avLst/>
@@ -996,13 +1015,14 @@
         <p:txBody>
           <a:bodyPr anchor="ctr" bIns="0" lIns="0" rIns="0" tIns="0" wrap="none"/>
           <a:p>
-            <a:endParaRPr/>
-          </a:p>
-        </p:txBody>
-      </p:sp>
-      <p:sp>
-        <p:nvSpPr>
-          <p:cNvPr id="6" name="PlaceHolder 2"/>
+            <a:pPr algn="ctr"/>
+            <a:endParaRPr/>
+          </a:p>
+        </p:txBody>
+      </p:sp>
+      <p:sp>
+        <p:nvSpPr>
+          <p:cNvPr id="3" name="PlaceHolder 2"/>
           <p:cNvSpPr>
             <a:spLocks noGrp="1"/>
           </p:cNvSpPr>
@@ -1051,7 +1071,7 @@
       </p:grpSpPr>
       <p:sp>
         <p:nvSpPr>
-          <p:cNvPr id="7" name="PlaceHolder 1"/>
+          <p:cNvPr id="4" name="PlaceHolder 1"/>
           <p:cNvSpPr>
             <a:spLocks noGrp="1"/>
           </p:cNvSpPr>
@@ -1062,7 +1082,7 @@
         <p:spPr>
           <a:xfrm>
             <a:off x="685800" y="2130480"/>
-            <a:ext cx="7772040" cy="1469880"/>
+            <a:ext cx="7771680" cy="1469880"/>
           </a:xfrm>
           <a:prstGeom prst="rect">
             <a:avLst/>
@@ -1071,13 +1091,14 @@
         <p:txBody>
           <a:bodyPr anchor="ctr" bIns="0" lIns="0" rIns="0" tIns="0" wrap="none"/>
           <a:p>
-            <a:endParaRPr/>
-          </a:p>
-        </p:txBody>
-      </p:sp>
-      <p:sp>
-        <p:nvSpPr>
-          <p:cNvPr id="8" name="PlaceHolder 2"/>
+            <a:pPr algn="ctr"/>
+            <a:endParaRPr/>
+          </a:p>
+        </p:txBody>
+      </p:sp>
+      <p:sp>
+        <p:nvSpPr>
+          <p:cNvPr id="5" name="PlaceHolder 2"/>
           <p:cNvSpPr>
             <a:spLocks noGrp="1"/>
           </p:cNvSpPr>
@@ -1125,7 +1146,7 @@
       </p:grpSpPr>
       <p:sp>
         <p:nvSpPr>
-          <p:cNvPr id="9" name="PlaceHolder 1"/>
+          <p:cNvPr id="6" name="PlaceHolder 1"/>
           <p:cNvSpPr>
             <a:spLocks noGrp="1"/>
           </p:cNvSpPr>
@@ -1136,7 +1157,7 @@
         <p:spPr>
           <a:xfrm>
             <a:off x="685800" y="2130480"/>
-            <a:ext cx="7772040" cy="1469880"/>
+            <a:ext cx="7771680" cy="1469880"/>
           </a:xfrm>
           <a:prstGeom prst="rect">
             <a:avLst/>
@@ -1145,13 +1166,14 @@
         <p:txBody>
           <a:bodyPr anchor="ctr" bIns="0" lIns="0" rIns="0" tIns="0" wrap="none"/>
           <a:p>
-            <a:endParaRPr/>
-          </a:p>
-        </p:txBody>
-      </p:sp>
-      <p:sp>
-        <p:nvSpPr>
-          <p:cNvPr id="10" name="PlaceHolder 2"/>
+            <a:pPr algn="ctr"/>
+            <a:endParaRPr/>
+          </a:p>
+        </p:txBody>
+      </p:sp>
+      <p:sp>
+        <p:nvSpPr>
+          <p:cNvPr id="7" name="PlaceHolder 2"/>
           <p:cNvSpPr>
             <a:spLocks noGrp="1"/>
           </p:cNvSpPr>
@@ -1177,7 +1199,7 @@
       </p:sp>
       <p:sp>
         <p:nvSpPr>
-          <p:cNvPr id="11" name="PlaceHolder 3"/>
+          <p:cNvPr id="8" name="PlaceHolder 3"/>
           <p:cNvSpPr>
             <a:spLocks noGrp="1"/>
           </p:cNvSpPr>
@@ -1225,7 +1247,7 @@
       </p:grpSpPr>
       <p:sp>
         <p:nvSpPr>
-          <p:cNvPr id="12" name="PlaceHolder 1"/>
+          <p:cNvPr id="9" name="PlaceHolder 1"/>
           <p:cNvSpPr>
             <a:spLocks noGrp="1"/>
           </p:cNvSpPr>
@@ -1236,7 +1258,7 @@
         <p:spPr>
           <a:xfrm>
             <a:off x="685800" y="2130480"/>
-            <a:ext cx="7772040" cy="1469880"/>
+            <a:ext cx="7771680" cy="1469880"/>
           </a:xfrm>
           <a:prstGeom prst="rect">
             <a:avLst/>
@@ -1245,6 +1267,7 @@
         <p:txBody>
           <a:bodyPr anchor="ctr" bIns="0" lIns="0" rIns="0" tIns="0" wrap="none"/>
           <a:p>
+            <a:pPr algn="ctr"/>
             <a:endParaRPr/>
           </a:p>
         </p:txBody>
@@ -1273,7 +1296,7 @@
       </p:grpSpPr>
       <p:sp>
         <p:nvSpPr>
-          <p:cNvPr id="13" name="PlaceHolder 1"/>
+          <p:cNvPr id="10" name="PlaceHolder 1"/>
           <p:cNvSpPr>
             <a:spLocks noGrp="1"/>
           </p:cNvSpPr>
@@ -1284,7 +1307,7 @@
         <p:spPr>
           <a:xfrm>
             <a:off x="685800" y="2130480"/>
-            <a:ext cx="7772040" cy="3451320"/>
+            <a:ext cx="7771680" cy="3451320"/>
           </a:xfrm>
           <a:prstGeom prst="rect">
             <a:avLst/>
@@ -1322,7 +1345,7 @@
       </p:grpSpPr>
       <p:sp>
         <p:nvSpPr>
-          <p:cNvPr id="14" name="PlaceHolder 1"/>
+          <p:cNvPr id="11" name="PlaceHolder 1"/>
           <p:cNvSpPr>
             <a:spLocks noGrp="1"/>
           </p:cNvSpPr>
@@ -1333,7 +1356,7 @@
         <p:spPr>
           <a:xfrm>
             <a:off x="685800" y="2130480"/>
-            <a:ext cx="7772040" cy="1469880"/>
+            <a:ext cx="7771680" cy="1469880"/>
           </a:xfrm>
           <a:prstGeom prst="rect">
             <a:avLst/>
@@ -1342,13 +1365,14 @@
         <p:txBody>
           <a:bodyPr anchor="ctr" bIns="0" lIns="0" rIns="0" tIns="0" wrap="none"/>
           <a:p>
-            <a:endParaRPr/>
-          </a:p>
-        </p:txBody>
-      </p:sp>
-      <p:sp>
-        <p:nvSpPr>
-          <p:cNvPr id="15" name="PlaceHolder 2"/>
+            <a:pPr algn="ctr"/>
+            <a:endParaRPr/>
+          </a:p>
+        </p:txBody>
+      </p:sp>
+      <p:sp>
+        <p:nvSpPr>
+          <p:cNvPr id="12" name="PlaceHolder 2"/>
           <p:cNvSpPr>
             <a:spLocks noGrp="1"/>
           </p:cNvSpPr>
@@ -1374,7 +1398,7 @@
       </p:sp>
       <p:sp>
         <p:nvSpPr>
-          <p:cNvPr id="16" name="PlaceHolder 3"/>
+          <p:cNvPr id="13" name="PlaceHolder 3"/>
           <p:cNvSpPr>
             <a:spLocks noGrp="1"/>
           </p:cNvSpPr>
@@ -1400,7 +1424,7 @@
       </p:sp>
       <p:sp>
         <p:nvSpPr>
-          <p:cNvPr id="17" name="PlaceHolder 4"/>
+          <p:cNvPr id="14" name="PlaceHolder 4"/>
           <p:cNvSpPr>
             <a:spLocks noGrp="1"/>
           </p:cNvSpPr>
@@ -1448,7 +1472,7 @@
       </p:grpSpPr>
       <p:sp>
         <p:nvSpPr>
-          <p:cNvPr id="18" name="PlaceHolder 1"/>
+          <p:cNvPr id="15" name="PlaceHolder 1"/>
           <p:cNvSpPr>
             <a:spLocks noGrp="1"/>
           </p:cNvSpPr>
@@ -1459,7 +1483,7 @@
         <p:spPr>
           <a:xfrm>
             <a:off x="685800" y="2130480"/>
-            <a:ext cx="7772040" cy="1469880"/>
+            <a:ext cx="7771680" cy="1469880"/>
           </a:xfrm>
           <a:prstGeom prst="rect">
             <a:avLst/>
@@ -1468,13 +1492,14 @@
         <p:txBody>
           <a:bodyPr anchor="ctr" bIns="0" lIns="0" rIns="0" tIns="0" wrap="none"/>
           <a:p>
-            <a:endParaRPr/>
-          </a:p>
-        </p:txBody>
-      </p:sp>
-      <p:sp>
-        <p:nvSpPr>
-          <p:cNvPr id="19" name="PlaceHolder 2"/>
+            <a:pPr algn="ctr"/>
+            <a:endParaRPr/>
+          </a:p>
+        </p:txBody>
+      </p:sp>
+      <p:sp>
+        <p:nvSpPr>
+          <p:cNvPr id="16" name="PlaceHolder 2"/>
           <p:cNvSpPr>
             <a:spLocks noGrp="1"/>
           </p:cNvSpPr>
@@ -1500,7 +1525,7 @@
       </p:sp>
       <p:sp>
         <p:nvSpPr>
-          <p:cNvPr id="20" name="PlaceHolder 3"/>
+          <p:cNvPr id="17" name="PlaceHolder 3"/>
           <p:cNvSpPr>
             <a:spLocks noGrp="1"/>
           </p:cNvSpPr>
@@ -1526,7 +1551,7 @@
       </p:sp>
       <p:sp>
         <p:nvSpPr>
-          <p:cNvPr id="21" name="PlaceHolder 4"/>
+          <p:cNvPr id="18" name="PlaceHolder 4"/>
           <p:cNvSpPr>
             <a:spLocks noGrp="1"/>
           </p:cNvSpPr>
@@ -1574,7 +1599,7 @@
       </p:grpSpPr>
       <p:sp>
         <p:nvSpPr>
-          <p:cNvPr id="22" name="PlaceHolder 1"/>
+          <p:cNvPr id="19" name="PlaceHolder 1"/>
           <p:cNvSpPr>
             <a:spLocks noGrp="1"/>
           </p:cNvSpPr>
@@ -1585,7 +1610,7 @@
         <p:spPr>
           <a:xfrm>
             <a:off x="685800" y="2130480"/>
-            <a:ext cx="7772040" cy="1469880"/>
+            <a:ext cx="7771680" cy="1469880"/>
           </a:xfrm>
           <a:prstGeom prst="rect">
             <a:avLst/>
@@ -1594,13 +1619,14 @@
         <p:txBody>
           <a:bodyPr anchor="ctr" bIns="0" lIns="0" rIns="0" tIns="0" wrap="none"/>
           <a:p>
-            <a:endParaRPr/>
-          </a:p>
-        </p:txBody>
-      </p:sp>
-      <p:sp>
-        <p:nvSpPr>
-          <p:cNvPr id="23" name="PlaceHolder 2"/>
+            <a:pPr algn="ctr"/>
+            <a:endParaRPr/>
+          </a:p>
+        </p:txBody>
+      </p:sp>
+      <p:sp>
+        <p:nvSpPr>
+          <p:cNvPr id="20" name="PlaceHolder 2"/>
           <p:cNvSpPr>
             <a:spLocks noGrp="1"/>
           </p:cNvSpPr>
@@ -1626,7 +1652,7 @@
       </p:sp>
       <p:sp>
         <p:nvSpPr>
-          <p:cNvPr id="24" name="PlaceHolder 3"/>
+          <p:cNvPr id="21" name="PlaceHolder 3"/>
           <p:cNvSpPr>
             <a:spLocks noGrp="1"/>
           </p:cNvSpPr>
@@ -1652,7 +1678,7 @@
       </p:sp>
       <p:sp>
         <p:nvSpPr>
-          <p:cNvPr id="25" name="PlaceHolder 4"/>
+          <p:cNvPr id="22" name="PlaceHolder 4"/>
           <p:cNvSpPr>
             <a:spLocks noGrp="1"/>
           </p:cNvSpPr>
@@ -1718,28 +1744,18 @@
         <p:spPr>
           <a:xfrm>
             <a:off x="685800" y="2130480"/>
-            <a:ext cx="7772040" cy="1469520"/>
-          </a:xfrm>
-          <a:prstGeom prst="rect">
-            <a:avLst/>
-          </a:prstGeom>
-        </p:spPr>
-        <p:txBody>
-          <a:bodyPr anchor="ctr"/>
-          <a:p>
-            <a:pPr algn="ctr">
-              <a:lnSpc>
-                <a:spcPct val="100000"/>
-              </a:lnSpc>
-            </a:pPr>
-            <a:r>
-              <a:rPr lang="en-US" sz="4400">
-                <a:solidFill>
-                  <a:srgbClr val="000000"/>
-                </a:solidFill>
-                <a:latin typeface="Calibri"/>
-              </a:rPr>
-              <a:t>Click to edit the title text formatClick to edit Master title style</a:t>
+            <a:ext cx="7771680" cy="1469520"/>
+          </a:xfrm>
+          <a:prstGeom prst="rect">
+            <a:avLst/>
+          </a:prstGeom>
+        </p:spPr>
+        <p:txBody>
+          <a:bodyPr anchor="ctr" bIns="0" lIns="0" rIns="0" tIns="0" wrap="none"/>
+          <a:p>
+            <a:r>
+              <a:rPr lang="en-IE"/>
+              <a:t>Click to edit the title text format</a:t>
             </a:r>
             <a:endParaRPr/>
           </a:p>
@@ -1748,112 +1764,6 @@
       <p:sp>
         <p:nvSpPr>
           <p:cNvPr id="1" name="PlaceHolder 2"/>
-          <p:cNvSpPr>
-            <a:spLocks noGrp="1"/>
-          </p:cNvSpPr>
-          <p:nvPr>
-            <p:ph type="dt"/>
-          </p:nvPr>
-        </p:nvSpPr>
-        <p:spPr>
-          <a:xfrm>
-            <a:off x="457200" y="6356520"/>
-            <a:ext cx="2133360" cy="364680"/>
-          </a:xfrm>
-          <a:prstGeom prst="rect">
-            <a:avLst/>
-          </a:prstGeom>
-        </p:spPr>
-        <p:txBody>
-          <a:bodyPr anchor="ctr"/>
-          <a:p>
-            <a:pPr>
-              <a:lnSpc>
-                <a:spcPct val="100000"/>
-              </a:lnSpc>
-            </a:pPr>
-            <a:r>
-              <a:rPr lang="en-IE" sz="1200">
-                <a:solidFill>
-                  <a:srgbClr val="8b8b8b"/>
-                </a:solidFill>
-                <a:latin typeface="Calibri"/>
-              </a:rPr>
-              <a:t>23/10/13</a:t>
-            </a:r>
-            <a:endParaRPr/>
-          </a:p>
-        </p:txBody>
-      </p:sp>
-      <p:sp>
-        <p:nvSpPr>
-          <p:cNvPr id="2" name="PlaceHolder 3"/>
-          <p:cNvSpPr>
-            <a:spLocks noGrp="1"/>
-          </p:cNvSpPr>
-          <p:nvPr>
-            <p:ph type="ftr"/>
-          </p:nvPr>
-        </p:nvSpPr>
-        <p:spPr>
-          <a:xfrm>
-            <a:off x="3124080" y="6356520"/>
-            <a:ext cx="2895120" cy="364680"/>
-          </a:xfrm>
-          <a:prstGeom prst="rect">
-            <a:avLst/>
-          </a:prstGeom>
-        </p:spPr>
-        <p:txBody>
-          <a:bodyPr anchor="ctr"/>
-          <a:p>
-            <a:endParaRPr/>
-          </a:p>
-        </p:txBody>
-      </p:sp>
-      <p:sp>
-        <p:nvSpPr>
-          <p:cNvPr id="3" name="PlaceHolder 4"/>
-          <p:cNvSpPr>
-            <a:spLocks noGrp="1"/>
-          </p:cNvSpPr>
-          <p:nvPr>
-            <p:ph type="sldNum"/>
-          </p:nvPr>
-        </p:nvSpPr>
-        <p:spPr>
-          <a:xfrm>
-            <a:off x="6553080" y="6356520"/>
-            <a:ext cx="2133360" cy="364680"/>
-          </a:xfrm>
-          <a:prstGeom prst="rect">
-            <a:avLst/>
-          </a:prstGeom>
-        </p:spPr>
-        <p:txBody>
-          <a:bodyPr anchor="ctr"/>
-          <a:p>
-            <a:pPr algn="r">
-              <a:lnSpc>
-                <a:spcPct val="100000"/>
-              </a:lnSpc>
-            </a:pPr>
-            <a:fld id="{9A6E3284-C1BC-4659-B6B7-7D22B78A0C7A}" type="slidenum">
-              <a:rPr lang="en-IE" sz="1200">
-                <a:solidFill>
-                  <a:srgbClr val="8b8b8b"/>
-                </a:solidFill>
-                <a:latin typeface="Calibri"/>
-              </a:rPr>
-              <a:t>&lt;number&gt;</a:t>
-            </a:fld>
-            <a:endParaRPr/>
-          </a:p>
-        </p:txBody>
-      </p:sp>
-      <p:sp>
-        <p:nvSpPr>
-          <p:cNvPr id="4" name="PlaceHolder 5"/>
           <p:cNvSpPr>
             <a:spLocks noGrp="1"/>
           </p:cNvSpPr>
@@ -1879,7 +1789,7 @@
               <a:buChar char=""/>
             </a:pPr>
             <a:r>
-              <a:rPr lang="en-US"/>
+              <a:rPr lang="en-IE"/>
               <a:t>Click to edit the outline text format</a:t>
             </a:r>
             <a:endParaRPr/>
@@ -1891,7 +1801,7 @@
               <a:buChar char=""/>
             </a:pPr>
             <a:r>
-              <a:rPr lang="en-US"/>
+              <a:rPr lang="en-IE"/>
               <a:t>Second Outline Level</a:t>
             </a:r>
             <a:endParaRPr/>
@@ -1903,7 +1813,7 @@
               <a:buChar char=""/>
             </a:pPr>
             <a:r>
-              <a:rPr lang="en-US"/>
+              <a:rPr lang="en-IE"/>
               <a:t>Third Outline Level</a:t>
             </a:r>
             <a:endParaRPr/>
@@ -1915,7 +1825,7 @@
               <a:buChar char=""/>
             </a:pPr>
             <a:r>
-              <a:rPr lang="en-US"/>
+              <a:rPr lang="en-IE"/>
               <a:t>Fourth Outline Level</a:t>
             </a:r>
             <a:endParaRPr/>
@@ -1927,7 +1837,7 @@
               <a:buChar char=""/>
             </a:pPr>
             <a:r>
-              <a:rPr lang="en-US"/>
+              <a:rPr lang="en-IE"/>
               <a:t>Fifth Outline Level</a:t>
             </a:r>
             <a:endParaRPr/>
@@ -1939,7 +1849,7 @@
               <a:buChar char=""/>
             </a:pPr>
             <a:r>
-              <a:rPr lang="en-US"/>
+              <a:rPr lang="en-IE"/>
               <a:t>Sixth Outline Level</a:t>
             </a:r>
             <a:endParaRPr/>
@@ -1951,7 +1861,7 @@
               <a:buChar char=""/>
             </a:pPr>
             <a:r>
-              <a:rPr lang="en-US"/>
+              <a:rPr lang="en-IE"/>
               <a:t>Seventh Outline Level</a:t>
             </a:r>
             <a:endParaRPr/>
@@ -1997,14 +1907,14 @@
       </p:grpSpPr>
       <p:sp>
         <p:nvSpPr>
-          <p:cNvPr id="44" name="CustomShape 1"/>
+          <p:cNvPr id="41" name="CustomShape 1"/>
           <p:cNvSpPr/>
           <p:nvPr/>
         </p:nvSpPr>
         <p:spPr>
           <a:xfrm>
             <a:off x="7522920" y="4178880"/>
-            <a:ext cx="1124280" cy="1500480"/>
+            <a:ext cx="1123920" cy="1500120"/>
           </a:xfrm>
           <a:prstGeom prst="snip2DiagRect">
             <a:avLst>
@@ -2025,14 +1935,14 @@
       </p:sp>
       <p:sp>
         <p:nvSpPr>
-          <p:cNvPr id="45" name="CustomShape 2"/>
+          <p:cNvPr id="42" name="CustomShape 2"/>
           <p:cNvSpPr/>
           <p:nvPr/>
         </p:nvSpPr>
         <p:spPr>
           <a:xfrm>
             <a:off x="107640" y="4160520"/>
-            <a:ext cx="1076400" cy="1500480"/>
+            <a:ext cx="1076040" cy="1500120"/>
           </a:xfrm>
           <a:prstGeom prst="snip2DiagRect">
             <a:avLst>
@@ -2053,14 +1963,14 @@
       </p:sp>
       <p:sp>
         <p:nvSpPr>
-          <p:cNvPr id="46" name="CustomShape 3"/>
+          <p:cNvPr id="43" name="CustomShape 3"/>
           <p:cNvSpPr/>
           <p:nvPr/>
         </p:nvSpPr>
         <p:spPr>
           <a:xfrm>
             <a:off x="1384920" y="1842840"/>
-            <a:ext cx="1295640" cy="1482480"/>
+            <a:ext cx="1295280" cy="1482120"/>
           </a:xfrm>
           <a:prstGeom prst="flowChartMagneticDisk">
             <a:avLst/>
@@ -2089,14 +1999,14 @@
       </p:sp>
       <p:sp>
         <p:nvSpPr>
-          <p:cNvPr id="47" name="CustomShape 4"/>
+          <p:cNvPr id="44" name="CustomShape 4"/>
           <p:cNvSpPr/>
           <p:nvPr/>
         </p:nvSpPr>
         <p:spPr>
           <a:xfrm>
             <a:off x="1405800" y="4149000"/>
-            <a:ext cx="5923080" cy="1511640"/>
+            <a:ext cx="5922720" cy="1511280"/>
           </a:xfrm>
           <a:prstGeom prst="roundRect">
             <a:avLst>
@@ -2116,14 +2026,14 @@
       </p:sp>
       <p:sp>
         <p:nvSpPr>
-          <p:cNvPr id="48" name="CustomShape 5"/>
+          <p:cNvPr id="45" name="CustomShape 5"/>
           <p:cNvSpPr/>
           <p:nvPr/>
         </p:nvSpPr>
         <p:spPr>
           <a:xfrm rot="10800000">
-            <a:off x="5961240" y="1844280"/>
-            <a:ext cx="1472400" cy="1482480"/>
+            <a:off x="5961600" y="1844280"/>
+            <a:ext cx="1472040" cy="1482120"/>
           </a:xfrm>
           <a:prstGeom prst="snip1Rect">
             <a:avLst>
@@ -2143,14 +2053,14 @@
       </p:sp>
       <p:sp>
         <p:nvSpPr>
-          <p:cNvPr id="49" name="CustomShape 6"/>
+          <p:cNvPr id="46" name="CustomShape 6"/>
           <p:cNvSpPr/>
           <p:nvPr/>
         </p:nvSpPr>
         <p:spPr>
           <a:xfrm>
             <a:off x="3833280" y="2066760"/>
-            <a:ext cx="1151640" cy="1007640"/>
+            <a:ext cx="1151280" cy="1007280"/>
           </a:xfrm>
           <a:prstGeom prst="rect">
             <a:avLst/>
@@ -2158,12 +2068,12 @@
           <a:solidFill>
             <a:srgbClr val="d9d9d9"/>
           </a:solidFill>
-          <a:ln w="19080">
+          <a:ln cap="rnd" w="19080">
             <a:solidFill>
               <a:srgbClr val="000000"/>
             </a:solidFill>
             <a:custDash>
-              <a:ds d="159000" sp="53000"/>
+              <a:ds d="8427000000" sp="2809000000"/>
             </a:custDash>
             <a:round/>
           </a:ln>
@@ -2171,14 +2081,14 @@
       </p:sp>
       <p:sp>
         <p:nvSpPr>
-          <p:cNvPr id="50" name="CustomShape 7"/>
+          <p:cNvPr id="47" name="CustomShape 7"/>
           <p:cNvSpPr/>
           <p:nvPr/>
         </p:nvSpPr>
         <p:spPr>
           <a:xfrm>
             <a:off x="1533240" y="4398480"/>
-            <a:ext cx="1215360" cy="1007640"/>
+            <a:ext cx="1215000" cy="1007280"/>
           </a:xfrm>
           <a:prstGeom prst="flowChartAlternateProcess">
             <a:avLst/>
@@ -2186,12 +2096,12 @@
           <a:solidFill>
             <a:srgbClr val="d9d9d9"/>
           </a:solidFill>
-          <a:ln w="19080">
+          <a:ln cap="rnd" w="19080">
             <a:solidFill>
               <a:srgbClr val="000000"/>
             </a:solidFill>
             <a:custDash>
-              <a:ds d="159000" sp="53000"/>
+              <a:ds d="8427000000" sp="2809000000"/>
             </a:custDash>
             <a:round/>
           </a:ln>
@@ -2199,14 +2109,14 @@
       </p:sp>
       <p:sp>
         <p:nvSpPr>
-          <p:cNvPr id="51" name="CustomShape 8"/>
+          <p:cNvPr id="48" name="CustomShape 8"/>
           <p:cNvSpPr/>
           <p:nvPr/>
         </p:nvSpPr>
         <p:spPr>
           <a:xfrm>
             <a:off x="3021480" y="4406040"/>
-            <a:ext cx="1191240" cy="1007640"/>
+            <a:ext cx="1190880" cy="1007280"/>
           </a:xfrm>
           <a:prstGeom prst="flowChartAlternateProcess">
             <a:avLst/>
@@ -2214,12 +2124,12 @@
           <a:solidFill>
             <a:srgbClr val="d9d9d9"/>
           </a:solidFill>
-          <a:ln w="19080">
+          <a:ln cap="rnd" w="19080">
             <a:solidFill>
               <a:srgbClr val="000000"/>
             </a:solidFill>
             <a:custDash>
-              <a:ds d="159000" sp="53000"/>
+              <a:ds d="8427000000" sp="2809000000"/>
             </a:custDash>
             <a:round/>
           </a:ln>
@@ -2227,14 +2137,14 @@
       </p:sp>
       <p:sp>
         <p:nvSpPr>
-          <p:cNvPr id="52" name="CustomShape 9"/>
+          <p:cNvPr id="49" name="CustomShape 9"/>
           <p:cNvSpPr/>
           <p:nvPr/>
         </p:nvSpPr>
         <p:spPr>
           <a:xfrm>
             <a:off x="4463280" y="4403520"/>
-            <a:ext cx="1189080" cy="1007640"/>
+            <a:ext cx="1188720" cy="1007280"/>
           </a:xfrm>
           <a:prstGeom prst="flowChartAlternateProcess">
             <a:avLst/>
@@ -2242,12 +2152,12 @@
           <a:solidFill>
             <a:srgbClr val="d9d9d9"/>
           </a:solidFill>
-          <a:ln w="19080">
+          <a:ln cap="rnd" w="19080">
             <a:solidFill>
               <a:srgbClr val="000000"/>
             </a:solidFill>
             <a:custDash>
-              <a:ds d="159000" sp="53000"/>
+              <a:ds d="8427000000" sp="2809000000"/>
             </a:custDash>
             <a:round/>
           </a:ln>
@@ -2255,14 +2165,14 @@
       </p:sp>
       <p:sp>
         <p:nvSpPr>
-          <p:cNvPr id="53" name="CustomShape 10"/>
+          <p:cNvPr id="50" name="CustomShape 10"/>
           <p:cNvSpPr/>
           <p:nvPr/>
         </p:nvSpPr>
         <p:spPr>
           <a:xfrm>
             <a:off x="5960880" y="4406040"/>
-            <a:ext cx="1247400" cy="1007640"/>
+            <a:ext cx="1247040" cy="1007280"/>
           </a:xfrm>
           <a:prstGeom prst="flowChartAlternateProcess">
             <a:avLst/>
@@ -2270,27 +2180,51 @@
           <a:solidFill>
             <a:srgbClr val="d9d9d9"/>
           </a:solidFill>
+          <a:ln cap="rnd" w="19080">
+            <a:solidFill>
+              <a:srgbClr val="000000"/>
+            </a:solidFill>
+            <a:custDash>
+              <a:ds d="8427000000" sp="2809000000"/>
+            </a:custDash>
+            <a:round/>
+          </a:ln>
+        </p:spPr>
+      </p:sp>
+      <p:sp>
+        <p:nvSpPr>
+          <p:cNvPr id="51" name="CustomShape 11"/>
+          <p:cNvSpPr/>
+          <p:nvPr/>
+        </p:nvSpPr>
+        <p:spPr>
+          <a:xfrm>
+            <a:off x="2706840" y="2570760"/>
+            <a:ext cx="1125720" cy="360"/>
+          </a:xfrm>
+          <a:prstGeom prst="straightConnector1">
+            <a:avLst/>
+          </a:prstGeom>
+          <a:noFill/>
           <a:ln w="19080">
             <a:solidFill>
               <a:srgbClr val="000000"/>
             </a:solidFill>
-            <a:custDash>
-              <a:ds d="159000" sp="53000"/>
-            </a:custDash>
-            <a:round/>
-          </a:ln>
-        </p:spPr>
-      </p:sp>
-      <p:sp>
-        <p:nvSpPr>
-          <p:cNvPr id="54" name="CustomShape 11"/>
-          <p:cNvSpPr/>
-          <p:nvPr/>
-        </p:nvSpPr>
-        <p:spPr>
-          <a:xfrm>
-            <a:off x="2706840" y="2570760"/>
-            <a:ext cx="1126080" cy="360"/>
+            <a:round/>
+            <a:tailEnd len="med" type="arrow" w="med"/>
+          </a:ln>
+        </p:spPr>
+      </p:sp>
+      <p:sp>
+        <p:nvSpPr>
+          <p:cNvPr id="52" name="CustomShape 12"/>
+          <p:cNvSpPr/>
+          <p:nvPr/>
+        </p:nvSpPr>
+        <p:spPr>
+          <a:xfrm>
+            <a:off x="4985280" y="2570760"/>
+            <a:ext cx="974880" cy="360"/>
           </a:xfrm>
           <a:prstGeom prst="straightConnector1">
             <a:avLst/>
@@ -2307,14 +2241,14 @@
       </p:sp>
       <p:sp>
         <p:nvSpPr>
-          <p:cNvPr id="55" name="CustomShape 12"/>
-          <p:cNvSpPr/>
-          <p:nvPr/>
-        </p:nvSpPr>
-        <p:spPr>
-          <a:xfrm>
-            <a:off x="4985280" y="2570760"/>
-            <a:ext cx="975240" cy="360"/>
+          <p:cNvPr id="53" name="CustomShape 13"/>
+          <p:cNvSpPr/>
+          <p:nvPr/>
+        </p:nvSpPr>
+        <p:spPr>
+          <a:xfrm flipH="1">
+            <a:off x="7192080" y="4895280"/>
+            <a:ext cx="314280" cy="3600"/>
           </a:xfrm>
           <a:prstGeom prst="straightConnector1">
             <a:avLst/>
@@ -2331,14 +2265,38 @@
       </p:sp>
       <p:sp>
         <p:nvSpPr>
-          <p:cNvPr id="56" name="CustomShape 13"/>
+          <p:cNvPr id="54" name="CustomShape 14"/>
+          <p:cNvSpPr/>
+          <p:nvPr/>
+        </p:nvSpPr>
+        <p:spPr>
+          <a:xfrm flipH="1" flipV="1">
+            <a:off x="5652000" y="4906800"/>
+            <a:ext cx="307440" cy="360"/>
+          </a:xfrm>
+          <a:prstGeom prst="straightConnector1">
+            <a:avLst/>
+          </a:prstGeom>
+          <a:noFill/>
+          <a:ln w="19080">
+            <a:solidFill>
+              <a:srgbClr val="000000"/>
+            </a:solidFill>
+            <a:round/>
+            <a:tailEnd len="med" type="arrow" w="med"/>
+          </a:ln>
+        </p:spPr>
+      </p:sp>
+      <p:sp>
+        <p:nvSpPr>
+          <p:cNvPr id="55" name="CustomShape 15"/>
           <p:cNvSpPr/>
           <p:nvPr/>
         </p:nvSpPr>
         <p:spPr>
           <a:xfrm flipH="1">
-            <a:off x="7192800" y="4895280"/>
-            <a:ext cx="314640" cy="3960"/>
+            <a:off x="4210920" y="4900320"/>
+            <a:ext cx="288360" cy="1800"/>
           </a:xfrm>
           <a:prstGeom prst="straightConnector1">
             <a:avLst/>
@@ -2355,14 +2313,14 @@
       </p:sp>
       <p:sp>
         <p:nvSpPr>
-          <p:cNvPr id="57" name="CustomShape 14"/>
-          <p:cNvSpPr/>
-          <p:nvPr/>
-        </p:nvSpPr>
-        <p:spPr>
-          <a:xfrm flipH="1" flipV="1">
-            <a:off x="5652000" y="4907520"/>
-            <a:ext cx="307800" cy="720"/>
+          <p:cNvPr id="56" name="CustomShape 16"/>
+          <p:cNvSpPr/>
+          <p:nvPr/>
+        </p:nvSpPr>
+        <p:spPr>
+          <a:xfrm flipH="1">
+            <a:off x="2731680" y="4907520"/>
+            <a:ext cx="288360" cy="1800"/>
           </a:xfrm>
           <a:prstGeom prst="straightConnector1">
             <a:avLst/>
@@ -2379,62 +2337,14 @@
       </p:sp>
       <p:sp>
         <p:nvSpPr>
-          <p:cNvPr id="58" name="CustomShape 15"/>
-          <p:cNvSpPr/>
-          <p:nvPr/>
-        </p:nvSpPr>
-        <p:spPr>
-          <a:xfrm flipH="1">
-            <a:off x="4211640" y="4900320"/>
-            <a:ext cx="288720" cy="2160"/>
-          </a:xfrm>
-          <a:prstGeom prst="straightConnector1">
-            <a:avLst/>
-          </a:prstGeom>
-          <a:noFill/>
-          <a:ln w="19080">
-            <a:solidFill>
-              <a:srgbClr val="000000"/>
-            </a:solidFill>
-            <a:round/>
-            <a:tailEnd len="med" type="arrow" w="med"/>
-          </a:ln>
-        </p:spPr>
-      </p:sp>
-      <p:sp>
-        <p:nvSpPr>
-          <p:cNvPr id="59" name="CustomShape 16"/>
-          <p:cNvSpPr/>
-          <p:nvPr/>
-        </p:nvSpPr>
-        <p:spPr>
-          <a:xfrm flipH="1">
-            <a:off x="2732400" y="4907520"/>
-            <a:ext cx="288720" cy="2160"/>
-          </a:xfrm>
-          <a:prstGeom prst="straightConnector1">
-            <a:avLst/>
-          </a:prstGeom>
-          <a:noFill/>
-          <a:ln w="19080">
-            <a:solidFill>
-              <a:srgbClr val="000000"/>
-            </a:solidFill>
-            <a:round/>
-            <a:tailEnd len="med" type="arrow" w="med"/>
-          </a:ln>
-        </p:spPr>
-      </p:sp>
-      <p:sp>
-        <p:nvSpPr>
-          <p:cNvPr id="60" name="CustomShape 17"/>
+          <p:cNvPr id="57" name="CustomShape 17"/>
           <p:cNvSpPr/>
           <p:nvPr/>
         </p:nvSpPr>
         <p:spPr>
           <a:xfrm flipH="1">
             <a:off x="1183320" y="4895280"/>
-            <a:ext cx="348840" cy="4680"/>
+            <a:ext cx="348480" cy="4320"/>
           </a:xfrm>
           <a:prstGeom prst="straightConnector1">
             <a:avLst/>
@@ -2451,14 +2361,14 @@
       </p:sp>
       <p:sp>
         <p:nvSpPr>
-          <p:cNvPr id="61" name="CustomShape 18"/>
+          <p:cNvPr id="58" name="CustomShape 18"/>
           <p:cNvSpPr/>
           <p:nvPr/>
         </p:nvSpPr>
         <p:spPr>
           <a:xfrm>
             <a:off x="1533240" y="2431440"/>
-            <a:ext cx="1343160" cy="303480"/>
+            <a:ext cx="1342800" cy="303120"/>
           </a:xfrm>
           <a:prstGeom prst="rect">
             <a:avLst/>
@@ -2491,14 +2401,14 @@
       </p:sp>
       <p:sp>
         <p:nvSpPr>
-          <p:cNvPr id="62" name="CustomShape 19"/>
+          <p:cNvPr id="59" name="CustomShape 19"/>
           <p:cNvSpPr/>
           <p:nvPr/>
         </p:nvSpPr>
         <p:spPr>
           <a:xfrm>
             <a:off x="3737520" y="2393280"/>
-            <a:ext cx="1343160" cy="303480"/>
+            <a:ext cx="1342800" cy="303120"/>
           </a:xfrm>
           <a:prstGeom prst="rect">
             <a:avLst/>
@@ -2531,14 +2441,14 @@
       </p:sp>
       <p:sp>
         <p:nvSpPr>
-          <p:cNvPr id="63" name="CustomShape 20"/>
+          <p:cNvPr id="60" name="CustomShape 20"/>
           <p:cNvSpPr/>
           <p:nvPr/>
         </p:nvSpPr>
         <p:spPr>
           <a:xfrm>
             <a:off x="5914440" y="2464560"/>
-            <a:ext cx="1564920" cy="637920"/>
+            <a:ext cx="1564560" cy="637560"/>
           </a:xfrm>
           <a:prstGeom prst="rect">
             <a:avLst/>
@@ -2605,14 +2515,14 @@
       </p:sp>
       <p:sp>
         <p:nvSpPr>
-          <p:cNvPr id="64" name="CustomShape 21"/>
+          <p:cNvPr id="61" name="CustomShape 21"/>
           <p:cNvSpPr/>
           <p:nvPr/>
         </p:nvSpPr>
         <p:spPr>
           <a:xfrm>
             <a:off x="5895720" y="1957680"/>
-            <a:ext cx="1583640" cy="303480"/>
+            <a:ext cx="1583280" cy="303120"/>
           </a:xfrm>
           <a:prstGeom prst="rect">
             <a:avLst/>
@@ -2645,14 +2555,14 @@
       </p:sp>
       <p:sp>
         <p:nvSpPr>
-          <p:cNvPr id="65" name="CustomShape 22"/>
+          <p:cNvPr id="62" name="CustomShape 22"/>
           <p:cNvSpPr/>
           <p:nvPr/>
         </p:nvSpPr>
         <p:spPr>
           <a:xfrm>
             <a:off x="2672280" y="1734120"/>
-            <a:ext cx="306360" cy="287640"/>
+            <a:ext cx="306000" cy="287280"/>
           </a:xfrm>
           <a:prstGeom prst="flowChartConnector">
             <a:avLst/>
@@ -2670,14 +2580,14 @@
       </p:sp>
       <p:sp>
         <p:nvSpPr>
-          <p:cNvPr id="66" name="CustomShape 23"/>
+          <p:cNvPr id="63" name="CustomShape 23"/>
           <p:cNvSpPr/>
           <p:nvPr/>
         </p:nvSpPr>
         <p:spPr>
           <a:xfrm>
             <a:off x="2706840" y="1734120"/>
-            <a:ext cx="216720" cy="303480"/>
+            <a:ext cx="216360" cy="303120"/>
           </a:xfrm>
           <a:prstGeom prst="rect">
             <a:avLst/>
@@ -2710,14 +2620,14 @@
       </p:sp>
       <p:sp>
         <p:nvSpPr>
-          <p:cNvPr id="67" name="CustomShape 24"/>
+          <p:cNvPr id="64" name="CustomShape 24"/>
           <p:cNvSpPr/>
           <p:nvPr/>
         </p:nvSpPr>
         <p:spPr>
           <a:xfrm>
             <a:off x="4950720" y="1734120"/>
-            <a:ext cx="306360" cy="287640"/>
+            <a:ext cx="306000" cy="287280"/>
           </a:xfrm>
           <a:prstGeom prst="flowChartConnector">
             <a:avLst/>
@@ -2735,14 +2645,14 @@
       </p:sp>
       <p:sp>
         <p:nvSpPr>
-          <p:cNvPr id="68" name="CustomShape 25"/>
+          <p:cNvPr id="65" name="CustomShape 25"/>
           <p:cNvSpPr/>
           <p:nvPr/>
         </p:nvSpPr>
         <p:spPr>
           <a:xfrm>
             <a:off x="4985280" y="1734120"/>
-            <a:ext cx="216720" cy="303480"/>
+            <a:ext cx="216360" cy="303120"/>
           </a:xfrm>
           <a:prstGeom prst="rect">
             <a:avLst/>
@@ -2775,14 +2685,14 @@
       </p:sp>
       <p:sp>
         <p:nvSpPr>
-          <p:cNvPr id="69" name="CustomShape 26"/>
+          <p:cNvPr id="66" name="CustomShape 26"/>
           <p:cNvSpPr/>
           <p:nvPr/>
         </p:nvSpPr>
         <p:spPr>
           <a:xfrm>
             <a:off x="8561160" y="4034880"/>
-            <a:ext cx="306360" cy="287640"/>
+            <a:ext cx="306000" cy="287280"/>
           </a:xfrm>
           <a:prstGeom prst="flowChartConnector">
             <a:avLst/>
@@ -2800,14 +2710,14 @@
       </p:sp>
       <p:sp>
         <p:nvSpPr>
-          <p:cNvPr id="70" name="CustomShape 27"/>
+          <p:cNvPr id="67" name="CustomShape 27"/>
           <p:cNvSpPr/>
           <p:nvPr/>
         </p:nvSpPr>
         <p:spPr>
           <a:xfrm>
             <a:off x="8566560" y="4034880"/>
-            <a:ext cx="216720" cy="303480"/>
+            <a:ext cx="216360" cy="303120"/>
           </a:xfrm>
           <a:prstGeom prst="rect">
             <a:avLst/>
@@ -2840,14 +2750,14 @@
       </p:sp>
       <p:sp>
         <p:nvSpPr>
-          <p:cNvPr id="71" name="CustomShape 28"/>
+          <p:cNvPr id="68" name="CustomShape 28"/>
           <p:cNvSpPr/>
           <p:nvPr/>
         </p:nvSpPr>
         <p:spPr>
           <a:xfrm>
             <a:off x="7085520" y="3828600"/>
-            <a:ext cx="306360" cy="287640"/>
+            <a:ext cx="306000" cy="287280"/>
           </a:xfrm>
           <a:prstGeom prst="flowChartConnector">
             <a:avLst/>
@@ -2865,14 +2775,14 @@
       </p:sp>
       <p:sp>
         <p:nvSpPr>
-          <p:cNvPr id="72" name="CustomShape 29"/>
+          <p:cNvPr id="69" name="CustomShape 29"/>
           <p:cNvSpPr/>
           <p:nvPr/>
         </p:nvSpPr>
         <p:spPr>
           <a:xfrm>
             <a:off x="7119720" y="3828600"/>
-            <a:ext cx="216720" cy="303480"/>
+            <a:ext cx="216360" cy="303120"/>
           </a:xfrm>
           <a:prstGeom prst="rect">
             <a:avLst/>
@@ -2905,14 +2815,14 @@
       </p:sp>
       <p:sp>
         <p:nvSpPr>
-          <p:cNvPr id="73" name="CustomShape 30"/>
+          <p:cNvPr id="70" name="CustomShape 30"/>
           <p:cNvSpPr/>
           <p:nvPr/>
         </p:nvSpPr>
         <p:spPr>
           <a:xfrm>
             <a:off x="1035360" y="3972600"/>
-            <a:ext cx="306360" cy="287640"/>
+            <a:ext cx="306000" cy="287280"/>
           </a:xfrm>
           <a:prstGeom prst="flowChartConnector">
             <a:avLst/>
@@ -2930,14 +2840,14 @@
       </p:sp>
       <p:sp>
         <p:nvSpPr>
-          <p:cNvPr id="74" name="CustomShape 31"/>
+          <p:cNvPr id="71" name="CustomShape 31"/>
           <p:cNvSpPr/>
           <p:nvPr/>
         </p:nvSpPr>
         <p:spPr>
           <a:xfrm>
             <a:off x="1069920" y="3972600"/>
-            <a:ext cx="216720" cy="303480"/>
+            <a:ext cx="216360" cy="303120"/>
           </a:xfrm>
           <a:prstGeom prst="rect">
             <a:avLst/>
@@ -2970,14 +2880,14 @@
       </p:sp>
       <p:sp>
         <p:nvSpPr>
-          <p:cNvPr id="75" name="CustomShape 32"/>
+          <p:cNvPr id="72" name="CustomShape 32"/>
           <p:cNvSpPr/>
           <p:nvPr/>
         </p:nvSpPr>
         <p:spPr>
           <a:xfrm>
             <a:off x="44280" y="4380840"/>
-            <a:ext cx="1223640" cy="927360"/>
+            <a:ext cx="1223280" cy="927000"/>
           </a:xfrm>
           <a:prstGeom prst="rect">
             <a:avLst/>
@@ -3019,14 +2929,14 @@
       </p:sp>
       <p:sp>
         <p:nvSpPr>
-          <p:cNvPr id="76" name="CustomShape 33"/>
+          <p:cNvPr id="73" name="CustomShape 33"/>
           <p:cNvSpPr/>
           <p:nvPr/>
         </p:nvSpPr>
         <p:spPr>
           <a:xfrm>
             <a:off x="7508160" y="4510440"/>
-            <a:ext cx="1223640" cy="759960"/>
+            <a:ext cx="1223280" cy="759600"/>
           </a:xfrm>
           <a:prstGeom prst="rect">
             <a:avLst/>
@@ -3068,14 +2978,14 @@
       </p:sp>
       <p:sp>
         <p:nvSpPr>
-          <p:cNvPr id="77" name="CustomShape 34"/>
+          <p:cNvPr id="74" name="CustomShape 34"/>
           <p:cNvSpPr/>
           <p:nvPr/>
         </p:nvSpPr>
         <p:spPr>
           <a:xfrm>
             <a:off x="5934240" y="4713120"/>
-            <a:ext cx="1343160" cy="303480"/>
+            <a:ext cx="1342800" cy="303120"/>
           </a:xfrm>
           <a:prstGeom prst="rect">
             <a:avLst/>
@@ -3108,14 +3018,14 @@
       </p:sp>
       <p:sp>
         <p:nvSpPr>
-          <p:cNvPr id="78" name="CustomShape 35"/>
+          <p:cNvPr id="75" name="CustomShape 35"/>
           <p:cNvSpPr/>
           <p:nvPr/>
         </p:nvSpPr>
         <p:spPr>
           <a:xfrm>
             <a:off x="4450320" y="4633560"/>
-            <a:ext cx="1343160" cy="516600"/>
+            <a:ext cx="1342800" cy="516240"/>
           </a:xfrm>
           <a:prstGeom prst="rect">
             <a:avLst/>
@@ -3148,14 +3058,14 @@
       </p:sp>
       <p:sp>
         <p:nvSpPr>
-          <p:cNvPr id="79" name="CustomShape 36"/>
+          <p:cNvPr id="76" name="CustomShape 36"/>
           <p:cNvSpPr/>
           <p:nvPr/>
         </p:nvSpPr>
         <p:spPr>
           <a:xfrm>
             <a:off x="2965320" y="4713120"/>
-            <a:ext cx="1343160" cy="303480"/>
+            <a:ext cx="1342800" cy="303120"/>
           </a:xfrm>
           <a:prstGeom prst="rect">
             <a:avLst/>
@@ -3188,14 +3098,14 @@
       </p:sp>
       <p:sp>
         <p:nvSpPr>
-          <p:cNvPr id="80" name="CustomShape 37"/>
+          <p:cNvPr id="77" name="CustomShape 37"/>
           <p:cNvSpPr/>
           <p:nvPr/>
         </p:nvSpPr>
         <p:spPr>
           <a:xfrm>
             <a:off x="1469520" y="4746240"/>
-            <a:ext cx="1343160" cy="303480"/>
+            <a:ext cx="1342800" cy="303120"/>
           </a:xfrm>
           <a:prstGeom prst="rect">
             <a:avLst/>
@@ -3228,14 +3138,14 @@
       </p:sp>
       <p:sp>
         <p:nvSpPr>
-          <p:cNvPr id="81" name="CustomShape 38"/>
+          <p:cNvPr id="78" name="CustomShape 38"/>
           <p:cNvSpPr/>
           <p:nvPr/>
         </p:nvSpPr>
         <p:spPr>
           <a:xfrm flipH="1" flipV="1" rot="5400000">
-            <a:off x="4383000" y="2559960"/>
-            <a:ext cx="1080000" cy="2610720"/>
+            <a:off x="4382640" y="2558880"/>
+            <a:ext cx="1079640" cy="2610360"/>
           </a:xfrm>
           <a:prstGeom prst="bentConnector2">
             <a:avLst/>
@@ -3253,14 +3163,14 @@
       </p:sp>
       <p:sp>
         <p:nvSpPr>
-          <p:cNvPr id="82" name="CustomShape 39"/>
+          <p:cNvPr id="79" name="CustomShape 39"/>
           <p:cNvSpPr/>
           <p:nvPr/>
         </p:nvSpPr>
         <p:spPr>
           <a:xfrm>
             <a:off x="4989600" y="3866040"/>
-            <a:ext cx="360" cy="565200"/>
+            <a:ext cx="360" cy="564840"/>
           </a:xfrm>
           <a:prstGeom prst="straightConnector1">
             <a:avLst/>
@@ -3277,14 +3187,14 @@
       </p:sp>
       <p:sp>
         <p:nvSpPr>
-          <p:cNvPr id="83" name="CustomShape 40"/>
+          <p:cNvPr id="80" name="CustomShape 40"/>
           <p:cNvSpPr/>
           <p:nvPr/>
         </p:nvSpPr>
         <p:spPr>
           <a:xfrm flipV="1">
-            <a:off x="6700680" y="3327120"/>
-            <a:ext cx="360" cy="538560"/>
+            <a:off x="6700680" y="3326400"/>
+            <a:ext cx="360" cy="538200"/>
           </a:xfrm>
           <a:prstGeom prst="straightConnector1">
             <a:avLst/>
@@ -3301,7 +3211,7 @@
       </p:sp>
       <p:sp>
         <p:nvSpPr>
-          <p:cNvPr id="84" name="Line 41"/>
+          <p:cNvPr id="81" name="Line 41"/>
           <p:cNvSpPr/>
           <p:nvPr/>
         </p:nvSpPr>
@@ -3323,7 +3233,7 @@
       </p:sp>
       <p:pic>
         <p:nvPicPr>
-          <p:cNvPr descr="" id="85" name="Picture 99"/>
+          <p:cNvPr descr="" id="82" name="Picture 99"/>
           <p:cNvPicPr/>
           <p:nvPr/>
         </p:nvPicPr>
@@ -3336,7 +3246,7 @@
         <p:spPr>
           <a:xfrm>
             <a:off x="82080" y="2985840"/>
-            <a:ext cx="685800" cy="290520"/>
+            <a:ext cx="685440" cy="290160"/>
           </a:xfrm>
           <a:prstGeom prst="rect">
             <a:avLst/>
@@ -3348,7 +3258,7 @@
       </p:pic>
       <p:pic>
         <p:nvPicPr>
-          <p:cNvPr descr="" id="86" name="Picture 100"/>
+          <p:cNvPr descr="" id="83" name="Picture 100"/>
           <p:cNvPicPr/>
           <p:nvPr/>
         </p:nvPicPr>
@@ -3361,7 +3271,7 @@
         <p:spPr>
           <a:xfrm>
             <a:off x="95760" y="2393280"/>
-            <a:ext cx="620280" cy="263520"/>
+            <a:ext cx="619920" cy="263160"/>
           </a:xfrm>
           <a:prstGeom prst="rect">
             <a:avLst/>
@@ -3373,7 +3283,7 @@
       </p:pic>
       <p:pic>
         <p:nvPicPr>
-          <p:cNvPr descr="" id="87" name="Picture 101"/>
+          <p:cNvPr descr="" id="84" name="Picture 101"/>
           <p:cNvPicPr/>
           <p:nvPr/>
         </p:nvPicPr>
@@ -3386,7 +3296,7 @@
         <p:spPr>
           <a:xfrm>
             <a:off x="107640" y="2682720"/>
-            <a:ext cx="608760" cy="322200"/>
+            <a:ext cx="608400" cy="321840"/>
           </a:xfrm>
           <a:prstGeom prst="rect">
             <a:avLst/>
@@ -3398,7 +3308,7 @@
       </p:pic>
       <p:pic>
         <p:nvPicPr>
-          <p:cNvPr descr="" id="88" name="Picture 102"/>
+          <p:cNvPr descr="" id="85" name="Picture 102"/>
           <p:cNvPicPr/>
           <p:nvPr/>
         </p:nvPicPr>
@@ -3411,7 +3321,7 @@
         <p:spPr>
           <a:xfrm>
             <a:off x="107640" y="2113560"/>
-            <a:ext cx="608760" cy="233640"/>
+            <a:ext cx="608400" cy="233280"/>
           </a:xfrm>
           <a:prstGeom prst="rect">
             <a:avLst/>
@@ -3423,7 +3333,7 @@
       </p:pic>
       <p:sp>
         <p:nvSpPr>
-          <p:cNvPr id="89" name="Line 42"/>
+          <p:cNvPr id="86" name="Line 42"/>
           <p:cNvSpPr/>
           <p:nvPr/>
         </p:nvSpPr>
@@ -3445,14 +3355,14 @@
       </p:sp>
       <p:sp>
         <p:nvSpPr>
-          <p:cNvPr id="90" name="CustomShape 43"/>
+          <p:cNvPr id="87" name="CustomShape 43"/>
           <p:cNvSpPr/>
           <p:nvPr/>
         </p:nvSpPr>
         <p:spPr>
           <a:xfrm>
             <a:off x="425160" y="2177640"/>
-            <a:ext cx="1223640" cy="364680"/>
+            <a:ext cx="1223280" cy="364320"/>
           </a:xfrm>
           <a:prstGeom prst="rect">
             <a:avLst/>
@@ -3524,14 +3434,14 @@
       </p:grpSpPr>
       <p:sp>
         <p:nvSpPr>
-          <p:cNvPr id="91" name="CustomShape 1"/>
+          <p:cNvPr id="88" name="CustomShape 1"/>
           <p:cNvSpPr/>
           <p:nvPr/>
         </p:nvSpPr>
         <p:spPr>
           <a:xfrm rot="10800000">
-            <a:off x="1586520" y="3582720"/>
-            <a:ext cx="5828400" cy="2582280"/>
+            <a:off x="1586880" y="3582720"/>
+            <a:ext cx="5828040" cy="2581920"/>
           </a:xfrm>
           <a:prstGeom prst="rightArrow">
             <a:avLst>
@@ -3549,14 +3459,14 @@
       </p:sp>
       <p:sp>
         <p:nvSpPr>
-          <p:cNvPr id="92" name="CustomShape 2"/>
+          <p:cNvPr id="89" name="CustomShape 2"/>
           <p:cNvSpPr/>
           <p:nvPr/>
         </p:nvSpPr>
         <p:spPr>
           <a:xfrm>
             <a:off x="2074320" y="4561200"/>
-            <a:ext cx="1180800" cy="577800"/>
+            <a:ext cx="1180440" cy="577440"/>
           </a:xfrm>
           <a:prstGeom prst="roundRect">
             <a:avLst>
@@ -3574,7 +3484,7 @@
           </a:ln>
         </p:spPr>
         <p:txBody>
-          <a:bodyPr anchor="ctr" lIns="73800" rIns="45720" tIns="73800"/>
+          <a:bodyPr anchor="ctr" bIns="45000" lIns="73800" rIns="45720" tIns="73800"/>
           <a:p>
             <a:pPr algn="ctr">
               <a:lnSpc>
@@ -3596,14 +3506,14 @@
       </p:sp>
       <p:sp>
         <p:nvSpPr>
-          <p:cNvPr id="93" name="CustomShape 3"/>
+          <p:cNvPr id="90" name="CustomShape 3"/>
           <p:cNvSpPr/>
           <p:nvPr/>
         </p:nvSpPr>
         <p:spPr>
           <a:xfrm>
             <a:off x="3317760" y="4569120"/>
-            <a:ext cx="1180800" cy="577800"/>
+            <a:ext cx="1180440" cy="577440"/>
           </a:xfrm>
           <a:prstGeom prst="roundRect">
             <a:avLst>
@@ -3621,7 +3531,7 @@
           </a:ln>
         </p:spPr>
         <p:txBody>
-          <a:bodyPr anchor="ctr" lIns="73800" rIns="45720" tIns="73800"/>
+          <a:bodyPr anchor="ctr" bIns="45000" lIns="73800" rIns="45720" tIns="73800"/>
           <a:p>
             <a:pPr algn="ctr">
               <a:lnSpc>
@@ -3643,14 +3553,14 @@
       </p:sp>
       <p:sp>
         <p:nvSpPr>
-          <p:cNvPr id="94" name="CustomShape 4"/>
+          <p:cNvPr id="91" name="CustomShape 4"/>
           <p:cNvSpPr/>
           <p:nvPr/>
         </p:nvSpPr>
         <p:spPr>
           <a:xfrm>
             <a:off x="4568760" y="4569120"/>
-            <a:ext cx="1180800" cy="577800"/>
+            <a:ext cx="1180440" cy="577440"/>
           </a:xfrm>
           <a:prstGeom prst="roundRect">
             <a:avLst>
@@ -3668,7 +3578,7 @@
           </a:ln>
         </p:spPr>
         <p:txBody>
-          <a:bodyPr anchor="ctr" lIns="73800" rIns="45720" tIns="73800"/>
+          <a:bodyPr anchor="ctr" bIns="45000" lIns="73800" rIns="45720" tIns="73800"/>
           <a:p>
             <a:pPr algn="ctr">
               <a:lnSpc>
@@ -3690,14 +3600,14 @@
       </p:sp>
       <p:sp>
         <p:nvSpPr>
-          <p:cNvPr id="95" name="CustomShape 5"/>
+          <p:cNvPr id="92" name="CustomShape 5"/>
           <p:cNvSpPr/>
           <p:nvPr/>
         </p:nvSpPr>
         <p:spPr>
           <a:xfrm>
             <a:off x="5853960" y="4569120"/>
-            <a:ext cx="1180800" cy="577800"/>
+            <a:ext cx="1180440" cy="577440"/>
           </a:xfrm>
           <a:prstGeom prst="roundRect">
             <a:avLst>
@@ -3715,7 +3625,7 @@
           </a:ln>
         </p:spPr>
         <p:txBody>
-          <a:bodyPr anchor="ctr" lIns="73800" rIns="45720" tIns="73800"/>
+          <a:bodyPr anchor="ctr" bIns="45000" lIns="73800" rIns="45720" tIns="73800"/>
           <a:p>
             <a:pPr algn="ctr">
               <a:lnSpc>
@@ -3737,14 +3647,14 @@
       </p:sp>
       <p:sp>
         <p:nvSpPr>
-          <p:cNvPr id="96" name="CustomShape 6"/>
+          <p:cNvPr id="93" name="CustomShape 6"/>
           <p:cNvSpPr/>
           <p:nvPr/>
         </p:nvSpPr>
         <p:spPr>
           <a:xfrm>
             <a:off x="7522920" y="4178880"/>
-            <a:ext cx="1124280" cy="1500480"/>
+            <a:ext cx="1123920" cy="1500120"/>
           </a:xfrm>
           <a:prstGeom prst="snip2DiagRect">
             <a:avLst>
@@ -3765,14 +3675,14 @@
       </p:sp>
       <p:sp>
         <p:nvSpPr>
-          <p:cNvPr id="97" name="CustomShape 7"/>
+          <p:cNvPr id="94" name="CustomShape 7"/>
           <p:cNvSpPr/>
           <p:nvPr/>
         </p:nvSpPr>
         <p:spPr>
           <a:xfrm>
             <a:off x="107640" y="4160520"/>
-            <a:ext cx="1076400" cy="1500480"/>
+            <a:ext cx="1076040" cy="1500120"/>
           </a:xfrm>
           <a:prstGeom prst="snip2DiagRect">
             <a:avLst>
@@ -3793,14 +3703,14 @@
       </p:sp>
       <p:sp>
         <p:nvSpPr>
-          <p:cNvPr id="98" name="CustomShape 8"/>
+          <p:cNvPr id="95" name="CustomShape 8"/>
           <p:cNvSpPr/>
           <p:nvPr/>
         </p:nvSpPr>
         <p:spPr>
           <a:xfrm>
             <a:off x="1384920" y="1842840"/>
-            <a:ext cx="1295640" cy="1482480"/>
+            <a:ext cx="1295280" cy="1482120"/>
           </a:xfrm>
           <a:prstGeom prst="flowChartMagneticDisk">
             <a:avLst/>
@@ -3829,14 +3739,14 @@
       </p:sp>
       <p:sp>
         <p:nvSpPr>
-          <p:cNvPr id="99" name="CustomShape 9"/>
+          <p:cNvPr id="96" name="CustomShape 9"/>
           <p:cNvSpPr/>
           <p:nvPr/>
         </p:nvSpPr>
         <p:spPr>
           <a:xfrm rot="10800000">
-            <a:off x="5961240" y="1844280"/>
-            <a:ext cx="1472400" cy="1482480"/>
+            <a:off x="5961600" y="1844280"/>
+            <a:ext cx="1472040" cy="1482120"/>
           </a:xfrm>
           <a:prstGeom prst="snip1Rect">
             <a:avLst>
@@ -3856,14 +3766,14 @@
       </p:sp>
       <p:sp>
         <p:nvSpPr>
-          <p:cNvPr id="100" name="CustomShape 10"/>
+          <p:cNvPr id="97" name="CustomShape 10"/>
           <p:cNvSpPr/>
           <p:nvPr/>
         </p:nvSpPr>
         <p:spPr>
           <a:xfrm>
             <a:off x="3833280" y="2066760"/>
-            <a:ext cx="1151640" cy="1007640"/>
+            <a:ext cx="1151280" cy="1007280"/>
           </a:xfrm>
           <a:prstGeom prst="rect">
             <a:avLst/>
@@ -3871,27 +3781,51 @@
           <a:solidFill>
             <a:srgbClr val="d9d9d9"/>
           </a:solidFill>
+          <a:ln cap="rnd" w="19080">
+            <a:solidFill>
+              <a:srgbClr val="000000"/>
+            </a:solidFill>
+            <a:custDash>
+              <a:ds d="8427000000" sp="2809000000"/>
+            </a:custDash>
+            <a:round/>
+          </a:ln>
+        </p:spPr>
+      </p:sp>
+      <p:sp>
+        <p:nvSpPr>
+          <p:cNvPr id="98" name="CustomShape 11"/>
+          <p:cNvSpPr/>
+          <p:nvPr/>
+        </p:nvSpPr>
+        <p:spPr>
+          <a:xfrm>
+            <a:off x="2706840" y="2570760"/>
+            <a:ext cx="1125720" cy="360"/>
+          </a:xfrm>
+          <a:prstGeom prst="straightConnector1">
+            <a:avLst/>
+          </a:prstGeom>
+          <a:noFill/>
           <a:ln w="19080">
             <a:solidFill>
               <a:srgbClr val="000000"/>
             </a:solidFill>
-            <a:custDash>
-              <a:ds d="159000" sp="53000"/>
-            </a:custDash>
-            <a:round/>
-          </a:ln>
-        </p:spPr>
-      </p:sp>
-      <p:sp>
-        <p:nvSpPr>
-          <p:cNvPr id="101" name="CustomShape 11"/>
-          <p:cNvSpPr/>
-          <p:nvPr/>
-        </p:nvSpPr>
-        <p:spPr>
-          <a:xfrm>
-            <a:off x="2706840" y="2570760"/>
-            <a:ext cx="1126080" cy="360"/>
+            <a:round/>
+            <a:tailEnd len="med" type="arrow" w="med"/>
+          </a:ln>
+        </p:spPr>
+      </p:sp>
+      <p:sp>
+        <p:nvSpPr>
+          <p:cNvPr id="99" name="CustomShape 12"/>
+          <p:cNvSpPr/>
+          <p:nvPr/>
+        </p:nvSpPr>
+        <p:spPr>
+          <a:xfrm>
+            <a:off x="4985280" y="2570760"/>
+            <a:ext cx="974880" cy="360"/>
           </a:xfrm>
           <a:prstGeom prst="straightConnector1">
             <a:avLst/>
@@ -3908,14 +3842,14 @@
       </p:sp>
       <p:sp>
         <p:nvSpPr>
-          <p:cNvPr id="102" name="CustomShape 12"/>
-          <p:cNvSpPr/>
-          <p:nvPr/>
-        </p:nvSpPr>
-        <p:spPr>
-          <a:xfrm>
-            <a:off x="4985280" y="2570760"/>
-            <a:ext cx="975240" cy="360"/>
+          <p:cNvPr id="100" name="CustomShape 13"/>
+          <p:cNvSpPr/>
+          <p:nvPr/>
+        </p:nvSpPr>
+        <p:spPr>
+          <a:xfrm flipH="1">
+            <a:off x="7192080" y="4895280"/>
+            <a:ext cx="314280" cy="3600"/>
           </a:xfrm>
           <a:prstGeom prst="straightConnector1">
             <a:avLst/>
@@ -3932,14 +3866,38 @@
       </p:sp>
       <p:sp>
         <p:nvSpPr>
-          <p:cNvPr id="103" name="CustomShape 13"/>
+          <p:cNvPr id="101" name="CustomShape 14"/>
+          <p:cNvSpPr/>
+          <p:nvPr/>
+        </p:nvSpPr>
+        <p:spPr>
+          <a:xfrm flipH="1" flipV="1">
+            <a:off x="5652000" y="4906800"/>
+            <a:ext cx="307440" cy="360"/>
+          </a:xfrm>
+          <a:prstGeom prst="straightConnector1">
+            <a:avLst/>
+          </a:prstGeom>
+          <a:noFill/>
+          <a:ln w="19080">
+            <a:solidFill>
+              <a:srgbClr val="000000"/>
+            </a:solidFill>
+            <a:round/>
+            <a:tailEnd len="med" type="arrow" w="med"/>
+          </a:ln>
+        </p:spPr>
+      </p:sp>
+      <p:sp>
+        <p:nvSpPr>
+          <p:cNvPr id="102" name="CustomShape 15"/>
           <p:cNvSpPr/>
           <p:nvPr/>
         </p:nvSpPr>
         <p:spPr>
           <a:xfrm flipH="1">
-            <a:off x="7192800" y="4895280"/>
-            <a:ext cx="314640" cy="3960"/>
+            <a:off x="4210920" y="4900320"/>
+            <a:ext cx="288360" cy="1800"/>
           </a:xfrm>
           <a:prstGeom prst="straightConnector1">
             <a:avLst/>
@@ -3956,14 +3914,14 @@
       </p:sp>
       <p:sp>
         <p:nvSpPr>
-          <p:cNvPr id="104" name="CustomShape 14"/>
-          <p:cNvSpPr/>
-          <p:nvPr/>
-        </p:nvSpPr>
-        <p:spPr>
-          <a:xfrm flipH="1" flipV="1">
-            <a:off x="5652000" y="4907520"/>
-            <a:ext cx="307800" cy="720"/>
+          <p:cNvPr id="103" name="CustomShape 16"/>
+          <p:cNvSpPr/>
+          <p:nvPr/>
+        </p:nvSpPr>
+        <p:spPr>
+          <a:xfrm flipH="1">
+            <a:off x="2731680" y="4907520"/>
+            <a:ext cx="288360" cy="1800"/>
           </a:xfrm>
           <a:prstGeom prst="straightConnector1">
             <a:avLst/>
@@ -3980,62 +3938,14 @@
       </p:sp>
       <p:sp>
         <p:nvSpPr>
-          <p:cNvPr id="105" name="CustomShape 15"/>
-          <p:cNvSpPr/>
-          <p:nvPr/>
-        </p:nvSpPr>
-        <p:spPr>
-          <a:xfrm flipH="1">
-            <a:off x="4211640" y="4900320"/>
-            <a:ext cx="288720" cy="2160"/>
-          </a:xfrm>
-          <a:prstGeom prst="straightConnector1">
-            <a:avLst/>
-          </a:prstGeom>
-          <a:noFill/>
-          <a:ln w="19080">
-            <a:solidFill>
-              <a:srgbClr val="000000"/>
-            </a:solidFill>
-            <a:round/>
-            <a:tailEnd len="med" type="arrow" w="med"/>
-          </a:ln>
-        </p:spPr>
-      </p:sp>
-      <p:sp>
-        <p:nvSpPr>
-          <p:cNvPr id="106" name="CustomShape 16"/>
-          <p:cNvSpPr/>
-          <p:nvPr/>
-        </p:nvSpPr>
-        <p:spPr>
-          <a:xfrm flipH="1">
-            <a:off x="2732400" y="4907520"/>
-            <a:ext cx="288720" cy="2160"/>
-          </a:xfrm>
-          <a:prstGeom prst="straightConnector1">
-            <a:avLst/>
-          </a:prstGeom>
-          <a:noFill/>
-          <a:ln w="19080">
-            <a:solidFill>
-              <a:srgbClr val="000000"/>
-            </a:solidFill>
-            <a:round/>
-            <a:tailEnd len="med" type="arrow" w="med"/>
-          </a:ln>
-        </p:spPr>
-      </p:sp>
-      <p:sp>
-        <p:nvSpPr>
-          <p:cNvPr id="107" name="CustomShape 17"/>
+          <p:cNvPr id="104" name="CustomShape 17"/>
           <p:cNvSpPr/>
           <p:nvPr/>
         </p:nvSpPr>
         <p:spPr>
           <a:xfrm flipH="1">
             <a:off x="1183320" y="4895280"/>
-            <a:ext cx="348840" cy="4680"/>
+            <a:ext cx="348480" cy="4320"/>
           </a:xfrm>
           <a:prstGeom prst="straightConnector1">
             <a:avLst/>
@@ -4052,14 +3962,14 @@
       </p:sp>
       <p:sp>
         <p:nvSpPr>
-          <p:cNvPr id="108" name="CustomShape 18"/>
+          <p:cNvPr id="105" name="CustomShape 18"/>
           <p:cNvSpPr/>
           <p:nvPr/>
         </p:nvSpPr>
         <p:spPr>
           <a:xfrm>
             <a:off x="1533240" y="2431440"/>
-            <a:ext cx="1343160" cy="303480"/>
+            <a:ext cx="1342800" cy="303120"/>
           </a:xfrm>
           <a:prstGeom prst="rect">
             <a:avLst/>
@@ -4092,14 +4002,14 @@
       </p:sp>
       <p:sp>
         <p:nvSpPr>
-          <p:cNvPr id="109" name="CustomShape 19"/>
+          <p:cNvPr id="106" name="CustomShape 19"/>
           <p:cNvSpPr/>
           <p:nvPr/>
         </p:nvSpPr>
         <p:spPr>
           <a:xfrm>
             <a:off x="3737520" y="2393280"/>
-            <a:ext cx="1343160" cy="303480"/>
+            <a:ext cx="1342800" cy="303120"/>
           </a:xfrm>
           <a:prstGeom prst="rect">
             <a:avLst/>
@@ -4132,14 +4042,14 @@
       </p:sp>
       <p:sp>
         <p:nvSpPr>
-          <p:cNvPr id="110" name="CustomShape 20"/>
+          <p:cNvPr id="107" name="CustomShape 20"/>
           <p:cNvSpPr/>
           <p:nvPr/>
         </p:nvSpPr>
         <p:spPr>
           <a:xfrm>
             <a:off x="5914440" y="2464560"/>
-            <a:ext cx="1564920" cy="637920"/>
+            <a:ext cx="1564560" cy="637560"/>
           </a:xfrm>
           <a:prstGeom prst="rect">
             <a:avLst/>
@@ -4206,14 +4116,14 @@
       </p:sp>
       <p:sp>
         <p:nvSpPr>
-          <p:cNvPr id="111" name="CustomShape 21"/>
+          <p:cNvPr id="108" name="CustomShape 21"/>
           <p:cNvSpPr/>
           <p:nvPr/>
         </p:nvSpPr>
         <p:spPr>
           <a:xfrm>
             <a:off x="5895720" y="1957680"/>
-            <a:ext cx="1583640" cy="303480"/>
+            <a:ext cx="1583280" cy="303120"/>
           </a:xfrm>
           <a:prstGeom prst="rect">
             <a:avLst/>
@@ -4246,14 +4156,14 @@
       </p:sp>
       <p:sp>
         <p:nvSpPr>
-          <p:cNvPr id="112" name="CustomShape 22"/>
+          <p:cNvPr id="109" name="CustomShape 22"/>
           <p:cNvSpPr/>
           <p:nvPr/>
         </p:nvSpPr>
         <p:spPr>
           <a:xfrm>
             <a:off x="2672280" y="1734120"/>
-            <a:ext cx="306360" cy="287640"/>
+            <a:ext cx="306000" cy="287280"/>
           </a:xfrm>
           <a:prstGeom prst="flowChartConnector">
             <a:avLst/>
@@ -4271,14 +4181,14 @@
       </p:sp>
       <p:sp>
         <p:nvSpPr>
-          <p:cNvPr id="113" name="CustomShape 23"/>
+          <p:cNvPr id="110" name="CustomShape 23"/>
           <p:cNvSpPr/>
           <p:nvPr/>
         </p:nvSpPr>
         <p:spPr>
           <a:xfrm>
             <a:off x="2706840" y="1734120"/>
-            <a:ext cx="216720" cy="303480"/>
+            <a:ext cx="216360" cy="303120"/>
           </a:xfrm>
           <a:prstGeom prst="rect">
             <a:avLst/>
@@ -4311,14 +4221,14 @@
       </p:sp>
       <p:sp>
         <p:nvSpPr>
-          <p:cNvPr id="114" name="CustomShape 24"/>
+          <p:cNvPr id="111" name="CustomShape 24"/>
           <p:cNvSpPr/>
           <p:nvPr/>
         </p:nvSpPr>
         <p:spPr>
           <a:xfrm>
             <a:off x="4950720" y="1734120"/>
-            <a:ext cx="306360" cy="287640"/>
+            <a:ext cx="306000" cy="287280"/>
           </a:xfrm>
           <a:prstGeom prst="flowChartConnector">
             <a:avLst/>
@@ -4336,14 +4246,14 @@
       </p:sp>
       <p:sp>
         <p:nvSpPr>
-          <p:cNvPr id="115" name="CustomShape 25"/>
+          <p:cNvPr id="112" name="CustomShape 25"/>
           <p:cNvSpPr/>
           <p:nvPr/>
         </p:nvSpPr>
         <p:spPr>
           <a:xfrm>
             <a:off x="4985280" y="1734120"/>
-            <a:ext cx="216720" cy="303480"/>
+            <a:ext cx="216360" cy="303120"/>
           </a:xfrm>
           <a:prstGeom prst="rect">
             <a:avLst/>
@@ -4376,14 +4286,14 @@
       </p:sp>
       <p:sp>
         <p:nvSpPr>
-          <p:cNvPr id="116" name="CustomShape 26"/>
+          <p:cNvPr id="113" name="CustomShape 26"/>
           <p:cNvSpPr/>
           <p:nvPr/>
         </p:nvSpPr>
         <p:spPr>
           <a:xfrm>
             <a:off x="1035360" y="3972600"/>
-            <a:ext cx="306360" cy="287640"/>
+            <a:ext cx="306000" cy="287280"/>
           </a:xfrm>
           <a:prstGeom prst="flowChartConnector">
             <a:avLst/>
@@ -4401,14 +4311,14 @@
       </p:sp>
       <p:sp>
         <p:nvSpPr>
-          <p:cNvPr id="117" name="CustomShape 27"/>
+          <p:cNvPr id="114" name="CustomShape 27"/>
           <p:cNvSpPr/>
           <p:nvPr/>
         </p:nvSpPr>
         <p:spPr>
           <a:xfrm>
             <a:off x="1069920" y="3972600"/>
-            <a:ext cx="216720" cy="303480"/>
+            <a:ext cx="216360" cy="303120"/>
           </a:xfrm>
           <a:prstGeom prst="rect">
             <a:avLst/>
@@ -4441,14 +4351,14 @@
       </p:sp>
       <p:sp>
         <p:nvSpPr>
-          <p:cNvPr id="118" name="CustomShape 28"/>
+          <p:cNvPr id="115" name="CustomShape 28"/>
           <p:cNvSpPr/>
           <p:nvPr/>
         </p:nvSpPr>
         <p:spPr>
           <a:xfrm>
             <a:off x="44280" y="4380840"/>
-            <a:ext cx="1223640" cy="927360"/>
+            <a:ext cx="1223280" cy="927000"/>
           </a:xfrm>
           <a:prstGeom prst="rect">
             <a:avLst/>
@@ -4490,14 +4400,14 @@
       </p:sp>
       <p:sp>
         <p:nvSpPr>
-          <p:cNvPr id="119" name="CustomShape 29"/>
+          <p:cNvPr id="116" name="CustomShape 29"/>
           <p:cNvSpPr/>
           <p:nvPr/>
         </p:nvSpPr>
         <p:spPr>
           <a:xfrm>
             <a:off x="7508160" y="4510440"/>
-            <a:ext cx="1223640" cy="759960"/>
+            <a:ext cx="1223280" cy="759600"/>
           </a:xfrm>
           <a:prstGeom prst="rect">
             <a:avLst/>
@@ -4539,7 +4449,7 @@
       </p:sp>
       <p:pic>
         <p:nvPicPr>
-          <p:cNvPr descr="" id="120" name="Picture 99"/>
+          <p:cNvPr descr="" id="117" name="Picture 99"/>
           <p:cNvPicPr/>
           <p:nvPr/>
         </p:nvPicPr>
@@ -4552,7 +4462,7 @@
         <p:spPr>
           <a:xfrm>
             <a:off x="82080" y="2985840"/>
-            <a:ext cx="685800" cy="290520"/>
+            <a:ext cx="685440" cy="290160"/>
           </a:xfrm>
           <a:prstGeom prst="rect">
             <a:avLst/>
@@ -4564,7 +4474,7 @@
       </p:pic>
       <p:pic>
         <p:nvPicPr>
-          <p:cNvPr descr="" id="121" name="Picture 100"/>
+          <p:cNvPr descr="" id="118" name="Picture 100"/>
           <p:cNvPicPr/>
           <p:nvPr/>
         </p:nvPicPr>
@@ -4577,7 +4487,7 @@
         <p:spPr>
           <a:xfrm>
             <a:off x="95760" y="2393280"/>
-            <a:ext cx="620280" cy="263520"/>
+            <a:ext cx="619920" cy="263160"/>
           </a:xfrm>
           <a:prstGeom prst="rect">
             <a:avLst/>
@@ -4589,7 +4499,7 @@
       </p:pic>
       <p:pic>
         <p:nvPicPr>
-          <p:cNvPr descr="" id="122" name="Picture 101"/>
+          <p:cNvPr descr="" id="119" name="Picture 101"/>
           <p:cNvPicPr/>
           <p:nvPr/>
         </p:nvPicPr>
@@ -4602,7 +4512,7 @@
         <p:spPr>
           <a:xfrm>
             <a:off x="107640" y="2682720"/>
-            <a:ext cx="608760" cy="322200"/>
+            <a:ext cx="608400" cy="321840"/>
           </a:xfrm>
           <a:prstGeom prst="rect">
             <a:avLst/>
@@ -4614,7 +4524,7 @@
       </p:pic>
       <p:pic>
         <p:nvPicPr>
-          <p:cNvPr descr="" id="123" name="Picture 102"/>
+          <p:cNvPr descr="" id="120" name="Picture 102"/>
           <p:cNvPicPr/>
           <p:nvPr/>
         </p:nvPicPr>
@@ -4627,7 +4537,7 @@
         <p:spPr>
           <a:xfrm>
             <a:off x="107640" y="2113560"/>
-            <a:ext cx="608760" cy="233640"/>
+            <a:ext cx="608400" cy="233280"/>
           </a:xfrm>
           <a:prstGeom prst="rect">
             <a:avLst/>
@@ -4639,7 +4549,7 @@
       </p:pic>
       <p:sp>
         <p:nvSpPr>
-          <p:cNvPr id="124" name="Line 30"/>
+          <p:cNvPr id="121" name="Line 30"/>
           <p:cNvSpPr/>
           <p:nvPr/>
         </p:nvSpPr>
@@ -4661,14 +4571,14 @@
       </p:sp>
       <p:sp>
         <p:nvSpPr>
-          <p:cNvPr id="125" name="CustomShape 31"/>
+          <p:cNvPr id="122" name="CustomShape 31"/>
           <p:cNvSpPr/>
           <p:nvPr/>
         </p:nvSpPr>
         <p:spPr>
           <a:xfrm>
             <a:off x="425160" y="2177640"/>
-            <a:ext cx="1223640" cy="364680"/>
+            <a:ext cx="1223280" cy="364320"/>
           </a:xfrm>
           <a:prstGeom prst="rect">
             <a:avLst/>
@@ -4718,14 +4628,14 @@
       </p:sp>
       <p:sp>
         <p:nvSpPr>
-          <p:cNvPr id="126" name="CustomShape 32"/>
+          <p:cNvPr id="123" name="CustomShape 32"/>
           <p:cNvSpPr/>
           <p:nvPr/>
         </p:nvSpPr>
         <p:spPr>
           <a:xfrm>
             <a:off x="5176800" y="3758400"/>
-            <a:ext cx="360" cy="786960"/>
+            <a:ext cx="360" cy="786600"/>
           </a:xfrm>
           <a:prstGeom prst="straightConnector1">
             <a:avLst/>
@@ -4742,14 +4652,14 @@
       </p:sp>
       <p:sp>
         <p:nvSpPr>
-          <p:cNvPr id="127" name="CustomShape 33"/>
+          <p:cNvPr id="124" name="CustomShape 33"/>
           <p:cNvSpPr/>
           <p:nvPr/>
         </p:nvSpPr>
         <p:spPr>
           <a:xfrm flipV="1">
             <a:off x="6516360" y="3327840"/>
-            <a:ext cx="360" cy="429480"/>
+            <a:ext cx="360" cy="429120"/>
           </a:xfrm>
           <a:prstGeom prst="straightConnector1">
             <a:avLst/>
@@ -4766,7 +4676,7 @@
       </p:sp>
       <p:sp>
         <p:nvSpPr>
-          <p:cNvPr id="128" name="Line 34"/>
+          <p:cNvPr id="125" name="Line 34"/>
           <p:cNvSpPr/>
           <p:nvPr/>
         </p:nvSpPr>
@@ -4788,14 +4698,14 @@
       </p:sp>
       <p:sp>
         <p:nvSpPr>
-          <p:cNvPr id="129" name="CustomShape 35"/>
+          <p:cNvPr id="126" name="CustomShape 35"/>
           <p:cNvSpPr/>
           <p:nvPr/>
         </p:nvSpPr>
         <p:spPr>
           <a:xfrm>
             <a:off x="3924000" y="3328560"/>
-            <a:ext cx="360" cy="1216800"/>
+            <a:ext cx="360" cy="1216440"/>
           </a:xfrm>
           <a:prstGeom prst="straightConnector1">
             <a:avLst/>
@@ -4812,7 +4722,7 @@
       </p:sp>
       <p:sp>
         <p:nvSpPr>
-          <p:cNvPr id="130" name="Line 36"/>
+          <p:cNvPr id="127" name="Line 36"/>
           <p:cNvSpPr/>
           <p:nvPr/>
         </p:nvSpPr>
@@ -4834,14 +4744,14 @@
       </p:sp>
       <p:sp>
         <p:nvSpPr>
-          <p:cNvPr id="131" name="CustomShape 37"/>
+          <p:cNvPr id="128" name="CustomShape 37"/>
           <p:cNvSpPr/>
           <p:nvPr/>
         </p:nvSpPr>
         <p:spPr>
           <a:xfrm>
             <a:off x="5218200" y="3327480"/>
-            <a:ext cx="970200" cy="720"/>
+            <a:ext cx="969840" cy="360"/>
           </a:xfrm>
           <a:prstGeom prst="straightConnector1">
             <a:avLst/>
@@ -4880,14 +4790,14 @@
       </p:grpSpPr>
       <p:sp>
         <p:nvSpPr>
-          <p:cNvPr id="132" name="CustomShape 1"/>
+          <p:cNvPr id="129" name="CustomShape 1"/>
           <p:cNvSpPr/>
           <p:nvPr/>
         </p:nvSpPr>
         <p:spPr>
           <a:xfrm>
             <a:off x="164160" y="3663360"/>
-            <a:ext cx="1166400" cy="1500480"/>
+            <a:ext cx="1166040" cy="1500120"/>
           </a:xfrm>
           <a:prstGeom prst="snip2DiagRect">
             <a:avLst>
@@ -4908,14 +4818,14 @@
       </p:sp>
       <p:sp>
         <p:nvSpPr>
-          <p:cNvPr id="133" name="CustomShape 2"/>
-          <p:cNvSpPr/>
-          <p:nvPr/>
-        </p:nvSpPr>
-        <p:spPr>
-          <a:xfrm>
-            <a:off x="143640" y="3840840"/>
-            <a:ext cx="1223640" cy="1261440"/>
+          <p:cNvPr id="130" name="CustomShape 2"/>
+          <p:cNvSpPr/>
+          <p:nvPr/>
+        </p:nvSpPr>
+        <p:spPr>
+          <a:xfrm>
+            <a:off x="130680" y="3768840"/>
+            <a:ext cx="1223280" cy="1261080"/>
           </a:xfrm>
           <a:prstGeom prst="rect">
             <a:avLst/>
@@ -4957,14 +4867,14 @@
       </p:sp>
       <p:sp>
         <p:nvSpPr>
-          <p:cNvPr id="134" name="CustomShape 3"/>
+          <p:cNvPr id="131" name="CustomShape 3"/>
           <p:cNvSpPr/>
           <p:nvPr/>
         </p:nvSpPr>
         <p:spPr>
           <a:xfrm>
             <a:off x="1548000" y="3316680"/>
-            <a:ext cx="6092640" cy="2124000"/>
+            <a:ext cx="6092280" cy="2123640"/>
           </a:xfrm>
           <a:prstGeom prst="roundRect">
             <a:avLst>
@@ -4984,14 +4894,14 @@
       </p:sp>
       <p:sp>
         <p:nvSpPr>
-          <p:cNvPr id="135" name="CustomShape 4"/>
+          <p:cNvPr id="132" name="CustomShape 4"/>
           <p:cNvSpPr/>
           <p:nvPr/>
         </p:nvSpPr>
         <p:spPr>
           <a:xfrm>
             <a:off x="1665720" y="3774240"/>
-            <a:ext cx="1083600" cy="1215720"/>
+            <a:ext cx="1083240" cy="1215360"/>
           </a:xfrm>
           <a:prstGeom prst="roundRect">
             <a:avLst>
@@ -5011,14 +4921,14 @@
       </p:sp>
       <p:sp>
         <p:nvSpPr>
-          <p:cNvPr id="136" name="CustomShape 5"/>
+          <p:cNvPr id="133" name="CustomShape 5"/>
           <p:cNvSpPr/>
           <p:nvPr/>
         </p:nvSpPr>
         <p:spPr>
           <a:xfrm rot="10800000">
-            <a:off x="2232000" y="3415320"/>
-            <a:ext cx="1363680" cy="1321200"/>
+            <a:off x="2232360" y="3415680"/>
+            <a:ext cx="1363320" cy="1320840"/>
           </a:xfrm>
           <a:prstGeom prst="leftCircularArrow">
             <a:avLst>
@@ -5039,14 +4949,14 @@
       </p:sp>
       <p:sp>
         <p:nvSpPr>
-          <p:cNvPr id="137" name="CustomShape 6"/>
+          <p:cNvPr id="134" name="CustomShape 6"/>
           <p:cNvSpPr/>
           <p:nvPr/>
         </p:nvSpPr>
         <p:spPr>
           <a:xfrm>
             <a:off x="3129840" y="3776040"/>
-            <a:ext cx="1083960" cy="1248480"/>
+            <a:ext cx="1083600" cy="1248120"/>
           </a:xfrm>
           <a:prstGeom prst="roundRect">
             <a:avLst>
@@ -5066,14 +4976,14 @@
       </p:sp>
       <p:sp>
         <p:nvSpPr>
-          <p:cNvPr id="138" name="CustomShape 7"/>
+          <p:cNvPr id="135" name="CustomShape 7"/>
           <p:cNvSpPr/>
           <p:nvPr/>
         </p:nvSpPr>
         <p:spPr>
           <a:xfrm>
             <a:off x="3024000" y="3737520"/>
-            <a:ext cx="1512000" cy="426240"/>
+            <a:ext cx="1511640" cy="425880"/>
           </a:xfrm>
           <a:prstGeom prst="rect">
             <a:avLst/>
@@ -5111,14 +5021,14 @@
       </p:sp>
       <p:sp>
         <p:nvSpPr>
-          <p:cNvPr id="139" name="CustomShape 8"/>
+          <p:cNvPr id="136" name="CustomShape 8"/>
           <p:cNvSpPr/>
           <p:nvPr/>
         </p:nvSpPr>
         <p:spPr>
           <a:xfrm>
             <a:off x="4693680" y="3767040"/>
-            <a:ext cx="1083600" cy="1220400"/>
+            <a:ext cx="1083240" cy="1220040"/>
           </a:xfrm>
           <a:prstGeom prst="roundRect">
             <a:avLst>
@@ -5138,14 +5048,14 @@
       </p:sp>
       <p:sp>
         <p:nvSpPr>
-          <p:cNvPr id="140" name="CustomShape 9"/>
+          <p:cNvPr id="137" name="CustomShape 9"/>
           <p:cNvSpPr/>
           <p:nvPr/>
         </p:nvSpPr>
         <p:spPr>
           <a:xfrm rot="10800000">
-            <a:off x="5354280" y="3415320"/>
-            <a:ext cx="1321920" cy="1383840"/>
+            <a:off x="5354640" y="3415680"/>
+            <a:ext cx="1321560" cy="1383480"/>
           </a:xfrm>
           <a:prstGeom prst="leftCircularArrow">
             <a:avLst>
@@ -5166,14 +5076,14 @@
       </p:sp>
       <p:sp>
         <p:nvSpPr>
-          <p:cNvPr id="141" name="CustomShape 10"/>
+          <p:cNvPr id="138" name="CustomShape 10"/>
           <p:cNvSpPr/>
           <p:nvPr/>
         </p:nvSpPr>
         <p:spPr>
           <a:xfrm>
             <a:off x="6135840" y="3789000"/>
-            <a:ext cx="1083960" cy="1244520"/>
+            <a:ext cx="1083600" cy="1244160"/>
           </a:xfrm>
           <a:prstGeom prst="roundRect">
             <a:avLst>
@@ -5193,14 +5103,14 @@
       </p:sp>
       <p:sp>
         <p:nvSpPr>
-          <p:cNvPr id="142" name="CustomShape 11"/>
-          <p:cNvSpPr/>
-          <p:nvPr/>
-        </p:nvSpPr>
-        <p:spPr>
-          <a:xfrm>
-            <a:off x="5940000" y="3751560"/>
-            <a:ext cx="1700640" cy="415440"/>
+          <p:cNvPr id="139" name="CustomShape 11"/>
+          <p:cNvSpPr/>
+          <p:nvPr/>
+        </p:nvSpPr>
+        <p:spPr>
+          <a:xfrm>
+            <a:off x="6084000" y="3715560"/>
+            <a:ext cx="1700280" cy="415080"/>
           </a:xfrm>
           <a:prstGeom prst="rect">
             <a:avLst/>
@@ -5238,14 +5148,14 @@
       </p:sp>
       <p:sp>
         <p:nvSpPr>
-          <p:cNvPr id="143" name="CustomShape 12"/>
+          <p:cNvPr id="140" name="CustomShape 12"/>
           <p:cNvSpPr/>
           <p:nvPr/>
         </p:nvSpPr>
         <p:spPr>
           <a:xfrm>
             <a:off x="5216760" y="2718000"/>
-            <a:ext cx="360" cy="1026360"/>
+            <a:ext cx="360" cy="1026000"/>
           </a:xfrm>
           <a:prstGeom prst="straightConnector1">
             <a:avLst/>
@@ -5262,14 +5172,14 @@
       </p:sp>
       <p:sp>
         <p:nvSpPr>
-          <p:cNvPr id="144" name="CustomShape 13"/>
+          <p:cNvPr id="141" name="CustomShape 13"/>
           <p:cNvSpPr/>
           <p:nvPr/>
         </p:nvSpPr>
         <p:spPr>
           <a:xfrm flipH="1">
-            <a:off x="4122000" y="2460960"/>
-            <a:ext cx="360" cy="1190160"/>
+            <a:off x="4121280" y="2460960"/>
+            <a:ext cx="360" cy="1189800"/>
           </a:xfrm>
           <a:prstGeom prst="straightConnector1">
             <a:avLst/>
@@ -5286,14 +5196,14 @@
       </p:sp>
       <p:sp>
         <p:nvSpPr>
-          <p:cNvPr id="145" name="CustomShape 14"/>
+          <p:cNvPr id="142" name="CustomShape 14"/>
           <p:cNvSpPr/>
           <p:nvPr/>
         </p:nvSpPr>
         <p:spPr>
           <a:xfrm rot="10979400">
-            <a:off x="3741480" y="3924360"/>
-            <a:ext cx="1464120" cy="1453680"/>
+            <a:off x="3741840" y="3924360"/>
+            <a:ext cx="1463760" cy="1453320"/>
           </a:xfrm>
           <a:prstGeom prst="circularArrow">
             <a:avLst>
@@ -5314,14 +5224,14 @@
       </p:sp>
       <p:sp>
         <p:nvSpPr>
-          <p:cNvPr id="146" name="CustomShape 15"/>
+          <p:cNvPr id="143" name="CustomShape 15"/>
           <p:cNvSpPr/>
           <p:nvPr/>
         </p:nvSpPr>
         <p:spPr>
           <a:xfrm rot="5400000">
-            <a:off x="1483200" y="4413600"/>
-            <a:ext cx="360" cy="364680"/>
+            <a:off x="1483200" y="4233600"/>
+            <a:ext cx="360" cy="364320"/>
           </a:xfrm>
           <a:prstGeom prst="straightConnector1">
             <a:avLst/>
@@ -5338,14 +5248,14 @@
       </p:sp>
       <p:sp>
         <p:nvSpPr>
-          <p:cNvPr id="147" name="CustomShape 16"/>
+          <p:cNvPr id="144" name="CustomShape 16"/>
           <p:cNvSpPr/>
           <p:nvPr/>
         </p:nvSpPr>
         <p:spPr>
           <a:xfrm>
             <a:off x="2355120" y="1196640"/>
-            <a:ext cx="1529280" cy="1633680"/>
+            <a:ext cx="1528920" cy="1633320"/>
           </a:xfrm>
           <a:prstGeom prst="flowChartMagneticDisk">
             <a:avLst/>
@@ -5363,14 +5273,14 @@
       </p:sp>
       <p:sp>
         <p:nvSpPr>
-          <p:cNvPr id="148" name="CustomShape 17"/>
+          <p:cNvPr id="145" name="CustomShape 17"/>
           <p:cNvSpPr/>
           <p:nvPr/>
         </p:nvSpPr>
         <p:spPr>
           <a:xfrm>
             <a:off x="6264360" y="2010240"/>
-            <a:ext cx="1031040" cy="360"/>
+            <a:ext cx="1030680" cy="360"/>
           </a:xfrm>
           <a:prstGeom prst="straightConnector1">
             <a:avLst/>
@@ -5387,14 +5297,14 @@
       </p:sp>
       <p:sp>
         <p:nvSpPr>
-          <p:cNvPr id="149" name="CustomShape 18"/>
+          <p:cNvPr id="146" name="CustomShape 18"/>
           <p:cNvSpPr/>
           <p:nvPr/>
         </p:nvSpPr>
         <p:spPr>
           <a:xfrm>
             <a:off x="2486880" y="1964520"/>
-            <a:ext cx="1260000" cy="303480"/>
+            <a:ext cx="1259640" cy="303120"/>
           </a:xfrm>
           <a:prstGeom prst="rect">
             <a:avLst/>
@@ -5427,14 +5337,14 @@
       </p:sp>
       <p:sp>
         <p:nvSpPr>
-          <p:cNvPr id="150" name="CustomShape 19"/>
+          <p:cNvPr id="147" name="CustomShape 19"/>
           <p:cNvSpPr/>
           <p:nvPr/>
         </p:nvSpPr>
         <p:spPr>
           <a:xfrm rot="10800000">
-            <a:off x="7296480" y="1196640"/>
-            <a:ext cx="1427040" cy="1571040"/>
+            <a:off x="7296840" y="1196640"/>
+            <a:ext cx="1426680" cy="1570680"/>
           </a:xfrm>
           <a:prstGeom prst="snip1Rect">
             <a:avLst>
@@ -5454,14 +5364,14 @@
       </p:sp>
       <p:sp>
         <p:nvSpPr>
-          <p:cNvPr id="151" name="CustomShape 20"/>
+          <p:cNvPr id="148" name="CustomShape 20"/>
           <p:cNvSpPr/>
           <p:nvPr/>
         </p:nvSpPr>
         <p:spPr>
           <a:xfrm>
             <a:off x="7272000" y="1948680"/>
-            <a:ext cx="1479600" cy="729000"/>
+            <a:ext cx="1479240" cy="728640"/>
           </a:xfrm>
           <a:prstGeom prst="rect">
             <a:avLst/>
@@ -5528,14 +5438,14 @@
       </p:sp>
       <p:sp>
         <p:nvSpPr>
-          <p:cNvPr id="152" name="CustomShape 21"/>
+          <p:cNvPr id="149" name="CustomShape 21"/>
           <p:cNvSpPr/>
           <p:nvPr/>
         </p:nvSpPr>
         <p:spPr>
           <a:xfrm>
             <a:off x="7311600" y="1319040"/>
-            <a:ext cx="1395360" cy="516600"/>
+            <a:ext cx="1395000" cy="516240"/>
           </a:xfrm>
           <a:prstGeom prst="rect">
             <a:avLst/>
@@ -5568,14 +5478,14 @@
       </p:sp>
       <p:sp>
         <p:nvSpPr>
-          <p:cNvPr id="153" name="CustomShape 22"/>
-          <p:cNvSpPr/>
-          <p:nvPr/>
-        </p:nvSpPr>
-        <p:spPr>
-          <a:xfrm>
-            <a:off x="1335240" y="1569600"/>
-            <a:ext cx="1107000" cy="684360"/>
+          <p:cNvPr id="150" name="CustomShape 22"/>
+          <p:cNvSpPr/>
+          <p:nvPr/>
+        </p:nvSpPr>
+        <p:spPr>
+          <a:xfrm>
+            <a:off x="1335240" y="2217600"/>
+            <a:ext cx="1106640" cy="684000"/>
           </a:xfrm>
           <a:prstGeom prst="rect">
             <a:avLst/>
@@ -5624,7 +5534,7 @@
       </p:sp>
       <p:sp>
         <p:nvSpPr>
-          <p:cNvPr id="154" name="Line 23"/>
+          <p:cNvPr id="151" name="Line 23"/>
           <p:cNvSpPr/>
           <p:nvPr/>
         </p:nvSpPr>
@@ -5646,7 +5556,7 @@
       </p:sp>
       <p:sp>
         <p:nvSpPr>
-          <p:cNvPr id="155" name="Line 24"/>
+          <p:cNvPr id="152" name="Line 24"/>
           <p:cNvSpPr/>
           <p:nvPr/>
         </p:nvSpPr>
@@ -5668,14 +5578,14 @@
       </p:sp>
       <p:sp>
         <p:nvSpPr>
-          <p:cNvPr id="156" name="CustomShape 25"/>
+          <p:cNvPr id="153" name="CustomShape 25"/>
           <p:cNvSpPr/>
           <p:nvPr/>
         </p:nvSpPr>
         <p:spPr>
           <a:xfrm flipV="1">
-            <a:off x="6238080" y="2447280"/>
-            <a:ext cx="1057680" cy="360"/>
+            <a:off x="6238080" y="2446200"/>
+            <a:ext cx="1057320" cy="360"/>
           </a:xfrm>
           <a:prstGeom prst="straightConnector1">
             <a:avLst/>
@@ -5692,14 +5602,14 @@
       </p:sp>
       <p:sp>
         <p:nvSpPr>
-          <p:cNvPr id="157" name="CustomShape 26"/>
+          <p:cNvPr id="154" name="CustomShape 26"/>
           <p:cNvSpPr/>
           <p:nvPr/>
         </p:nvSpPr>
         <p:spPr>
           <a:xfrm>
             <a:off x="4800960" y="1611720"/>
-            <a:ext cx="1465920" cy="673920"/>
+            <a:ext cx="1465560" cy="673560"/>
           </a:xfrm>
           <a:prstGeom prst="roundRect">
             <a:avLst>
@@ -5719,14 +5629,14 @@
       </p:sp>
       <p:sp>
         <p:nvSpPr>
-          <p:cNvPr id="158" name="CustomShape 27"/>
+          <p:cNvPr id="155" name="CustomShape 27"/>
           <p:cNvSpPr/>
           <p:nvPr/>
         </p:nvSpPr>
         <p:spPr>
           <a:xfrm>
             <a:off x="4818240" y="1631520"/>
-            <a:ext cx="1431720" cy="634680"/>
+            <a:ext cx="1431360" cy="634320"/>
           </a:xfrm>
           <a:prstGeom prst="rect">
             <a:avLst/>
@@ -5761,14 +5671,14 @@
       </p:sp>
       <p:sp>
         <p:nvSpPr>
-          <p:cNvPr id="159" name="CustomShape 28"/>
+          <p:cNvPr id="156" name="CustomShape 28"/>
           <p:cNvSpPr/>
           <p:nvPr/>
         </p:nvSpPr>
         <p:spPr>
           <a:xfrm>
             <a:off x="3873600" y="1994400"/>
-            <a:ext cx="917280" cy="360"/>
+            <a:ext cx="916920" cy="360"/>
           </a:xfrm>
           <a:prstGeom prst="straightConnector1">
             <a:avLst/>
@@ -5785,14 +5695,14 @@
       </p:sp>
       <p:sp>
         <p:nvSpPr>
-          <p:cNvPr id="160" name="CustomShape 29"/>
+          <p:cNvPr id="157" name="CustomShape 29"/>
           <p:cNvSpPr/>
           <p:nvPr/>
         </p:nvSpPr>
         <p:spPr>
           <a:xfrm>
             <a:off x="6492960" y="2718360"/>
-            <a:ext cx="970200" cy="720"/>
+            <a:ext cx="969840" cy="360"/>
           </a:xfrm>
           <a:prstGeom prst="straightConnector1">
             <a:avLst/>
@@ -5809,7 +5719,7 @@
       </p:sp>
       <p:pic>
         <p:nvPicPr>
-          <p:cNvPr descr="" id="161" name="Picture 99"/>
+          <p:cNvPr descr="" id="158" name="Picture 99"/>
           <p:cNvPicPr/>
           <p:nvPr/>
         </p:nvPicPr>
@@ -5822,7 +5732,7 @@
         <p:spPr>
           <a:xfrm>
             <a:off x="327240" y="2361600"/>
-            <a:ext cx="1236240" cy="429480"/>
+            <a:ext cx="1235880" cy="429120"/>
           </a:xfrm>
           <a:prstGeom prst="rect">
             <a:avLst/>
@@ -5834,7 +5744,7 @@
       </p:pic>
       <p:pic>
         <p:nvPicPr>
-          <p:cNvPr descr="" id="162" name="Picture 100"/>
+          <p:cNvPr descr="" id="159" name="Picture 100"/>
           <p:cNvPicPr/>
           <p:nvPr/>
         </p:nvPicPr>
@@ -5847,7 +5757,7 @@
         <p:spPr>
           <a:xfrm>
             <a:off x="388800" y="1641600"/>
-            <a:ext cx="1055520" cy="367920"/>
+            <a:ext cx="1055160" cy="367560"/>
           </a:xfrm>
           <a:prstGeom prst="rect">
             <a:avLst/>
@@ -5859,7 +5769,7 @@
       </p:pic>
       <p:pic>
         <p:nvPicPr>
-          <p:cNvPr descr="" id="163" name="Picture 101"/>
+          <p:cNvPr descr="" id="160" name="Picture 101"/>
           <p:cNvPicPr/>
           <p:nvPr/>
         </p:nvPicPr>
@@ -5872,7 +5782,7 @@
         <p:spPr>
           <a:xfrm>
             <a:off x="403920" y="2001600"/>
-            <a:ext cx="999720" cy="434160"/>
+            <a:ext cx="999360" cy="433800"/>
           </a:xfrm>
           <a:prstGeom prst="rect">
             <a:avLst/>
@@ -5884,7 +5794,7 @@
       </p:pic>
       <p:pic>
         <p:nvPicPr>
-          <p:cNvPr descr="" id="164" name="Picture 102"/>
+          <p:cNvPr descr="" id="161" name="Picture 102"/>
           <p:cNvPicPr/>
           <p:nvPr/>
         </p:nvPicPr>
@@ -5897,7 +5807,7 @@
         <p:spPr>
           <a:xfrm>
             <a:off x="449640" y="1339920"/>
-            <a:ext cx="957240" cy="301320"/>
+            <a:ext cx="956880" cy="300960"/>
           </a:xfrm>
           <a:prstGeom prst="rect">
             <a:avLst/>
@@ -5909,7 +5819,7 @@
       </p:pic>
       <p:sp>
         <p:nvSpPr>
-          <p:cNvPr id="165" name="Line 30"/>
+          <p:cNvPr id="162" name="Line 30"/>
           <p:cNvSpPr/>
           <p:nvPr/>
         </p:nvSpPr>
@@ -5921,12 +5831,12 @@
           <a:prstGeom prst="line">
             <a:avLst/>
           </a:prstGeom>
-          <a:ln w="19080">
+          <a:ln cap="rnd" w="19080">
             <a:solidFill>
               <a:srgbClr val="000000"/>
             </a:solidFill>
             <a:custDash>
-              <a:ds d="159000" sp="53000"/>
+              <a:ds d="8427000000" sp="2809000000"/>
             </a:custDash>
             <a:round/>
           </a:ln>
@@ -5934,7 +5844,7 @@
       </p:sp>
       <p:sp>
         <p:nvSpPr>
-          <p:cNvPr id="166" name="Line 31"/>
+          <p:cNvPr id="163" name="Line 31"/>
           <p:cNvSpPr/>
           <p:nvPr/>
         </p:nvSpPr>
@@ -5946,12 +5856,12 @@
           <a:prstGeom prst="line">
             <a:avLst/>
           </a:prstGeom>
-          <a:ln w="19080">
+          <a:ln cap="rnd" w="19080">
             <a:solidFill>
               <a:srgbClr val="000000"/>
             </a:solidFill>
             <a:custDash>
-              <a:ds d="159000" sp="53000"/>
+              <a:ds d="8427000000" sp="2809000000"/>
             </a:custDash>
             <a:round/>
           </a:ln>
@@ -5959,7 +5869,7 @@
       </p:sp>
       <p:sp>
         <p:nvSpPr>
-          <p:cNvPr id="167" name="Line 32"/>
+          <p:cNvPr id="164" name="Line 32"/>
           <p:cNvSpPr/>
           <p:nvPr/>
         </p:nvSpPr>
@@ -5971,12 +5881,12 @@
           <a:prstGeom prst="line">
             <a:avLst/>
           </a:prstGeom>
-          <a:ln w="19080">
+          <a:ln cap="rnd" w="19080">
             <a:solidFill>
               <a:srgbClr val="000000"/>
             </a:solidFill>
             <a:custDash>
-              <a:ds d="159000" sp="53000"/>
+              <a:ds d="8427000000" sp="2809000000"/>
             </a:custDash>
             <a:round/>
           </a:ln>
@@ -5984,7 +5894,7 @@
       </p:sp>
       <p:sp>
         <p:nvSpPr>
-          <p:cNvPr id="168" name="Line 33"/>
+          <p:cNvPr id="165" name="Line 33"/>
           <p:cNvSpPr/>
           <p:nvPr/>
         </p:nvSpPr>
@@ -5996,12 +5906,12 @@
           <a:prstGeom prst="line">
             <a:avLst/>
           </a:prstGeom>
-          <a:ln w="19080">
+          <a:ln cap="rnd" w="19080">
             <a:solidFill>
               <a:srgbClr val="000000"/>
             </a:solidFill>
             <a:custDash>
-              <a:ds d="159000" sp="53000"/>
+              <a:ds d="8427000000" sp="2809000000"/>
             </a:custDash>
             <a:round/>
           </a:ln>
@@ -6009,14 +5919,14 @@
       </p:sp>
       <p:sp>
         <p:nvSpPr>
-          <p:cNvPr id="169" name="CustomShape 34"/>
+          <p:cNvPr id="166" name="CustomShape 34"/>
           <p:cNvSpPr/>
           <p:nvPr/>
         </p:nvSpPr>
         <p:spPr>
           <a:xfrm>
             <a:off x="7858440" y="3569040"/>
-            <a:ext cx="1166400" cy="1486800"/>
+            <a:ext cx="1166040" cy="1486440"/>
           </a:xfrm>
           <a:prstGeom prst="snip2DiagRect">
             <a:avLst>
@@ -6037,14 +5947,14 @@
       </p:sp>
       <p:sp>
         <p:nvSpPr>
-          <p:cNvPr id="170" name="CustomShape 35"/>
-          <p:cNvSpPr/>
-          <p:nvPr/>
-        </p:nvSpPr>
-        <p:spPr>
-          <a:xfrm>
-            <a:off x="7834680" y="3902040"/>
-            <a:ext cx="1223640" cy="1094040"/>
+          <p:cNvPr id="167" name="CustomShape 35"/>
+          <p:cNvSpPr/>
+          <p:nvPr/>
+        </p:nvSpPr>
+        <p:spPr>
+          <a:xfrm>
+            <a:off x="7834680" y="3758040"/>
+            <a:ext cx="1223280" cy="1093680"/>
           </a:xfrm>
           <a:prstGeom prst="rect">
             <a:avLst/>
@@ -6086,14 +5996,14 @@
       </p:sp>
       <p:sp>
         <p:nvSpPr>
-          <p:cNvPr id="171" name="CustomShape 36"/>
-          <p:cNvSpPr/>
-          <p:nvPr/>
-        </p:nvSpPr>
-        <p:spPr>
-          <a:xfrm>
-            <a:off x="1649520" y="1848600"/>
-            <a:ext cx="450720" cy="288360"/>
+          <p:cNvPr id="168" name="CustomShape 36"/>
+          <p:cNvSpPr/>
+          <p:nvPr/>
+        </p:nvSpPr>
+        <p:spPr>
+          <a:xfrm>
+            <a:off x="1649520" y="2532600"/>
+            <a:ext cx="450360" cy="288000"/>
           </a:xfrm>
           <a:prstGeom prst="rect">
             <a:avLst/>
@@ -6126,14 +6036,14 @@
       </p:sp>
       <p:sp>
         <p:nvSpPr>
-          <p:cNvPr id="172" name="CustomShape 37"/>
+          <p:cNvPr id="169" name="CustomShape 37"/>
           <p:cNvSpPr/>
           <p:nvPr/>
         </p:nvSpPr>
         <p:spPr>
           <a:xfrm>
             <a:off x="4852440" y="4608000"/>
-            <a:ext cx="1113480" cy="504000"/>
+            <a:ext cx="1113120" cy="503640"/>
           </a:xfrm>
           <a:prstGeom prst="rect">
             <a:avLst/>
@@ -6188,14 +6098,14 @@
       </p:sp>
       <p:sp>
         <p:nvSpPr>
-          <p:cNvPr id="173" name="CustomShape 38"/>
+          <p:cNvPr id="170" name="CustomShape 38"/>
           <p:cNvSpPr/>
           <p:nvPr/>
         </p:nvSpPr>
         <p:spPr>
           <a:xfrm>
             <a:off x="1449360" y="4840560"/>
-            <a:ext cx="1538640" cy="408960"/>
+            <a:ext cx="1538280" cy="408600"/>
           </a:xfrm>
           <a:prstGeom prst="rect">
             <a:avLst/>
@@ -6233,14 +6143,14 @@
       </p:sp>
       <p:sp>
         <p:nvSpPr>
-          <p:cNvPr id="174" name="CustomShape 39"/>
+          <p:cNvPr id="171" name="CustomShape 39"/>
           <p:cNvSpPr/>
           <p:nvPr/>
         </p:nvSpPr>
         <p:spPr>
           <a:xfrm rot="5400000">
-            <a:off x="7749720" y="4487760"/>
-            <a:ext cx="360" cy="216720"/>
+            <a:off x="7750080" y="4236120"/>
+            <a:ext cx="360" cy="216360"/>
           </a:xfrm>
           <a:prstGeom prst="straightConnector1">
             <a:avLst/>
@@ -6306,14 +6216,14 @@
       </p:grpSpPr>
       <p:sp>
         <p:nvSpPr>
-          <p:cNvPr id="175" name="CustomShape 1"/>
+          <p:cNvPr id="172" name="CustomShape 1"/>
           <p:cNvSpPr/>
           <p:nvPr/>
         </p:nvSpPr>
         <p:spPr>
           <a:xfrm>
             <a:off x="1405080" y="4411080"/>
-            <a:ext cx="1149480" cy="948240"/>
+            <a:ext cx="1149120" cy="947880"/>
           </a:xfrm>
           <a:prstGeom prst="roundRect">
             <a:avLst>
@@ -6333,14 +6243,14 @@
       </p:sp>
       <p:sp>
         <p:nvSpPr>
-          <p:cNvPr id="176" name="CustomShape 2"/>
+          <p:cNvPr id="173" name="CustomShape 2"/>
           <p:cNvSpPr/>
           <p:nvPr/>
         </p:nvSpPr>
         <p:spPr>
           <a:xfrm rot="10800000">
-            <a:off x="2235240" y="3820320"/>
-            <a:ext cx="1379880" cy="1379880"/>
+            <a:off x="2235600" y="3820680"/>
+            <a:ext cx="1379520" cy="1379520"/>
           </a:xfrm>
           <a:prstGeom prst="leftCircularArrow">
             <a:avLst>
@@ -6361,14 +6271,14 @@
       </p:sp>
       <p:sp>
         <p:nvSpPr>
-          <p:cNvPr id="177" name="CustomShape 3"/>
+          <p:cNvPr id="174" name="CustomShape 3"/>
           <p:cNvSpPr/>
           <p:nvPr/>
         </p:nvSpPr>
         <p:spPr>
           <a:xfrm>
             <a:off x="1660680" y="5156280"/>
-            <a:ext cx="1022040" cy="406080"/>
+            <a:ext cx="1021680" cy="405720"/>
           </a:xfrm>
           <a:prstGeom prst="roundRect">
             <a:avLst>
@@ -6408,14 +6318,14 @@
       </p:sp>
       <p:sp>
         <p:nvSpPr>
-          <p:cNvPr id="178" name="CustomShape 4"/>
+          <p:cNvPr id="175" name="CustomShape 4"/>
           <p:cNvSpPr/>
           <p:nvPr/>
         </p:nvSpPr>
         <p:spPr>
           <a:xfrm>
             <a:off x="2943000" y="4411080"/>
-            <a:ext cx="1149480" cy="948240"/>
+            <a:ext cx="1149120" cy="947880"/>
           </a:xfrm>
           <a:prstGeom prst="roundRect">
             <a:avLst>
@@ -6435,14 +6345,14 @@
       </p:sp>
       <p:sp>
         <p:nvSpPr>
-          <p:cNvPr id="179" name="CustomShape 5"/>
+          <p:cNvPr id="176" name="CustomShape 5"/>
           <p:cNvSpPr/>
           <p:nvPr/>
         </p:nvSpPr>
         <p:spPr>
           <a:xfrm rot="10800000">
-            <a:off x="3857760" y="4428720"/>
-            <a:ext cx="1526760" cy="1526760"/>
+            <a:off x="3858120" y="4429080"/>
+            <a:ext cx="1526400" cy="1526400"/>
           </a:xfrm>
           <a:prstGeom prst="circularArrow">
             <a:avLst>
@@ -6463,14 +6373,14 @@
       </p:sp>
       <p:sp>
         <p:nvSpPr>
-          <p:cNvPr id="180" name="CustomShape 6"/>
+          <p:cNvPr id="177" name="CustomShape 6"/>
           <p:cNvSpPr/>
           <p:nvPr/>
         </p:nvSpPr>
         <p:spPr>
           <a:xfrm>
             <a:off x="3198600" y="4208040"/>
-            <a:ext cx="1022040" cy="406080"/>
+            <a:ext cx="1021680" cy="405720"/>
           </a:xfrm>
           <a:prstGeom prst="roundRect">
             <a:avLst>
@@ -6510,14 +6420,14 @@
       </p:sp>
       <p:sp>
         <p:nvSpPr>
-          <p:cNvPr id="181" name="CustomShape 7"/>
+          <p:cNvPr id="178" name="CustomShape 7"/>
           <p:cNvSpPr/>
           <p:nvPr/>
         </p:nvSpPr>
         <p:spPr>
           <a:xfrm>
             <a:off x="4481280" y="4411080"/>
-            <a:ext cx="1149480" cy="948240"/>
+            <a:ext cx="1149120" cy="947880"/>
           </a:xfrm>
           <a:prstGeom prst="roundRect">
             <a:avLst>
@@ -6537,14 +6447,14 @@
       </p:sp>
       <p:sp>
         <p:nvSpPr>
-          <p:cNvPr id="182" name="CustomShape 8"/>
+          <p:cNvPr id="179" name="CustomShape 8"/>
           <p:cNvSpPr/>
           <p:nvPr/>
         </p:nvSpPr>
         <p:spPr>
           <a:xfrm rot="10800000">
-            <a:off x="5463000" y="3820320"/>
-            <a:ext cx="1379880" cy="1379880"/>
+            <a:off x="5463360" y="3820680"/>
+            <a:ext cx="1379520" cy="1379520"/>
           </a:xfrm>
           <a:prstGeom prst="leftCircularArrow">
             <a:avLst>
@@ -6565,14 +6475,14 @@
       </p:sp>
       <p:sp>
         <p:nvSpPr>
-          <p:cNvPr id="183" name="CustomShape 9"/>
+          <p:cNvPr id="180" name="CustomShape 9"/>
           <p:cNvSpPr/>
           <p:nvPr/>
         </p:nvSpPr>
         <p:spPr>
           <a:xfrm>
             <a:off x="4736880" y="5156280"/>
-            <a:ext cx="1022040" cy="406080"/>
+            <a:ext cx="1021680" cy="405720"/>
           </a:xfrm>
           <a:prstGeom prst="roundRect">
             <a:avLst>
@@ -6612,14 +6522,14 @@
       </p:sp>
       <p:sp>
         <p:nvSpPr>
-          <p:cNvPr id="184" name="CustomShape 10"/>
+          <p:cNvPr id="181" name="CustomShape 10"/>
           <p:cNvSpPr/>
           <p:nvPr/>
         </p:nvSpPr>
         <p:spPr>
           <a:xfrm>
             <a:off x="6019200" y="4411080"/>
-            <a:ext cx="1149480" cy="948240"/>
+            <a:ext cx="1149120" cy="947880"/>
           </a:xfrm>
           <a:prstGeom prst="roundRect">
             <a:avLst>
@@ -6639,14 +6549,14 @@
       </p:sp>
       <p:sp>
         <p:nvSpPr>
-          <p:cNvPr id="185" name="CustomShape 11"/>
+          <p:cNvPr id="182" name="CustomShape 11"/>
           <p:cNvSpPr/>
           <p:nvPr/>
         </p:nvSpPr>
         <p:spPr>
           <a:xfrm>
             <a:off x="6274800" y="4208040"/>
-            <a:ext cx="1022040" cy="406080"/>
+            <a:ext cx="1021680" cy="405720"/>
           </a:xfrm>
           <a:prstGeom prst="roundRect">
             <a:avLst>
@@ -6686,14 +6596,14 @@
       </p:sp>
       <p:sp>
         <p:nvSpPr>
-          <p:cNvPr id="186" name="CustomShape 12"/>
+          <p:cNvPr id="183" name="CustomShape 12"/>
           <p:cNvSpPr/>
           <p:nvPr/>
         </p:nvSpPr>
         <p:spPr>
           <a:xfrm>
             <a:off x="7522920" y="4178880"/>
-            <a:ext cx="1124280" cy="1500480"/>
+            <a:ext cx="1123920" cy="1500120"/>
           </a:xfrm>
           <a:prstGeom prst="snip2DiagRect">
             <a:avLst>
@@ -6714,14 +6624,14 @@
       </p:sp>
       <p:sp>
         <p:nvSpPr>
-          <p:cNvPr id="187" name="CustomShape 13"/>
+          <p:cNvPr id="184" name="CustomShape 13"/>
           <p:cNvSpPr/>
           <p:nvPr/>
         </p:nvSpPr>
         <p:spPr>
           <a:xfrm>
             <a:off x="107640" y="4160520"/>
-            <a:ext cx="1076400" cy="1500480"/>
+            <a:ext cx="1076040" cy="1500120"/>
           </a:xfrm>
           <a:prstGeom prst="snip2DiagRect">
             <a:avLst>
@@ -6742,14 +6652,14 @@
       </p:sp>
       <p:sp>
         <p:nvSpPr>
-          <p:cNvPr id="188" name="CustomShape 14"/>
+          <p:cNvPr id="185" name="CustomShape 14"/>
           <p:cNvSpPr/>
           <p:nvPr/>
         </p:nvSpPr>
         <p:spPr>
           <a:xfrm>
             <a:off x="1384920" y="1842840"/>
-            <a:ext cx="1295640" cy="1482480"/>
+            <a:ext cx="1295280" cy="1482120"/>
           </a:xfrm>
           <a:prstGeom prst="flowChartMagneticDisk">
             <a:avLst/>
@@ -6778,14 +6688,14 @@
       </p:sp>
       <p:sp>
         <p:nvSpPr>
-          <p:cNvPr id="189" name="CustomShape 15"/>
+          <p:cNvPr id="186" name="CustomShape 15"/>
           <p:cNvSpPr/>
           <p:nvPr/>
         </p:nvSpPr>
         <p:spPr>
           <a:xfrm rot="10800000">
-            <a:off x="5961240" y="1844280"/>
-            <a:ext cx="1472400" cy="1482480"/>
+            <a:off x="5961600" y="1844280"/>
+            <a:ext cx="1472040" cy="1482120"/>
           </a:xfrm>
           <a:prstGeom prst="snip1Rect">
             <a:avLst>
@@ -6805,14 +6715,14 @@
       </p:sp>
       <p:sp>
         <p:nvSpPr>
-          <p:cNvPr id="190" name="CustomShape 16"/>
+          <p:cNvPr id="187" name="CustomShape 16"/>
           <p:cNvSpPr/>
           <p:nvPr/>
         </p:nvSpPr>
         <p:spPr>
           <a:xfrm>
             <a:off x="3833280" y="2066760"/>
-            <a:ext cx="1151640" cy="1007640"/>
+            <a:ext cx="1151280" cy="1007280"/>
           </a:xfrm>
           <a:prstGeom prst="rect">
             <a:avLst/>
@@ -6820,27 +6730,51 @@
           <a:solidFill>
             <a:srgbClr val="d9d9d9"/>
           </a:solidFill>
+          <a:ln cap="rnd" w="19080">
+            <a:solidFill>
+              <a:srgbClr val="000000"/>
+            </a:solidFill>
+            <a:custDash>
+              <a:ds d="8427000000" sp="2809000000"/>
+            </a:custDash>
+            <a:round/>
+          </a:ln>
+        </p:spPr>
+      </p:sp>
+      <p:sp>
+        <p:nvSpPr>
+          <p:cNvPr id="188" name="CustomShape 17"/>
+          <p:cNvSpPr/>
+          <p:nvPr/>
+        </p:nvSpPr>
+        <p:spPr>
+          <a:xfrm>
+            <a:off x="2706840" y="2570760"/>
+            <a:ext cx="1125720" cy="360"/>
+          </a:xfrm>
+          <a:prstGeom prst="straightConnector1">
+            <a:avLst/>
+          </a:prstGeom>
+          <a:noFill/>
           <a:ln w="19080">
             <a:solidFill>
               <a:srgbClr val="000000"/>
             </a:solidFill>
-            <a:custDash>
-              <a:ds d="159000" sp="53000"/>
-            </a:custDash>
-            <a:round/>
-          </a:ln>
-        </p:spPr>
-      </p:sp>
-      <p:sp>
-        <p:nvSpPr>
-          <p:cNvPr id="191" name="CustomShape 17"/>
-          <p:cNvSpPr/>
-          <p:nvPr/>
-        </p:nvSpPr>
-        <p:spPr>
-          <a:xfrm>
-            <a:off x="2706840" y="2570760"/>
-            <a:ext cx="1126080" cy="360"/>
+            <a:round/>
+            <a:tailEnd len="med" type="arrow" w="med"/>
+          </a:ln>
+        </p:spPr>
+      </p:sp>
+      <p:sp>
+        <p:nvSpPr>
+          <p:cNvPr id="189" name="CustomShape 18"/>
+          <p:cNvSpPr/>
+          <p:nvPr/>
+        </p:nvSpPr>
+        <p:spPr>
+          <a:xfrm>
+            <a:off x="4985280" y="2570760"/>
+            <a:ext cx="974880" cy="360"/>
           </a:xfrm>
           <a:prstGeom prst="straightConnector1">
             <a:avLst/>
@@ -6857,14 +6791,14 @@
       </p:sp>
       <p:sp>
         <p:nvSpPr>
-          <p:cNvPr id="192" name="CustomShape 18"/>
-          <p:cNvSpPr/>
-          <p:nvPr/>
-        </p:nvSpPr>
-        <p:spPr>
-          <a:xfrm>
-            <a:off x="4985280" y="2570760"/>
-            <a:ext cx="975240" cy="360"/>
+          <p:cNvPr id="190" name="CustomShape 19"/>
+          <p:cNvSpPr/>
+          <p:nvPr/>
+        </p:nvSpPr>
+        <p:spPr>
+          <a:xfrm flipH="1" flipV="1">
+            <a:off x="7214040" y="4928400"/>
+            <a:ext cx="307440" cy="360"/>
           </a:xfrm>
           <a:prstGeom prst="straightConnector1">
             <a:avLst/>
@@ -6881,38 +6815,14 @@
       </p:sp>
       <p:sp>
         <p:nvSpPr>
-          <p:cNvPr id="193" name="CustomShape 19"/>
-          <p:cNvSpPr/>
-          <p:nvPr/>
-        </p:nvSpPr>
-        <p:spPr>
-          <a:xfrm flipH="1" flipV="1">
-            <a:off x="7214040" y="4929120"/>
-            <a:ext cx="307800" cy="720"/>
-          </a:xfrm>
-          <a:prstGeom prst="straightConnector1">
-            <a:avLst/>
-          </a:prstGeom>
-          <a:noFill/>
-          <a:ln w="19080">
-            <a:solidFill>
-              <a:srgbClr val="000000"/>
-            </a:solidFill>
-            <a:round/>
-            <a:tailEnd len="med" type="arrow" w="med"/>
-          </a:ln>
-        </p:spPr>
-      </p:sp>
-      <p:sp>
-        <p:nvSpPr>
-          <p:cNvPr id="194" name="CustomShape 20"/>
+          <p:cNvPr id="191" name="CustomShape 20"/>
           <p:cNvSpPr/>
           <p:nvPr/>
         </p:nvSpPr>
         <p:spPr>
           <a:xfrm flipH="1">
             <a:off x="1183320" y="4885560"/>
-            <a:ext cx="219240" cy="14400"/>
+            <a:ext cx="218880" cy="14040"/>
           </a:xfrm>
           <a:prstGeom prst="straightConnector1">
             <a:avLst/>
@@ -6929,14 +6839,14 @@
       </p:sp>
       <p:sp>
         <p:nvSpPr>
-          <p:cNvPr id="195" name="CustomShape 21"/>
+          <p:cNvPr id="192" name="CustomShape 21"/>
           <p:cNvSpPr/>
           <p:nvPr/>
         </p:nvSpPr>
         <p:spPr>
           <a:xfrm>
             <a:off x="1533240" y="2431440"/>
-            <a:ext cx="1343160" cy="303480"/>
+            <a:ext cx="1342800" cy="303120"/>
           </a:xfrm>
           <a:prstGeom prst="rect">
             <a:avLst/>
@@ -6969,14 +6879,14 @@
       </p:sp>
       <p:sp>
         <p:nvSpPr>
-          <p:cNvPr id="196" name="CustomShape 22"/>
+          <p:cNvPr id="193" name="CustomShape 22"/>
           <p:cNvSpPr/>
           <p:nvPr/>
         </p:nvSpPr>
         <p:spPr>
           <a:xfrm>
             <a:off x="3737520" y="2393280"/>
-            <a:ext cx="1343160" cy="303480"/>
+            <a:ext cx="1342800" cy="303120"/>
           </a:xfrm>
           <a:prstGeom prst="rect">
             <a:avLst/>
@@ -7009,14 +6919,14 @@
       </p:sp>
       <p:sp>
         <p:nvSpPr>
-          <p:cNvPr id="197" name="CustomShape 23"/>
+          <p:cNvPr id="194" name="CustomShape 23"/>
           <p:cNvSpPr/>
           <p:nvPr/>
         </p:nvSpPr>
         <p:spPr>
           <a:xfrm>
             <a:off x="5914440" y="2464560"/>
-            <a:ext cx="1564920" cy="637920"/>
+            <a:ext cx="1564560" cy="637560"/>
           </a:xfrm>
           <a:prstGeom prst="rect">
             <a:avLst/>
@@ -7083,14 +6993,14 @@
       </p:sp>
       <p:sp>
         <p:nvSpPr>
-          <p:cNvPr id="198" name="CustomShape 24"/>
+          <p:cNvPr id="195" name="CustomShape 24"/>
           <p:cNvSpPr/>
           <p:nvPr/>
         </p:nvSpPr>
         <p:spPr>
           <a:xfrm>
             <a:off x="5895720" y="1957680"/>
-            <a:ext cx="1583640" cy="303480"/>
+            <a:ext cx="1583280" cy="303120"/>
           </a:xfrm>
           <a:prstGeom prst="rect">
             <a:avLst/>
@@ -7123,14 +7033,14 @@
       </p:sp>
       <p:sp>
         <p:nvSpPr>
-          <p:cNvPr id="199" name="CustomShape 25"/>
+          <p:cNvPr id="196" name="CustomShape 25"/>
           <p:cNvSpPr/>
           <p:nvPr/>
         </p:nvSpPr>
         <p:spPr>
           <a:xfrm>
             <a:off x="44280" y="4380840"/>
-            <a:ext cx="1223640" cy="927360"/>
+            <a:ext cx="1223280" cy="927000"/>
           </a:xfrm>
           <a:prstGeom prst="rect">
             <a:avLst/>
@@ -7172,14 +7082,14 @@
       </p:sp>
       <p:sp>
         <p:nvSpPr>
-          <p:cNvPr id="200" name="CustomShape 26"/>
+          <p:cNvPr id="197" name="CustomShape 26"/>
           <p:cNvSpPr/>
           <p:nvPr/>
         </p:nvSpPr>
         <p:spPr>
           <a:xfrm>
             <a:off x="7508160" y="4510440"/>
-            <a:ext cx="1223640" cy="759960"/>
+            <a:ext cx="1223280" cy="759600"/>
           </a:xfrm>
           <a:prstGeom prst="rect">
             <a:avLst/>
@@ -7221,7 +7131,7 @@
       </p:sp>
       <p:pic>
         <p:nvPicPr>
-          <p:cNvPr descr="" id="201" name="Picture 99"/>
+          <p:cNvPr descr="" id="198" name="Picture 99"/>
           <p:cNvPicPr/>
           <p:nvPr/>
         </p:nvPicPr>
@@ -7234,7 +7144,7 @@
         <p:spPr>
           <a:xfrm>
             <a:off x="82080" y="2985840"/>
-            <a:ext cx="685800" cy="290520"/>
+            <a:ext cx="685440" cy="290160"/>
           </a:xfrm>
           <a:prstGeom prst="rect">
             <a:avLst/>
@@ -7246,7 +7156,7 @@
       </p:pic>
       <p:pic>
         <p:nvPicPr>
-          <p:cNvPr descr="" id="202" name="Picture 100"/>
+          <p:cNvPr descr="" id="199" name="Picture 100"/>
           <p:cNvPicPr/>
           <p:nvPr/>
         </p:nvPicPr>
@@ -7259,7 +7169,7 @@
         <p:spPr>
           <a:xfrm>
             <a:off x="95760" y="2393280"/>
-            <a:ext cx="620280" cy="263520"/>
+            <a:ext cx="619920" cy="263160"/>
           </a:xfrm>
           <a:prstGeom prst="rect">
             <a:avLst/>
@@ -7271,7 +7181,7 @@
       </p:pic>
       <p:pic>
         <p:nvPicPr>
-          <p:cNvPr descr="" id="203" name="Picture 101"/>
+          <p:cNvPr descr="" id="200" name="Picture 101"/>
           <p:cNvPicPr/>
           <p:nvPr/>
         </p:nvPicPr>
@@ -7284,7 +7194,7 @@
         <p:spPr>
           <a:xfrm>
             <a:off x="107640" y="2682720"/>
-            <a:ext cx="608760" cy="322200"/>
+            <a:ext cx="608400" cy="321840"/>
           </a:xfrm>
           <a:prstGeom prst="rect">
             <a:avLst/>
@@ -7296,7 +7206,7 @@
       </p:pic>
       <p:pic>
         <p:nvPicPr>
-          <p:cNvPr descr="" id="204" name="Picture 102"/>
+          <p:cNvPr descr="" id="201" name="Picture 102"/>
           <p:cNvPicPr/>
           <p:nvPr/>
         </p:nvPicPr>
@@ -7309,7 +7219,7 @@
         <p:spPr>
           <a:xfrm>
             <a:off x="107640" y="2113560"/>
-            <a:ext cx="608760" cy="233640"/>
+            <a:ext cx="608400" cy="233280"/>
           </a:xfrm>
           <a:prstGeom prst="rect">
             <a:avLst/>
@@ -7321,7 +7231,7 @@
       </p:pic>
       <p:sp>
         <p:nvSpPr>
-          <p:cNvPr id="205" name="Line 27"/>
+          <p:cNvPr id="202" name="Line 27"/>
           <p:cNvSpPr/>
           <p:nvPr/>
         </p:nvSpPr>
@@ -7343,14 +7253,14 @@
       </p:sp>
       <p:sp>
         <p:nvSpPr>
-          <p:cNvPr id="206" name="CustomShape 28"/>
+          <p:cNvPr id="203" name="CustomShape 28"/>
           <p:cNvSpPr/>
           <p:nvPr/>
         </p:nvSpPr>
         <p:spPr>
           <a:xfrm>
             <a:off x="425160" y="2177640"/>
-            <a:ext cx="1223640" cy="364680"/>
+            <a:ext cx="1223280" cy="364320"/>
           </a:xfrm>
           <a:prstGeom prst="rect">
             <a:avLst/>
@@ -7400,14 +7310,14 @@
       </p:sp>
       <p:sp>
         <p:nvSpPr>
-          <p:cNvPr id="207" name="CustomShape 29"/>
+          <p:cNvPr id="204" name="CustomShape 29"/>
           <p:cNvSpPr/>
           <p:nvPr/>
         </p:nvSpPr>
         <p:spPr>
           <a:xfrm>
             <a:off x="4989600" y="3717000"/>
-            <a:ext cx="360" cy="714240"/>
+            <a:ext cx="360" cy="713880"/>
           </a:xfrm>
           <a:prstGeom prst="straightConnector1">
             <a:avLst/>
@@ -7424,14 +7334,14 @@
       </p:sp>
       <p:sp>
         <p:nvSpPr>
-          <p:cNvPr id="208" name="CustomShape 30"/>
+          <p:cNvPr id="205" name="CustomShape 30"/>
           <p:cNvSpPr/>
           <p:nvPr/>
         </p:nvSpPr>
         <p:spPr>
           <a:xfrm flipV="1">
             <a:off x="6700680" y="3326400"/>
-            <a:ext cx="360" cy="389880"/>
+            <a:ext cx="360" cy="389520"/>
           </a:xfrm>
           <a:prstGeom prst="straightConnector1">
             <a:avLst/>
@@ -7448,7 +7358,7 @@
       </p:sp>
       <p:sp>
         <p:nvSpPr>
-          <p:cNvPr id="209" name="Line 31"/>
+          <p:cNvPr id="206" name="Line 31"/>
           <p:cNvSpPr/>
           <p:nvPr/>
         </p:nvSpPr>
@@ -7470,14 +7380,14 @@
       </p:sp>
       <p:sp>
         <p:nvSpPr>
-          <p:cNvPr id="210" name="CustomShape 32"/>
+          <p:cNvPr id="207" name="CustomShape 32"/>
           <p:cNvSpPr/>
           <p:nvPr/>
         </p:nvSpPr>
         <p:spPr>
           <a:xfrm>
             <a:off x="3741120" y="3325680"/>
-            <a:ext cx="360" cy="896040"/>
+            <a:ext cx="360" cy="895680"/>
           </a:xfrm>
           <a:prstGeom prst="straightConnector1">
             <a:avLst/>
@@ -7494,7 +7404,7 @@
       </p:sp>
       <p:sp>
         <p:nvSpPr>
-          <p:cNvPr id="211" name="Line 33"/>
+          <p:cNvPr id="208" name="Line 33"/>
           <p:cNvSpPr/>
           <p:nvPr/>
         </p:nvSpPr>
@@ -7516,14 +7426,14 @@
       </p:sp>
       <p:sp>
         <p:nvSpPr>
-          <p:cNvPr id="212" name="CustomShape 34"/>
+          <p:cNvPr id="209" name="CustomShape 34"/>
           <p:cNvSpPr/>
           <p:nvPr/>
         </p:nvSpPr>
         <p:spPr>
           <a:xfrm>
             <a:off x="5218200" y="3327480"/>
-            <a:ext cx="970200" cy="720"/>
+            <a:ext cx="969840" cy="360"/>
           </a:xfrm>
           <a:prstGeom prst="straightConnector1">
             <a:avLst/>

</xml_diff>